<commit_message>
graphs added as images for tex
</commit_message>
<xml_diff>
--- a/profile/nvp_sim/sine_wave/Presentation.pptx
+++ b/profile/nvp_sim/sine_wave/Presentation.pptx
@@ -2,19 +2,22 @@
 <file path=ppt/presentation.xml><?xml version="1.0" encoding="utf-8"?>
 <p:presentation xmlns:a="http://schemas.openxmlformats.org/drawingml/2006/main" xmlns:r="http://schemas.openxmlformats.org/officeDocument/2006/relationships" xmlns:p="http://schemas.openxmlformats.org/presentationml/2006/main" saveSubsetFonts="1">
   <p:sldMasterIdLst>
-    <p:sldMasterId id="2147483648" r:id="rId1"/>
+    <p:sldMasterId id="2147483732" r:id="rId1"/>
   </p:sldMasterIdLst>
   <p:sldIdLst>
-    <p:sldId id="256" r:id="rId2"/>
-    <p:sldId id="257" r:id="rId3"/>
-    <p:sldId id="258" r:id="rId4"/>
-    <p:sldId id="259" r:id="rId5"/>
-    <p:sldId id="262" r:id="rId6"/>
-    <p:sldId id="260" r:id="rId7"/>
-    <p:sldId id="261" r:id="rId8"/>
-    <p:sldId id="263" r:id="rId9"/>
-    <p:sldId id="264" r:id="rId10"/>
-    <p:sldId id="265" r:id="rId11"/>
+    <p:sldId id="266" r:id="rId2"/>
+    <p:sldId id="256" r:id="rId3"/>
+    <p:sldId id="257" r:id="rId4"/>
+    <p:sldId id="258" r:id="rId5"/>
+    <p:sldId id="259" r:id="rId6"/>
+    <p:sldId id="262" r:id="rId7"/>
+    <p:sldId id="260" r:id="rId8"/>
+    <p:sldId id="261" r:id="rId9"/>
+    <p:sldId id="263" r:id="rId10"/>
+    <p:sldId id="264" r:id="rId11"/>
+    <p:sldId id="265" r:id="rId12"/>
+    <p:sldId id="267" r:id="rId13"/>
+    <p:sldId id="268" r:id="rId14"/>
   </p:sldIdLst>
   <p:sldSz cx="12192000" cy="6858000"/>
   <p:notesSz cx="6858000" cy="9144000"/>
@@ -22,7 +25,7 @@
     <a:defPPr>
       <a:defRPr lang="en-US"/>
     </a:defPPr>
-    <a:lvl1pPr marL="0" algn="l" defTabSz="914400" rtl="0" eaLnBrk="1" latinLnBrk="0" hangingPunct="1">
+    <a:lvl1pPr marL="0" algn="l" defTabSz="457200" rtl="0" eaLnBrk="1" latinLnBrk="0" hangingPunct="1">
       <a:defRPr sz="1800" kern="1200">
         <a:solidFill>
           <a:schemeClr val="tx1"/>
@@ -32,7 +35,7 @@
         <a:cs typeface="+mn-cs"/>
       </a:defRPr>
     </a:lvl1pPr>
-    <a:lvl2pPr marL="457200" algn="l" defTabSz="914400" rtl="0" eaLnBrk="1" latinLnBrk="0" hangingPunct="1">
+    <a:lvl2pPr marL="457200" algn="l" defTabSz="457200" rtl="0" eaLnBrk="1" latinLnBrk="0" hangingPunct="1">
       <a:defRPr sz="1800" kern="1200">
         <a:solidFill>
           <a:schemeClr val="tx1"/>
@@ -42,7 +45,7 @@
         <a:cs typeface="+mn-cs"/>
       </a:defRPr>
     </a:lvl2pPr>
-    <a:lvl3pPr marL="914400" algn="l" defTabSz="914400" rtl="0" eaLnBrk="1" latinLnBrk="0" hangingPunct="1">
+    <a:lvl3pPr marL="914400" algn="l" defTabSz="457200" rtl="0" eaLnBrk="1" latinLnBrk="0" hangingPunct="1">
       <a:defRPr sz="1800" kern="1200">
         <a:solidFill>
           <a:schemeClr val="tx1"/>
@@ -52,7 +55,7 @@
         <a:cs typeface="+mn-cs"/>
       </a:defRPr>
     </a:lvl3pPr>
-    <a:lvl4pPr marL="1371600" algn="l" defTabSz="914400" rtl="0" eaLnBrk="1" latinLnBrk="0" hangingPunct="1">
+    <a:lvl4pPr marL="1371600" algn="l" defTabSz="457200" rtl="0" eaLnBrk="1" latinLnBrk="0" hangingPunct="1">
       <a:defRPr sz="1800" kern="1200">
         <a:solidFill>
           <a:schemeClr val="tx1"/>
@@ -62,7 +65,7 @@
         <a:cs typeface="+mn-cs"/>
       </a:defRPr>
     </a:lvl4pPr>
-    <a:lvl5pPr marL="1828800" algn="l" defTabSz="914400" rtl="0" eaLnBrk="1" latinLnBrk="0" hangingPunct="1">
+    <a:lvl5pPr marL="1828800" algn="l" defTabSz="457200" rtl="0" eaLnBrk="1" latinLnBrk="0" hangingPunct="1">
       <a:defRPr sz="1800" kern="1200">
         <a:solidFill>
           <a:schemeClr val="tx1"/>
@@ -72,7 +75,7 @@
         <a:cs typeface="+mn-cs"/>
       </a:defRPr>
     </a:lvl5pPr>
-    <a:lvl6pPr marL="2286000" algn="l" defTabSz="914400" rtl="0" eaLnBrk="1" latinLnBrk="0" hangingPunct="1">
+    <a:lvl6pPr marL="2286000" algn="l" defTabSz="457200" rtl="0" eaLnBrk="1" latinLnBrk="0" hangingPunct="1">
       <a:defRPr sz="1800" kern="1200">
         <a:solidFill>
           <a:schemeClr val="tx1"/>
@@ -82,7 +85,7 @@
         <a:cs typeface="+mn-cs"/>
       </a:defRPr>
     </a:lvl6pPr>
-    <a:lvl7pPr marL="2743200" algn="l" defTabSz="914400" rtl="0" eaLnBrk="1" latinLnBrk="0" hangingPunct="1">
+    <a:lvl7pPr marL="2743200" algn="l" defTabSz="457200" rtl="0" eaLnBrk="1" latinLnBrk="0" hangingPunct="1">
       <a:defRPr sz="1800" kern="1200">
         <a:solidFill>
           <a:schemeClr val="tx1"/>
@@ -92,7 +95,7 @@
         <a:cs typeface="+mn-cs"/>
       </a:defRPr>
     </a:lvl7pPr>
-    <a:lvl8pPr marL="3200400" algn="l" defTabSz="914400" rtl="0" eaLnBrk="1" latinLnBrk="0" hangingPunct="1">
+    <a:lvl8pPr marL="3200400" algn="l" defTabSz="457200" rtl="0" eaLnBrk="1" latinLnBrk="0" hangingPunct="1">
       <a:defRPr sz="1800" kern="1200">
         <a:solidFill>
           <a:schemeClr val="tx1"/>
@@ -102,7 +105,7 @@
         <a:cs typeface="+mn-cs"/>
       </a:defRPr>
     </a:lvl8pPr>
-    <a:lvl9pPr marL="3657600" algn="l" defTabSz="914400" rtl="0" eaLnBrk="1" latinLnBrk="0" hangingPunct="1">
+    <a:lvl9pPr marL="3657600" algn="l" defTabSz="457200" rtl="0" eaLnBrk="1" latinLnBrk="0" hangingPunct="1">
       <a:defRPr sz="1800" kern="1200">
         <a:solidFill>
           <a:schemeClr val="tx1"/>
@@ -116,9 +119,291 @@
 </p:presentation>
 </file>
 
+<file path=ppt/changesInfos/changesInfo1.xml><?xml version="1.0" encoding="utf-8"?>
+<pc:chgInfo xmlns:a="http://schemas.openxmlformats.org/drawingml/2006/main" xmlns:r="http://schemas.openxmlformats.org/officeDocument/2006/relationships" xmlns:ac="http://schemas.microsoft.com/office/drawing/2013/main/command" xmlns:pc="http://schemas.microsoft.com/office/powerpoint/2013/main/command">
+  <pc:docChgLst>
+    <pc:chgData name="Gudukbay, Gulsum" userId="33ab478b-42a3-4d08-ae05-3f67cf1d32a2" providerId="ADAL" clId="{27E69447-91EA-4D01-AF66-70A6FC4BA94F}"/>
+    <pc:docChg chg="undo custSel addSld delSld modSld">
+      <pc:chgData name="Gudukbay, Gulsum" userId="33ab478b-42a3-4d08-ae05-3f67cf1d32a2" providerId="ADAL" clId="{27E69447-91EA-4D01-AF66-70A6FC4BA94F}" dt="2018-11-28T21:14:30.699" v="95"/>
+      <pc:docMkLst>
+        <pc:docMk/>
+      </pc:docMkLst>
+      <pc:sldChg chg="setBg">
+        <pc:chgData name="Gudukbay, Gulsum" userId="33ab478b-42a3-4d08-ae05-3f67cf1d32a2" providerId="ADAL" clId="{27E69447-91EA-4D01-AF66-70A6FC4BA94F}" dt="2018-11-28T21:14:30.699" v="95"/>
+        <pc:sldMkLst>
+          <pc:docMk/>
+          <pc:sldMk cId="3705530050" sldId="256"/>
+        </pc:sldMkLst>
+      </pc:sldChg>
+      <pc:sldChg chg="setBg">
+        <pc:chgData name="Gudukbay, Gulsum" userId="33ab478b-42a3-4d08-ae05-3f67cf1d32a2" providerId="ADAL" clId="{27E69447-91EA-4D01-AF66-70A6FC4BA94F}" dt="2018-11-28T21:14:30.699" v="95"/>
+        <pc:sldMkLst>
+          <pc:docMk/>
+          <pc:sldMk cId="3117564443" sldId="257"/>
+        </pc:sldMkLst>
+      </pc:sldChg>
+      <pc:sldChg chg="modSp setBg">
+        <pc:chgData name="Gudukbay, Gulsum" userId="33ab478b-42a3-4d08-ae05-3f67cf1d32a2" providerId="ADAL" clId="{27E69447-91EA-4D01-AF66-70A6FC4BA94F}" dt="2018-11-28T21:14:30.699" v="95"/>
+        <pc:sldMkLst>
+          <pc:docMk/>
+          <pc:sldMk cId="2317889955" sldId="258"/>
+        </pc:sldMkLst>
+        <pc:picChg chg="mod">
+          <ac:chgData name="Gudukbay, Gulsum" userId="33ab478b-42a3-4d08-ae05-3f67cf1d32a2" providerId="ADAL" clId="{27E69447-91EA-4D01-AF66-70A6FC4BA94F}" dt="2018-11-28T20:46:27.139" v="51" actId="1076"/>
+          <ac:picMkLst>
+            <pc:docMk/>
+            <pc:sldMk cId="2317889955" sldId="258"/>
+            <ac:picMk id="3" creationId="{E93B996E-0136-494E-B826-78C6EC9A6044}"/>
+          </ac:picMkLst>
+        </pc:picChg>
+      </pc:sldChg>
+      <pc:sldChg chg="setBg">
+        <pc:chgData name="Gudukbay, Gulsum" userId="33ab478b-42a3-4d08-ae05-3f67cf1d32a2" providerId="ADAL" clId="{27E69447-91EA-4D01-AF66-70A6FC4BA94F}" dt="2018-11-28T21:14:30.699" v="95"/>
+        <pc:sldMkLst>
+          <pc:docMk/>
+          <pc:sldMk cId="3506399184" sldId="259"/>
+        </pc:sldMkLst>
+      </pc:sldChg>
+      <pc:sldChg chg="setBg">
+        <pc:chgData name="Gudukbay, Gulsum" userId="33ab478b-42a3-4d08-ae05-3f67cf1d32a2" providerId="ADAL" clId="{27E69447-91EA-4D01-AF66-70A6FC4BA94F}" dt="2018-11-28T21:14:30.699" v="95"/>
+        <pc:sldMkLst>
+          <pc:docMk/>
+          <pc:sldMk cId="2347409190" sldId="260"/>
+        </pc:sldMkLst>
+      </pc:sldChg>
+      <pc:sldChg chg="setBg">
+        <pc:chgData name="Gudukbay, Gulsum" userId="33ab478b-42a3-4d08-ae05-3f67cf1d32a2" providerId="ADAL" clId="{27E69447-91EA-4D01-AF66-70A6FC4BA94F}" dt="2018-11-28T21:14:30.699" v="95"/>
+        <pc:sldMkLst>
+          <pc:docMk/>
+          <pc:sldMk cId="3069383323" sldId="261"/>
+        </pc:sldMkLst>
+      </pc:sldChg>
+      <pc:sldChg chg="setBg">
+        <pc:chgData name="Gudukbay, Gulsum" userId="33ab478b-42a3-4d08-ae05-3f67cf1d32a2" providerId="ADAL" clId="{27E69447-91EA-4D01-AF66-70A6FC4BA94F}" dt="2018-11-28T21:14:30.699" v="95"/>
+        <pc:sldMkLst>
+          <pc:docMk/>
+          <pc:sldMk cId="3660655663" sldId="262"/>
+        </pc:sldMkLst>
+      </pc:sldChg>
+      <pc:sldChg chg="setBg">
+        <pc:chgData name="Gudukbay, Gulsum" userId="33ab478b-42a3-4d08-ae05-3f67cf1d32a2" providerId="ADAL" clId="{27E69447-91EA-4D01-AF66-70A6FC4BA94F}" dt="2018-11-28T21:14:30.699" v="95"/>
+        <pc:sldMkLst>
+          <pc:docMk/>
+          <pc:sldMk cId="453171510" sldId="263"/>
+        </pc:sldMkLst>
+      </pc:sldChg>
+      <pc:sldChg chg="setBg">
+        <pc:chgData name="Gudukbay, Gulsum" userId="33ab478b-42a3-4d08-ae05-3f67cf1d32a2" providerId="ADAL" clId="{27E69447-91EA-4D01-AF66-70A6FC4BA94F}" dt="2018-11-28T21:14:30.699" v="95"/>
+        <pc:sldMkLst>
+          <pc:docMk/>
+          <pc:sldMk cId="3795526922" sldId="264"/>
+        </pc:sldMkLst>
+      </pc:sldChg>
+      <pc:sldChg chg="addSp delSp modSp setBg">
+        <pc:chgData name="Gudukbay, Gulsum" userId="33ab478b-42a3-4d08-ae05-3f67cf1d32a2" providerId="ADAL" clId="{27E69447-91EA-4D01-AF66-70A6FC4BA94F}" dt="2018-11-28T21:14:30.699" v="95"/>
+        <pc:sldMkLst>
+          <pc:docMk/>
+          <pc:sldMk cId="1561767516" sldId="265"/>
+        </pc:sldMkLst>
+        <pc:graphicFrameChg chg="add">
+          <ac:chgData name="Gudukbay, Gulsum" userId="33ab478b-42a3-4d08-ae05-3f67cf1d32a2" providerId="ADAL" clId="{27E69447-91EA-4D01-AF66-70A6FC4BA94F}" dt="2018-11-28T20:59:27.264" v="52"/>
+          <ac:graphicFrameMkLst>
+            <pc:docMk/>
+            <pc:sldMk cId="1561767516" sldId="265"/>
+            <ac:graphicFrameMk id="2" creationId="{475D04E1-1B33-4E65-813E-F14BD5306BB2}"/>
+          </ac:graphicFrameMkLst>
+        </pc:graphicFrameChg>
+        <pc:graphicFrameChg chg="add">
+          <ac:chgData name="Gudukbay, Gulsum" userId="33ab478b-42a3-4d08-ae05-3f67cf1d32a2" providerId="ADAL" clId="{27E69447-91EA-4D01-AF66-70A6FC4BA94F}" dt="2018-11-28T21:00:54.655" v="59"/>
+          <ac:graphicFrameMkLst>
+            <pc:docMk/>
+            <pc:sldMk cId="1561767516" sldId="265"/>
+            <ac:graphicFrameMk id="4" creationId="{475D04E1-1B33-4E65-813E-F14BD5306BB2}"/>
+          </ac:graphicFrameMkLst>
+        </pc:graphicFrameChg>
+        <pc:graphicFrameChg chg="add">
+          <ac:chgData name="Gudukbay, Gulsum" userId="33ab478b-42a3-4d08-ae05-3f67cf1d32a2" providerId="ADAL" clId="{27E69447-91EA-4D01-AF66-70A6FC4BA94F}" dt="2018-11-28T21:03:13.626" v="60"/>
+          <ac:graphicFrameMkLst>
+            <pc:docMk/>
+            <pc:sldMk cId="1561767516" sldId="265"/>
+            <ac:graphicFrameMk id="5" creationId="{475D04E1-1B33-4E65-813E-F14BD5306BB2}"/>
+          </ac:graphicFrameMkLst>
+        </pc:graphicFrameChg>
+        <pc:graphicFrameChg chg="add">
+          <ac:chgData name="Gudukbay, Gulsum" userId="33ab478b-42a3-4d08-ae05-3f67cf1d32a2" providerId="ADAL" clId="{27E69447-91EA-4D01-AF66-70A6FC4BA94F}" dt="2018-11-28T21:08:45.477" v="75"/>
+          <ac:graphicFrameMkLst>
+            <pc:docMk/>
+            <pc:sldMk cId="1561767516" sldId="265"/>
+            <ac:graphicFrameMk id="7" creationId="{475D04E1-1B33-4E65-813E-F14BD5306BB2}"/>
+          </ac:graphicFrameMkLst>
+        </pc:graphicFrameChg>
+        <pc:picChg chg="add del">
+          <ac:chgData name="Gudukbay, Gulsum" userId="33ab478b-42a3-4d08-ae05-3f67cf1d32a2" providerId="ADAL" clId="{27E69447-91EA-4D01-AF66-70A6FC4BA94F}" dt="2018-11-28T21:00:12.203" v="58" actId="478"/>
+          <ac:picMkLst>
+            <pc:docMk/>
+            <pc:sldMk cId="1561767516" sldId="265"/>
+            <ac:picMk id="3" creationId="{CE1BCCB0-5830-4308-8B4A-DA09A6E94666}"/>
+          </ac:picMkLst>
+        </pc:picChg>
+        <pc:picChg chg="add del mod">
+          <ac:chgData name="Gudukbay, Gulsum" userId="33ab478b-42a3-4d08-ae05-3f67cf1d32a2" providerId="ADAL" clId="{27E69447-91EA-4D01-AF66-70A6FC4BA94F}" dt="2018-11-28T21:08:05.922" v="74" actId="478"/>
+          <ac:picMkLst>
+            <pc:docMk/>
+            <pc:sldMk cId="1561767516" sldId="265"/>
+            <ac:picMk id="6" creationId="{2560B354-D8B8-4F26-913A-297CE3B2755B}"/>
+          </ac:picMkLst>
+        </pc:picChg>
+        <pc:picChg chg="add mod">
+          <ac:chgData name="Gudukbay, Gulsum" userId="33ab478b-42a3-4d08-ae05-3f67cf1d32a2" providerId="ADAL" clId="{27E69447-91EA-4D01-AF66-70A6FC4BA94F}" dt="2018-11-28T21:08:59.494" v="78" actId="14100"/>
+          <ac:picMkLst>
+            <pc:docMk/>
+            <pc:sldMk cId="1561767516" sldId="265"/>
+            <ac:picMk id="8" creationId="{DAB4F0E6-C363-424E-8220-88833C7ACE63}"/>
+          </ac:picMkLst>
+        </pc:picChg>
+      </pc:sldChg>
+      <pc:sldChg chg="add del">
+        <pc:chgData name="Gudukbay, Gulsum" userId="33ab478b-42a3-4d08-ae05-3f67cf1d32a2" providerId="ADAL" clId="{27E69447-91EA-4D01-AF66-70A6FC4BA94F}" dt="2018-11-28T20:38:30.683" v="1"/>
+        <pc:sldMkLst>
+          <pc:docMk/>
+          <pc:sldMk cId="2129047087" sldId="266"/>
+        </pc:sldMkLst>
+      </pc:sldChg>
+      <pc:sldChg chg="addSp modSp add">
+        <pc:chgData name="Gudukbay, Gulsum" userId="33ab478b-42a3-4d08-ae05-3f67cf1d32a2" providerId="ADAL" clId="{27E69447-91EA-4D01-AF66-70A6FC4BA94F}" dt="2018-11-28T21:13:56.709" v="94" actId="113"/>
+        <pc:sldMkLst>
+          <pc:docMk/>
+          <pc:sldMk cId="2264776561" sldId="266"/>
+        </pc:sldMkLst>
+        <pc:spChg chg="mod">
+          <ac:chgData name="Gudukbay, Gulsum" userId="33ab478b-42a3-4d08-ae05-3f67cf1d32a2" providerId="ADAL" clId="{27E69447-91EA-4D01-AF66-70A6FC4BA94F}" dt="2018-11-28T21:13:56.709" v="94" actId="113"/>
+          <ac:spMkLst>
+            <pc:docMk/>
+            <pc:sldMk cId="2264776561" sldId="266"/>
+            <ac:spMk id="2" creationId="{1CE7EA1D-3D98-4FDA-9942-F9A3C8B5AE33}"/>
+          </ac:spMkLst>
+        </pc:spChg>
+        <pc:spChg chg="mod">
+          <ac:chgData name="Gudukbay, Gulsum" userId="33ab478b-42a3-4d08-ae05-3f67cf1d32a2" providerId="ADAL" clId="{27E69447-91EA-4D01-AF66-70A6FC4BA94F}" dt="2018-11-28T21:13:56.709" v="94" actId="113"/>
+          <ac:spMkLst>
+            <pc:docMk/>
+            <pc:sldMk cId="2264776561" sldId="266"/>
+            <ac:spMk id="3" creationId="{F501072F-B26B-4179-AD13-21DC6E071FA6}"/>
+          </ac:spMkLst>
+        </pc:spChg>
+        <pc:graphicFrameChg chg="add mod modGraphic">
+          <ac:chgData name="Gudukbay, Gulsum" userId="33ab478b-42a3-4d08-ae05-3f67cf1d32a2" providerId="ADAL" clId="{27E69447-91EA-4D01-AF66-70A6FC4BA94F}" dt="2018-11-28T21:13:42.355" v="93"/>
+          <ac:graphicFrameMkLst>
+            <pc:docMk/>
+            <pc:sldMk cId="2264776561" sldId="266"/>
+            <ac:graphicFrameMk id="4" creationId="{C8963D07-8EEE-452E-852C-D4A4789142A8}"/>
+          </ac:graphicFrameMkLst>
+        </pc:graphicFrameChg>
+      </pc:sldChg>
+      <pc:sldChg chg="addSp delSp modSp add setBg">
+        <pc:chgData name="Gudukbay, Gulsum" userId="33ab478b-42a3-4d08-ae05-3f67cf1d32a2" providerId="ADAL" clId="{27E69447-91EA-4D01-AF66-70A6FC4BA94F}" dt="2018-11-28T21:14:30.699" v="95"/>
+        <pc:sldMkLst>
+          <pc:docMk/>
+          <pc:sldMk cId="609321786" sldId="267"/>
+        </pc:sldMkLst>
+        <pc:graphicFrameChg chg="add">
+          <ac:chgData name="Gudukbay, Gulsum" userId="33ab478b-42a3-4d08-ae05-3f67cf1d32a2" providerId="ADAL" clId="{27E69447-91EA-4D01-AF66-70A6FC4BA94F}" dt="2018-11-28T21:04:20.542" v="66"/>
+          <ac:graphicFrameMkLst>
+            <pc:docMk/>
+            <pc:sldMk cId="609321786" sldId="267"/>
+            <ac:graphicFrameMk id="2" creationId="{F8E834D4-C3A8-4689-AC08-1EA71FC97BC8}"/>
+          </ac:graphicFrameMkLst>
+        </pc:graphicFrameChg>
+        <pc:graphicFrameChg chg="add">
+          <ac:chgData name="Gudukbay, Gulsum" userId="33ab478b-42a3-4d08-ae05-3f67cf1d32a2" providerId="ADAL" clId="{27E69447-91EA-4D01-AF66-70A6FC4BA94F}" dt="2018-11-28T21:09:14.560" v="80"/>
+          <ac:graphicFrameMkLst>
+            <pc:docMk/>
+            <pc:sldMk cId="609321786" sldId="267"/>
+            <ac:graphicFrameMk id="4" creationId="{F8E834D4-C3A8-4689-AC08-1EA71FC97BC8}"/>
+          </ac:graphicFrameMkLst>
+        </pc:graphicFrameChg>
+        <pc:picChg chg="add del mod">
+          <ac:chgData name="Gudukbay, Gulsum" userId="33ab478b-42a3-4d08-ae05-3f67cf1d32a2" providerId="ADAL" clId="{27E69447-91EA-4D01-AF66-70A6FC4BA94F}" dt="2018-11-28T21:09:02.914" v="79" actId="478"/>
+          <ac:picMkLst>
+            <pc:docMk/>
+            <pc:sldMk cId="609321786" sldId="267"/>
+            <ac:picMk id="3" creationId="{C89B3FC1-1721-4E41-ACAF-0EE1D41A1646}"/>
+          </ac:picMkLst>
+        </pc:picChg>
+        <pc:picChg chg="add mod">
+          <ac:chgData name="Gudukbay, Gulsum" userId="33ab478b-42a3-4d08-ae05-3f67cf1d32a2" providerId="ADAL" clId="{27E69447-91EA-4D01-AF66-70A6FC4BA94F}" dt="2018-11-28T21:10:30.531" v="92" actId="14100"/>
+          <ac:picMkLst>
+            <pc:docMk/>
+            <pc:sldMk cId="609321786" sldId="267"/>
+            <ac:picMk id="5" creationId="{063ED534-33A9-4856-8579-6425D093B911}"/>
+          </ac:picMkLst>
+        </pc:picChg>
+      </pc:sldChg>
+      <pc:sldChg chg="addSp delSp modSp add setBg">
+        <pc:chgData name="Gudukbay, Gulsum" userId="33ab478b-42a3-4d08-ae05-3f67cf1d32a2" providerId="ADAL" clId="{27E69447-91EA-4D01-AF66-70A6FC4BA94F}" dt="2018-11-28T21:14:30.699" v="95"/>
+        <pc:sldMkLst>
+          <pc:docMk/>
+          <pc:sldMk cId="4228326820" sldId="268"/>
+        </pc:sldMkLst>
+        <pc:graphicFrameChg chg="add">
+          <ac:chgData name="Gudukbay, Gulsum" userId="33ab478b-42a3-4d08-ae05-3f67cf1d32a2" providerId="ADAL" clId="{27E69447-91EA-4D01-AF66-70A6FC4BA94F}" dt="2018-11-28T21:05:14.574" v="72"/>
+          <ac:graphicFrameMkLst>
+            <pc:docMk/>
+            <pc:sldMk cId="4228326820" sldId="268"/>
+            <ac:graphicFrameMk id="2" creationId="{70372529-5000-4F2F-AB5E-58BA5F436BF4}"/>
+          </ac:graphicFrameMkLst>
+        </pc:graphicFrameChg>
+        <pc:graphicFrameChg chg="add del mod">
+          <ac:chgData name="Gudukbay, Gulsum" userId="33ab478b-42a3-4d08-ae05-3f67cf1d32a2" providerId="ADAL" clId="{27E69447-91EA-4D01-AF66-70A6FC4BA94F}" dt="2018-11-28T21:10:04.290" v="85" actId="478"/>
+          <ac:graphicFrameMkLst>
+            <pc:docMk/>
+            <pc:sldMk cId="4228326820" sldId="268"/>
+            <ac:graphicFrameMk id="4" creationId="{70372529-5000-4F2F-AB5E-58BA5F436BF4}"/>
+          </ac:graphicFrameMkLst>
+        </pc:graphicFrameChg>
+        <pc:graphicFrameChg chg="add">
+          <ac:chgData name="Gudukbay, Gulsum" userId="33ab478b-42a3-4d08-ae05-3f67cf1d32a2" providerId="ADAL" clId="{27E69447-91EA-4D01-AF66-70A6FC4BA94F}" dt="2018-11-28T21:10:08.793" v="86"/>
+          <ac:graphicFrameMkLst>
+            <pc:docMk/>
+            <pc:sldMk cId="4228326820" sldId="268"/>
+            <ac:graphicFrameMk id="5" creationId="{70372529-5000-4F2F-AB5E-58BA5F436BF4}"/>
+          </ac:graphicFrameMkLst>
+        </pc:graphicFrameChg>
+        <pc:picChg chg="add del">
+          <ac:chgData name="Gudukbay, Gulsum" userId="33ab478b-42a3-4d08-ae05-3f67cf1d32a2" providerId="ADAL" clId="{27E69447-91EA-4D01-AF66-70A6FC4BA94F}" dt="2018-11-28T21:09:25.287" v="82" actId="478"/>
+          <ac:picMkLst>
+            <pc:docMk/>
+            <pc:sldMk cId="4228326820" sldId="268"/>
+            <ac:picMk id="3" creationId="{87D2D591-7A48-418E-94F4-4344B328E488}"/>
+          </ac:picMkLst>
+        </pc:picChg>
+        <pc:picChg chg="add mod">
+          <ac:chgData name="Gudukbay, Gulsum" userId="33ab478b-42a3-4d08-ae05-3f67cf1d32a2" providerId="ADAL" clId="{27E69447-91EA-4D01-AF66-70A6FC4BA94F}" dt="2018-11-28T21:10:21.289" v="89" actId="14100"/>
+          <ac:picMkLst>
+            <pc:docMk/>
+            <pc:sldMk cId="4228326820" sldId="268"/>
+            <ac:picMk id="6" creationId="{4DE7C741-AD84-4ADC-A450-270E13A1CA25}"/>
+          </ac:picMkLst>
+        </pc:picChg>
+      </pc:sldChg>
+    </pc:docChg>
+  </pc:docChgLst>
+</pc:chgInfo>
+</file>
+
 <file path=ppt/slideLayouts/slideLayout1.xml><?xml version="1.0" encoding="utf-8"?>
-<p:sldLayout xmlns:a="http://schemas.openxmlformats.org/drawingml/2006/main" xmlns:r="http://schemas.openxmlformats.org/officeDocument/2006/relationships" xmlns:p="http://schemas.openxmlformats.org/presentationml/2006/main" type="title" preserve="1">
+<p:sldLayout xmlns:a="http://schemas.openxmlformats.org/drawingml/2006/main" xmlns:r="http://schemas.openxmlformats.org/officeDocument/2006/relationships" xmlns:p="http://schemas.openxmlformats.org/presentationml/2006/main" showMasterSp="0" type="title" preserve="1">
   <p:cSld name="Title Slide">
+    <p:bg>
+      <p:bgPr>
+        <a:solidFill>
+          <a:schemeClr val="bg2">
+            <a:lumMod val="75000"/>
+          </a:schemeClr>
+        </a:solidFill>
+        <a:effectLst/>
+      </p:bgPr>
+    </p:bg>
     <p:spTree>
       <p:nvGrpSpPr>
         <p:cNvPr id="1" name=""/>
@@ -135,13 +420,7 @@
       </p:grpSpPr>
       <p:sp>
         <p:nvSpPr>
-          <p:cNvPr id="2" name="Title 1">
-            <a:extLst>
-              <a:ext uri="{FF2B5EF4-FFF2-40B4-BE49-F238E27FC236}">
-                <a16:creationId xmlns:a16="http://schemas.microsoft.com/office/drawing/2014/main" id="{EF285FFC-E6C8-44F6-8156-22B36A6C6925}"/>
-              </a:ext>
-            </a:extLst>
-          </p:cNvPr>
+          <p:cNvPr id="2" name="Title 1"/>
           <p:cNvSpPr>
             <a:spLocks noGrp="1"/>
           </p:cNvSpPr>
@@ -151,15 +430,24 @@
         </p:nvSpPr>
         <p:spPr>
           <a:xfrm>
-            <a:off x="1524000" y="1122363"/>
-            <a:ext cx="9144000" cy="2387600"/>
+            <a:off x="1261872" y="758952"/>
+            <a:ext cx="9418320" cy="4041648"/>
           </a:xfrm>
         </p:spPr>
         <p:txBody>
-          <a:bodyPr anchor="b"/>
+          <a:bodyPr anchor="b">
+            <a:normAutofit/>
+          </a:bodyPr>
           <a:lstStyle>
-            <a:lvl1pPr algn="ctr">
-              <a:defRPr sz="6000"/>
+            <a:lvl1pPr algn="l">
+              <a:lnSpc>
+                <a:spcPct val="85000"/>
+              </a:lnSpc>
+              <a:defRPr sz="7200" baseline="0">
+                <a:solidFill>
+                  <a:schemeClr val="tx1"/>
+                </a:solidFill>
+              </a:defRPr>
             </a:lvl1pPr>
           </a:lstStyle>
           <a:p>
@@ -167,18 +455,13 @@
               <a:rPr lang="en-US"/>
               <a:t>Click to edit Master title style</a:t>
             </a:r>
-          </a:p>
-        </p:txBody>
-      </p:sp>
-      <p:sp>
-        <p:nvSpPr>
-          <p:cNvPr id="3" name="Subtitle 2">
-            <a:extLst>
-              <a:ext uri="{FF2B5EF4-FFF2-40B4-BE49-F238E27FC236}">
-                <a16:creationId xmlns:a16="http://schemas.microsoft.com/office/drawing/2014/main" id="{08F66F64-71E3-495A-AFED-69AEC082C5D9}"/>
-              </a:ext>
-            </a:extLst>
-          </p:cNvPr>
+            <a:endParaRPr lang="en-US" dirty="0"/>
+          </a:p>
+        </p:txBody>
+      </p:sp>
+      <p:sp>
+        <p:nvSpPr>
+          <p:cNvPr id="3" name="Subtitle 2"/>
           <p:cNvSpPr>
             <a:spLocks noGrp="1"/>
           </p:cNvSpPr>
@@ -188,78 +471,91 @@
         </p:nvSpPr>
         <p:spPr>
           <a:xfrm>
-            <a:off x="1524000" y="3602038"/>
-            <a:ext cx="9144000" cy="1655762"/>
+            <a:off x="1261872" y="4800600"/>
+            <a:ext cx="9418320" cy="1691640"/>
           </a:xfrm>
         </p:spPr>
         <p:txBody>
+          <a:bodyPr>
+            <a:normAutofit/>
+          </a:bodyPr>
+          <a:lstStyle>
+            <a:lvl1pPr marL="0" indent="0" algn="l">
+              <a:buNone/>
+              <a:defRPr sz="2200" baseline="0">
+                <a:solidFill>
+                  <a:schemeClr val="tx1">
+                    <a:lumMod val="75000"/>
+                  </a:schemeClr>
+                </a:solidFill>
+              </a:defRPr>
+            </a:lvl1pPr>
+            <a:lvl2pPr marL="457200" indent="0" algn="ctr">
+              <a:buNone/>
+              <a:defRPr sz="2200"/>
+            </a:lvl2pPr>
+            <a:lvl3pPr marL="914400" indent="0" algn="ctr">
+              <a:buNone/>
+              <a:defRPr sz="2200"/>
+            </a:lvl3pPr>
+            <a:lvl4pPr marL="1371600" indent="0" algn="ctr">
+              <a:buNone/>
+              <a:defRPr sz="2000"/>
+            </a:lvl4pPr>
+            <a:lvl5pPr marL="1828800" indent="0" algn="ctr">
+              <a:buNone/>
+              <a:defRPr sz="2000"/>
+            </a:lvl5pPr>
+            <a:lvl6pPr marL="2286000" indent="0" algn="ctr">
+              <a:buNone/>
+              <a:defRPr sz="2000"/>
+            </a:lvl6pPr>
+            <a:lvl7pPr marL="2743200" indent="0" algn="ctr">
+              <a:buNone/>
+              <a:defRPr sz="2000"/>
+            </a:lvl7pPr>
+            <a:lvl8pPr marL="3200400" indent="0" algn="ctr">
+              <a:buNone/>
+              <a:defRPr sz="2000"/>
+            </a:lvl8pPr>
+            <a:lvl9pPr marL="3657600" indent="0" algn="ctr">
+              <a:buNone/>
+              <a:defRPr sz="2000"/>
+            </a:lvl9pPr>
+          </a:lstStyle>
+          <a:p>
+            <a:r>
+              <a:rPr lang="en-US"/>
+              <a:t>Click to edit Master subtitle style</a:t>
+            </a:r>
+            <a:endParaRPr lang="en-US" dirty="0"/>
+          </a:p>
+        </p:txBody>
+      </p:sp>
+      <p:sp>
+        <p:nvSpPr>
+          <p:cNvPr id="4" name="Date Placeholder 3"/>
+          <p:cNvSpPr>
+            <a:spLocks noGrp="1"/>
+          </p:cNvSpPr>
+          <p:nvPr>
+            <p:ph type="dt" sz="half" idx="10"/>
+          </p:nvPr>
+        </p:nvSpPr>
+        <p:spPr/>
+        <p:txBody>
           <a:bodyPr/>
           <a:lstStyle>
-            <a:lvl1pPr marL="0" indent="0" algn="ctr">
-              <a:buNone/>
-              <a:defRPr sz="2400"/>
+            <a:lvl1pPr>
+              <a:defRPr>
+                <a:solidFill>
+                  <a:schemeClr val="tx1">
+                    <a:lumMod val="50000"/>
+                  </a:schemeClr>
+                </a:solidFill>
+              </a:defRPr>
             </a:lvl1pPr>
-            <a:lvl2pPr marL="457200" indent="0" algn="ctr">
-              <a:buNone/>
-              <a:defRPr sz="2000"/>
-            </a:lvl2pPr>
-            <a:lvl3pPr marL="914400" indent="0" algn="ctr">
-              <a:buNone/>
-              <a:defRPr sz="1800"/>
-            </a:lvl3pPr>
-            <a:lvl4pPr marL="1371600" indent="0" algn="ctr">
-              <a:buNone/>
-              <a:defRPr sz="1600"/>
-            </a:lvl4pPr>
-            <a:lvl5pPr marL="1828800" indent="0" algn="ctr">
-              <a:buNone/>
-              <a:defRPr sz="1600"/>
-            </a:lvl5pPr>
-            <a:lvl6pPr marL="2286000" indent="0" algn="ctr">
-              <a:buNone/>
-              <a:defRPr sz="1600"/>
-            </a:lvl6pPr>
-            <a:lvl7pPr marL="2743200" indent="0" algn="ctr">
-              <a:buNone/>
-              <a:defRPr sz="1600"/>
-            </a:lvl7pPr>
-            <a:lvl8pPr marL="3200400" indent="0" algn="ctr">
-              <a:buNone/>
-              <a:defRPr sz="1600"/>
-            </a:lvl8pPr>
-            <a:lvl9pPr marL="3657600" indent="0" algn="ctr">
-              <a:buNone/>
-              <a:defRPr sz="1600"/>
-            </a:lvl9pPr>
           </a:lstStyle>
-          <a:p>
-            <a:r>
-              <a:rPr lang="en-US"/>
-              <a:t>Click to edit Master subtitle style</a:t>
-            </a:r>
-          </a:p>
-        </p:txBody>
-      </p:sp>
-      <p:sp>
-        <p:nvSpPr>
-          <p:cNvPr id="4" name="Date Placeholder 3">
-            <a:extLst>
-              <a:ext uri="{FF2B5EF4-FFF2-40B4-BE49-F238E27FC236}">
-                <a16:creationId xmlns:a16="http://schemas.microsoft.com/office/drawing/2014/main" id="{1F701801-44FF-4BCA-A898-8AC78207016B}"/>
-              </a:ext>
-            </a:extLst>
-          </p:cNvPr>
-          <p:cNvSpPr>
-            <a:spLocks noGrp="1"/>
-          </p:cNvSpPr>
-          <p:nvPr>
-            <p:ph type="dt" sz="half" idx="10"/>
-          </p:nvPr>
-        </p:nvSpPr>
-        <p:spPr/>
-        <p:txBody>
-          <a:bodyPr/>
-          <a:lstStyle/>
           <a:p>
             <a:fld id="{66011186-D425-4A7F-A0C9-E895AD7CC7DC}" type="datetimeFigureOut">
               <a:rPr lang="en-US" smtClean="0"/>
@@ -271,13 +567,7 @@
       </p:sp>
       <p:sp>
         <p:nvSpPr>
-          <p:cNvPr id="5" name="Footer Placeholder 4">
-            <a:extLst>
-              <a:ext uri="{FF2B5EF4-FFF2-40B4-BE49-F238E27FC236}">
-                <a16:creationId xmlns:a16="http://schemas.microsoft.com/office/drawing/2014/main" id="{6883BEEA-A153-4C32-AB6D-9E4E3D47ABE6}"/>
-              </a:ext>
-            </a:extLst>
-          </p:cNvPr>
+          <p:cNvPr id="5" name="Footer Placeholder 4"/>
           <p:cNvSpPr>
             <a:spLocks noGrp="1"/>
           </p:cNvSpPr>
@@ -288,7 +578,17 @@
         <p:spPr/>
         <p:txBody>
           <a:bodyPr/>
-          <a:lstStyle/>
+          <a:lstStyle>
+            <a:lvl1pPr>
+              <a:defRPr>
+                <a:solidFill>
+                  <a:schemeClr val="tx1">
+                    <a:lumMod val="65000"/>
+                  </a:schemeClr>
+                </a:solidFill>
+              </a:defRPr>
+            </a:lvl1pPr>
+          </a:lstStyle>
           <a:p>
             <a:endParaRPr lang="en-US"/>
           </a:p>
@@ -296,13 +596,7 @@
       </p:sp>
       <p:sp>
         <p:nvSpPr>
-          <p:cNvPr id="6" name="Slide Number Placeholder 5">
-            <a:extLst>
-              <a:ext uri="{FF2B5EF4-FFF2-40B4-BE49-F238E27FC236}">
-                <a16:creationId xmlns:a16="http://schemas.microsoft.com/office/drawing/2014/main" id="{5E695170-2852-40B6-958D-CCB3EF85CF21}"/>
-              </a:ext>
-            </a:extLst>
-          </p:cNvPr>
+          <p:cNvPr id="6" name="Slide Number Placeholder 5"/>
           <p:cNvSpPr>
             <a:spLocks noGrp="1"/>
           </p:cNvSpPr>
@@ -313,7 +607,17 @@
         <p:spPr/>
         <p:txBody>
           <a:bodyPr/>
-          <a:lstStyle/>
+          <a:lstStyle>
+            <a:lvl1pPr>
+              <a:defRPr>
+                <a:solidFill>
+                  <a:schemeClr val="tx1">
+                    <a:lumMod val="65000"/>
+                  </a:schemeClr>
+                </a:solidFill>
+              </a:defRPr>
+            </a:lvl1pPr>
+          </a:lstStyle>
           <a:p>
             <a:fld id="{96E3326B-10C4-45D3-914A-DBB200BE1838}" type="slidenum">
               <a:rPr lang="en-US" smtClean="0"/>
@@ -323,15 +627,53 @@
           </a:p>
         </p:txBody>
       </p:sp>
+      <p:sp>
+        <p:nvSpPr>
+          <p:cNvPr id="7" name="Rectangle 6"/>
+          <p:cNvSpPr/>
+          <p:nvPr/>
+        </p:nvSpPr>
+        <p:spPr>
+          <a:xfrm>
+            <a:off x="0" y="0"/>
+            <a:ext cx="457200" cy="6858000"/>
+          </a:xfrm>
+          <a:prstGeom prst="rect">
+            <a:avLst/>
+          </a:prstGeom>
+          <a:solidFill>
+            <a:schemeClr val="accent1"/>
+          </a:solidFill>
+          <a:ln>
+            <a:noFill/>
+          </a:ln>
+        </p:spPr>
+        <p:style>
+          <a:lnRef idx="2">
+            <a:schemeClr val="accent1">
+              <a:shade val="50000"/>
+            </a:schemeClr>
+          </a:lnRef>
+          <a:fillRef idx="1">
+            <a:schemeClr val="accent1"/>
+          </a:fillRef>
+          <a:effectRef idx="0">
+            <a:schemeClr val="accent1"/>
+          </a:effectRef>
+          <a:fontRef idx="minor">
+            <a:schemeClr val="lt1"/>
+          </a:fontRef>
+        </p:style>
+      </p:sp>
     </p:spTree>
     <p:extLst>
       <p:ext uri="{BB962C8B-B14F-4D97-AF65-F5344CB8AC3E}">
-        <p14:creationId xmlns:p14="http://schemas.microsoft.com/office/powerpoint/2010/main" val="3688928495"/>
+        <p14:creationId xmlns:p14="http://schemas.microsoft.com/office/powerpoint/2010/main" val="2521029560"/>
       </p:ext>
     </p:extLst>
   </p:cSld>
   <p:clrMapOvr>
-    <a:masterClrMapping/>
+    <a:overrideClrMapping bg1="dk1" tx1="lt1" bg2="dk2" tx2="lt2" accent1="accent1" accent2="accent2" accent3="accent3" accent4="accent4" accent5="accent5" accent6="accent6" hlink="hlink" folHlink="folHlink"/>
   </p:clrMapOvr>
 </p:sldLayout>
 </file>
@@ -355,13 +697,7 @@
       </p:grpSpPr>
       <p:sp>
         <p:nvSpPr>
-          <p:cNvPr id="2" name="Title 1">
-            <a:extLst>
-              <a:ext uri="{FF2B5EF4-FFF2-40B4-BE49-F238E27FC236}">
-                <a16:creationId xmlns:a16="http://schemas.microsoft.com/office/drawing/2014/main" id="{58BDD1CD-1C7A-4D45-8629-7B78CD73934B}"/>
-              </a:ext>
-            </a:extLst>
-          </p:cNvPr>
+          <p:cNvPr id="2" name="Title 1"/>
           <p:cNvSpPr>
             <a:spLocks noGrp="1"/>
           </p:cNvSpPr>
@@ -378,18 +714,13 @@
               <a:rPr lang="en-US"/>
               <a:t>Click to edit Master title style</a:t>
             </a:r>
-          </a:p>
-        </p:txBody>
-      </p:sp>
-      <p:sp>
-        <p:nvSpPr>
-          <p:cNvPr id="3" name="Vertical Text Placeholder 2">
-            <a:extLst>
-              <a:ext uri="{FF2B5EF4-FFF2-40B4-BE49-F238E27FC236}">
-                <a16:creationId xmlns:a16="http://schemas.microsoft.com/office/drawing/2014/main" id="{D3B32C18-8525-4727-81AE-F317E9F40E21}"/>
-              </a:ext>
-            </a:extLst>
-          </p:cNvPr>
+            <a:endParaRPr lang="en-US" dirty="0"/>
+          </a:p>
+        </p:txBody>
+      </p:sp>
+      <p:sp>
+        <p:nvSpPr>
+          <p:cNvPr id="3" name="Vertical Text Placeholder 2"/>
           <p:cNvSpPr>
             <a:spLocks noGrp="1"/>
           </p:cNvSpPr>
@@ -435,18 +766,13 @@
               <a:rPr lang="en-US"/>
               <a:t>Fifth level</a:t>
             </a:r>
-          </a:p>
-        </p:txBody>
-      </p:sp>
-      <p:sp>
-        <p:nvSpPr>
-          <p:cNvPr id="4" name="Date Placeholder 3">
-            <a:extLst>
-              <a:ext uri="{FF2B5EF4-FFF2-40B4-BE49-F238E27FC236}">
-                <a16:creationId xmlns:a16="http://schemas.microsoft.com/office/drawing/2014/main" id="{383270BB-D723-46E8-B4B2-4EACE17069E7}"/>
-              </a:ext>
-            </a:extLst>
-          </p:cNvPr>
+            <a:endParaRPr lang="en-US" dirty="0"/>
+          </a:p>
+        </p:txBody>
+      </p:sp>
+      <p:sp>
+        <p:nvSpPr>
+          <p:cNvPr id="4" name="Date Placeholder 3"/>
           <p:cNvSpPr>
             <a:spLocks noGrp="1"/>
           </p:cNvSpPr>
@@ -469,13 +795,7 @@
       </p:sp>
       <p:sp>
         <p:nvSpPr>
-          <p:cNvPr id="5" name="Footer Placeholder 4">
-            <a:extLst>
-              <a:ext uri="{FF2B5EF4-FFF2-40B4-BE49-F238E27FC236}">
-                <a16:creationId xmlns:a16="http://schemas.microsoft.com/office/drawing/2014/main" id="{46A45690-85C3-4547-8C23-805934CBF1AC}"/>
-              </a:ext>
-            </a:extLst>
-          </p:cNvPr>
+          <p:cNvPr id="5" name="Footer Placeholder 4"/>
           <p:cNvSpPr>
             <a:spLocks noGrp="1"/>
           </p:cNvSpPr>
@@ -494,13 +814,7 @@
       </p:sp>
       <p:sp>
         <p:nvSpPr>
-          <p:cNvPr id="6" name="Slide Number Placeholder 5">
-            <a:extLst>
-              <a:ext uri="{FF2B5EF4-FFF2-40B4-BE49-F238E27FC236}">
-                <a16:creationId xmlns:a16="http://schemas.microsoft.com/office/drawing/2014/main" id="{730C0D08-C6D6-4741-A58F-2D854534CCCF}"/>
-              </a:ext>
-            </a:extLst>
-          </p:cNvPr>
+          <p:cNvPr id="6" name="Slide Number Placeholder 5"/>
           <p:cNvSpPr>
             <a:spLocks noGrp="1"/>
           </p:cNvSpPr>
@@ -524,7 +838,7 @@
     </p:spTree>
     <p:extLst>
       <p:ext uri="{BB962C8B-B14F-4D97-AF65-F5344CB8AC3E}">
-        <p14:creationId xmlns:p14="http://schemas.microsoft.com/office/powerpoint/2010/main" val="433096274"/>
+        <p14:creationId xmlns:p14="http://schemas.microsoft.com/office/powerpoint/2010/main" val="3892236319"/>
       </p:ext>
     </p:extLst>
   </p:cSld>
@@ -553,13 +867,7 @@
       </p:grpSpPr>
       <p:sp>
         <p:nvSpPr>
-          <p:cNvPr id="2" name="Vertical Title 1">
-            <a:extLst>
-              <a:ext uri="{FF2B5EF4-FFF2-40B4-BE49-F238E27FC236}">
-                <a16:creationId xmlns:a16="http://schemas.microsoft.com/office/drawing/2014/main" id="{6D706F5B-1FF0-4823-AAC8-68ED2727493F}"/>
-              </a:ext>
-            </a:extLst>
-          </p:cNvPr>
+          <p:cNvPr id="2" name="Vertical Title 1"/>
           <p:cNvSpPr>
             <a:spLocks noGrp="1"/>
           </p:cNvSpPr>
@@ -569,8 +877,8 @@
         </p:nvSpPr>
         <p:spPr>
           <a:xfrm>
-            <a:off x="8724900" y="365125"/>
-            <a:ext cx="2628900" cy="5811838"/>
+            <a:off x="8648700" y="381000"/>
+            <a:ext cx="2476500" cy="5897562"/>
           </a:xfrm>
         </p:spPr>
         <p:txBody>
@@ -581,18 +889,13 @@
               <a:rPr lang="en-US"/>
               <a:t>Click to edit Master title style</a:t>
             </a:r>
-          </a:p>
-        </p:txBody>
-      </p:sp>
-      <p:sp>
-        <p:nvSpPr>
-          <p:cNvPr id="3" name="Vertical Text Placeholder 2">
-            <a:extLst>
-              <a:ext uri="{FF2B5EF4-FFF2-40B4-BE49-F238E27FC236}">
-                <a16:creationId xmlns:a16="http://schemas.microsoft.com/office/drawing/2014/main" id="{D8726FA3-3E45-407F-AF90-B60171F5E8F6}"/>
-              </a:ext>
-            </a:extLst>
-          </p:cNvPr>
+            <a:endParaRPr lang="en-US" dirty="0"/>
+          </a:p>
+        </p:txBody>
+      </p:sp>
+      <p:sp>
+        <p:nvSpPr>
+          <p:cNvPr id="3" name="Vertical Text Placeholder 2"/>
           <p:cNvSpPr>
             <a:spLocks noGrp="1"/>
           </p:cNvSpPr>
@@ -602,8 +905,8 @@
         </p:nvSpPr>
         <p:spPr>
           <a:xfrm>
-            <a:off x="838200" y="365125"/>
-            <a:ext cx="7734300" cy="5811838"/>
+            <a:off x="762000" y="381000"/>
+            <a:ext cx="7734300" cy="5897562"/>
           </a:xfrm>
         </p:spPr>
         <p:txBody>
@@ -643,18 +946,13 @@
               <a:rPr lang="en-US"/>
               <a:t>Fifth level</a:t>
             </a:r>
-          </a:p>
-        </p:txBody>
-      </p:sp>
-      <p:sp>
-        <p:nvSpPr>
-          <p:cNvPr id="4" name="Date Placeholder 3">
-            <a:extLst>
-              <a:ext uri="{FF2B5EF4-FFF2-40B4-BE49-F238E27FC236}">
-                <a16:creationId xmlns:a16="http://schemas.microsoft.com/office/drawing/2014/main" id="{47633EBA-2233-461A-8063-DA5E106A31CD}"/>
-              </a:ext>
-            </a:extLst>
-          </p:cNvPr>
+            <a:endParaRPr lang="en-US" dirty="0"/>
+          </a:p>
+        </p:txBody>
+      </p:sp>
+      <p:sp>
+        <p:nvSpPr>
+          <p:cNvPr id="4" name="Date Placeholder 3"/>
           <p:cNvSpPr>
             <a:spLocks noGrp="1"/>
           </p:cNvSpPr>
@@ -677,13 +975,7 @@
       </p:sp>
       <p:sp>
         <p:nvSpPr>
-          <p:cNvPr id="5" name="Footer Placeholder 4">
-            <a:extLst>
-              <a:ext uri="{FF2B5EF4-FFF2-40B4-BE49-F238E27FC236}">
-                <a16:creationId xmlns:a16="http://schemas.microsoft.com/office/drawing/2014/main" id="{DA38A598-37F0-4B41-ADFA-37D1443210AF}"/>
-              </a:ext>
-            </a:extLst>
-          </p:cNvPr>
+          <p:cNvPr id="5" name="Footer Placeholder 4"/>
           <p:cNvSpPr>
             <a:spLocks noGrp="1"/>
           </p:cNvSpPr>
@@ -702,13 +994,7 @@
       </p:sp>
       <p:sp>
         <p:nvSpPr>
-          <p:cNvPr id="6" name="Slide Number Placeholder 5">
-            <a:extLst>
-              <a:ext uri="{FF2B5EF4-FFF2-40B4-BE49-F238E27FC236}">
-                <a16:creationId xmlns:a16="http://schemas.microsoft.com/office/drawing/2014/main" id="{9D6BAE1C-3508-433F-9143-79E00689B5E9}"/>
-              </a:ext>
-            </a:extLst>
-          </p:cNvPr>
+          <p:cNvPr id="6" name="Slide Number Placeholder 5"/>
           <p:cNvSpPr>
             <a:spLocks noGrp="1"/>
           </p:cNvSpPr>
@@ -732,7 +1018,7 @@
     </p:spTree>
     <p:extLst>
       <p:ext uri="{BB962C8B-B14F-4D97-AF65-F5344CB8AC3E}">
-        <p14:creationId xmlns:p14="http://schemas.microsoft.com/office/powerpoint/2010/main" val="15483732"/>
+        <p14:creationId xmlns:p14="http://schemas.microsoft.com/office/powerpoint/2010/main" val="1686323089"/>
       </p:ext>
     </p:extLst>
   </p:cSld>
@@ -761,13 +1047,7 @@
       </p:grpSpPr>
       <p:sp>
         <p:nvSpPr>
-          <p:cNvPr id="2" name="Title 1">
-            <a:extLst>
-              <a:ext uri="{FF2B5EF4-FFF2-40B4-BE49-F238E27FC236}">
-                <a16:creationId xmlns:a16="http://schemas.microsoft.com/office/drawing/2014/main" id="{8AF10723-3278-459E-BF18-3FB84C78F4CC}"/>
-              </a:ext>
-            </a:extLst>
-          </p:cNvPr>
+          <p:cNvPr id="2" name="Title 1"/>
           <p:cNvSpPr>
             <a:spLocks noGrp="1"/>
           </p:cNvSpPr>
@@ -784,18 +1064,13 @@
               <a:rPr lang="en-US"/>
               <a:t>Click to edit Master title style</a:t>
             </a:r>
-          </a:p>
-        </p:txBody>
-      </p:sp>
-      <p:sp>
-        <p:nvSpPr>
-          <p:cNvPr id="3" name="Content Placeholder 2">
-            <a:extLst>
-              <a:ext uri="{FF2B5EF4-FFF2-40B4-BE49-F238E27FC236}">
-                <a16:creationId xmlns:a16="http://schemas.microsoft.com/office/drawing/2014/main" id="{DA1595FB-84C2-4057-8E44-59DA731EEF24}"/>
-              </a:ext>
-            </a:extLst>
-          </p:cNvPr>
+            <a:endParaRPr lang="en-US" dirty="0"/>
+          </a:p>
+        </p:txBody>
+      </p:sp>
+      <p:sp>
+        <p:nvSpPr>
+          <p:cNvPr id="3" name="Content Placeholder 2"/>
           <p:cNvSpPr>
             <a:spLocks noGrp="1"/>
           </p:cNvSpPr>
@@ -841,18 +1116,13 @@
               <a:rPr lang="en-US"/>
               <a:t>Fifth level</a:t>
             </a:r>
-          </a:p>
-        </p:txBody>
-      </p:sp>
-      <p:sp>
-        <p:nvSpPr>
-          <p:cNvPr id="4" name="Date Placeholder 3">
-            <a:extLst>
-              <a:ext uri="{FF2B5EF4-FFF2-40B4-BE49-F238E27FC236}">
-                <a16:creationId xmlns:a16="http://schemas.microsoft.com/office/drawing/2014/main" id="{AE16FC30-0738-4240-9F13-B09CE4878E1A}"/>
-              </a:ext>
-            </a:extLst>
-          </p:cNvPr>
+            <a:endParaRPr lang="en-US" dirty="0"/>
+          </a:p>
+        </p:txBody>
+      </p:sp>
+      <p:sp>
+        <p:nvSpPr>
+          <p:cNvPr id="4" name="Date Placeholder 3"/>
           <p:cNvSpPr>
             <a:spLocks noGrp="1"/>
           </p:cNvSpPr>
@@ -875,13 +1145,7 @@
       </p:sp>
       <p:sp>
         <p:nvSpPr>
-          <p:cNvPr id="5" name="Footer Placeholder 4">
-            <a:extLst>
-              <a:ext uri="{FF2B5EF4-FFF2-40B4-BE49-F238E27FC236}">
-                <a16:creationId xmlns:a16="http://schemas.microsoft.com/office/drawing/2014/main" id="{2E2A32DE-293B-45C3-A082-849CEBDD75E1}"/>
-              </a:ext>
-            </a:extLst>
-          </p:cNvPr>
+          <p:cNvPr id="5" name="Footer Placeholder 4"/>
           <p:cNvSpPr>
             <a:spLocks noGrp="1"/>
           </p:cNvSpPr>
@@ -900,13 +1164,7 @@
       </p:sp>
       <p:sp>
         <p:nvSpPr>
-          <p:cNvPr id="6" name="Slide Number Placeholder 5">
-            <a:extLst>
-              <a:ext uri="{FF2B5EF4-FFF2-40B4-BE49-F238E27FC236}">
-                <a16:creationId xmlns:a16="http://schemas.microsoft.com/office/drawing/2014/main" id="{EE58F790-A9F8-498E-A134-477E3250F4F9}"/>
-              </a:ext>
-            </a:extLst>
-          </p:cNvPr>
+          <p:cNvPr id="6" name="Slide Number Placeholder 5"/>
           <p:cNvSpPr>
             <a:spLocks noGrp="1"/>
           </p:cNvSpPr>
@@ -930,7 +1188,7 @@
     </p:spTree>
     <p:extLst>
       <p:ext uri="{BB962C8B-B14F-4D97-AF65-F5344CB8AC3E}">
-        <p14:creationId xmlns:p14="http://schemas.microsoft.com/office/powerpoint/2010/main" val="2683999729"/>
+        <p14:creationId xmlns:p14="http://schemas.microsoft.com/office/powerpoint/2010/main" val="3997909013"/>
       </p:ext>
     </p:extLst>
   </p:cSld>
@@ -959,13 +1217,7 @@
       </p:grpSpPr>
       <p:sp>
         <p:nvSpPr>
-          <p:cNvPr id="2" name="Title 1">
-            <a:extLst>
-              <a:ext uri="{FF2B5EF4-FFF2-40B4-BE49-F238E27FC236}">
-                <a16:creationId xmlns:a16="http://schemas.microsoft.com/office/drawing/2014/main" id="{D904AFF8-25C7-4FD3-B082-4AD67DB2C9D7}"/>
-              </a:ext>
-            </a:extLst>
-          </p:cNvPr>
+          <p:cNvPr id="2" name="Title 1"/>
           <p:cNvSpPr>
             <a:spLocks noGrp="1"/>
           </p:cNvSpPr>
@@ -975,15 +1227,20 @@
         </p:nvSpPr>
         <p:spPr>
           <a:xfrm>
-            <a:off x="831850" y="1709738"/>
-            <a:ext cx="10515600" cy="2852737"/>
+            <a:off x="1261872" y="758952"/>
+            <a:ext cx="9418320" cy="4041648"/>
           </a:xfrm>
         </p:spPr>
         <p:txBody>
-          <a:bodyPr anchor="b"/>
+          <a:bodyPr anchor="b">
+            <a:normAutofit/>
+          </a:bodyPr>
           <a:lstStyle>
             <a:lvl1pPr>
-              <a:defRPr sz="6000"/>
+              <a:lnSpc>
+                <a:spcPct val="85000"/>
+              </a:lnSpc>
+              <a:defRPr sz="7200" b="0"/>
             </a:lvl1pPr>
           </a:lstStyle>
           <a:p>
@@ -991,18 +1248,13 @@
               <a:rPr lang="en-US"/>
               <a:t>Click to edit Master title style</a:t>
             </a:r>
-          </a:p>
-        </p:txBody>
-      </p:sp>
-      <p:sp>
-        <p:nvSpPr>
-          <p:cNvPr id="3" name="Text Placeholder 2">
-            <a:extLst>
-              <a:ext uri="{FF2B5EF4-FFF2-40B4-BE49-F238E27FC236}">
-                <a16:creationId xmlns:a16="http://schemas.microsoft.com/office/drawing/2014/main" id="{4976346F-5C36-41A0-B3E6-F8E529A8887B}"/>
-              </a:ext>
-            </a:extLst>
-          </p:cNvPr>
+            <a:endParaRPr lang="en-US" dirty="0"/>
+          </a:p>
+        </p:txBody>
+      </p:sp>
+      <p:sp>
+        <p:nvSpPr>
+          <p:cNvPr id="3" name="Text Placeholder 2"/>
           <p:cNvSpPr>
             <a:spLocks noGrp="1"/>
           </p:cNvSpPr>
@@ -1012,26 +1264,29 @@
         </p:nvSpPr>
         <p:spPr>
           <a:xfrm>
-            <a:off x="831850" y="4589463"/>
-            <a:ext cx="10515600" cy="1500187"/>
+            <a:off x="1261872" y="4800600"/>
+            <a:ext cx="9418320" cy="1691640"/>
           </a:xfrm>
         </p:spPr>
         <p:txBody>
-          <a:bodyPr/>
+          <a:bodyPr anchor="t">
+            <a:normAutofit/>
+          </a:bodyPr>
           <a:lstStyle>
             <a:lvl1pPr marL="0" indent="0">
               <a:buNone/>
-              <a:defRPr sz="2400">
+              <a:defRPr sz="2200">
                 <a:solidFill>
                   <a:schemeClr val="tx1">
-                    <a:tint val="75000"/>
+                    <a:lumMod val="65000"/>
+                    <a:lumOff val="35000"/>
                   </a:schemeClr>
                 </a:solidFill>
               </a:defRPr>
             </a:lvl1pPr>
             <a:lvl2pPr marL="457200" indent="0">
               <a:buNone/>
-              <a:defRPr sz="2000">
+              <a:defRPr sz="1800">
                 <a:solidFill>
                   <a:schemeClr val="tx1">
                     <a:tint val="75000"/>
@@ -1041,7 +1296,7 @@
             </a:lvl2pPr>
             <a:lvl3pPr marL="914400" indent="0">
               <a:buNone/>
-              <a:defRPr sz="1800">
+              <a:defRPr sz="1600">
                 <a:solidFill>
                   <a:schemeClr val="tx1">
                     <a:tint val="75000"/>
@@ -1051,7 +1306,7 @@
             </a:lvl3pPr>
             <a:lvl4pPr marL="1371600" indent="0">
               <a:buNone/>
-              <a:defRPr sz="1600">
+              <a:defRPr sz="1400">
                 <a:solidFill>
                   <a:schemeClr val="tx1">
                     <a:tint val="75000"/>
@@ -1061,7 +1316,7 @@
             </a:lvl4pPr>
             <a:lvl5pPr marL="1828800" indent="0">
               <a:buNone/>
-              <a:defRPr sz="1600">
+              <a:defRPr sz="1400">
                 <a:solidFill>
                   <a:schemeClr val="tx1">
                     <a:tint val="75000"/>
@@ -1071,7 +1326,7 @@
             </a:lvl5pPr>
             <a:lvl6pPr marL="2286000" indent="0">
               <a:buNone/>
-              <a:defRPr sz="1600">
+              <a:defRPr sz="1400">
                 <a:solidFill>
                   <a:schemeClr val="tx1">
                     <a:tint val="75000"/>
@@ -1081,7 +1336,7 @@
             </a:lvl6pPr>
             <a:lvl7pPr marL="2743200" indent="0">
               <a:buNone/>
-              <a:defRPr sz="1600">
+              <a:defRPr sz="1400">
                 <a:solidFill>
                   <a:schemeClr val="tx1">
                     <a:tint val="75000"/>
@@ -1091,7 +1346,7 @@
             </a:lvl7pPr>
             <a:lvl8pPr marL="3200400" indent="0">
               <a:buNone/>
-              <a:defRPr sz="1600">
+              <a:defRPr sz="1400">
                 <a:solidFill>
                   <a:schemeClr val="tx1">
                     <a:tint val="75000"/>
@@ -1101,7 +1356,7 @@
             </a:lvl8pPr>
             <a:lvl9pPr marL="3657600" indent="0">
               <a:buNone/>
-              <a:defRPr sz="1600">
+              <a:defRPr sz="1400">
                 <a:solidFill>
                   <a:schemeClr val="tx1">
                     <a:tint val="75000"/>
@@ -1121,13 +1376,7 @@
       </p:sp>
       <p:sp>
         <p:nvSpPr>
-          <p:cNvPr id="4" name="Date Placeholder 3">
-            <a:extLst>
-              <a:ext uri="{FF2B5EF4-FFF2-40B4-BE49-F238E27FC236}">
-                <a16:creationId xmlns:a16="http://schemas.microsoft.com/office/drawing/2014/main" id="{63913D23-5217-4573-8FB5-E139C0634A20}"/>
-              </a:ext>
-            </a:extLst>
-          </p:cNvPr>
+          <p:cNvPr id="4" name="Date Placeholder 3"/>
           <p:cNvSpPr>
             <a:spLocks noGrp="1"/>
           </p:cNvSpPr>
@@ -1150,13 +1399,7 @@
       </p:sp>
       <p:sp>
         <p:nvSpPr>
-          <p:cNvPr id="5" name="Footer Placeholder 4">
-            <a:extLst>
-              <a:ext uri="{FF2B5EF4-FFF2-40B4-BE49-F238E27FC236}">
-                <a16:creationId xmlns:a16="http://schemas.microsoft.com/office/drawing/2014/main" id="{BEC40D1A-63D3-4E37-A30B-C32D464C2104}"/>
-              </a:ext>
-            </a:extLst>
-          </p:cNvPr>
+          <p:cNvPr id="5" name="Footer Placeholder 4"/>
           <p:cNvSpPr>
             <a:spLocks noGrp="1"/>
           </p:cNvSpPr>
@@ -1175,13 +1418,7 @@
       </p:sp>
       <p:sp>
         <p:nvSpPr>
-          <p:cNvPr id="6" name="Slide Number Placeholder 5">
-            <a:extLst>
-              <a:ext uri="{FF2B5EF4-FFF2-40B4-BE49-F238E27FC236}">
-                <a16:creationId xmlns:a16="http://schemas.microsoft.com/office/drawing/2014/main" id="{2B7341C8-DF71-4B7E-AF64-81971907ACA9}"/>
-              </a:ext>
-            </a:extLst>
-          </p:cNvPr>
+          <p:cNvPr id="6" name="Slide Number Placeholder 5"/>
           <p:cNvSpPr>
             <a:spLocks noGrp="1"/>
           </p:cNvSpPr>
@@ -1202,10 +1439,48 @@
           </a:p>
         </p:txBody>
       </p:sp>
+      <p:sp>
+        <p:nvSpPr>
+          <p:cNvPr id="7" name="Rectangle 6"/>
+          <p:cNvSpPr/>
+          <p:nvPr/>
+        </p:nvSpPr>
+        <p:spPr>
+          <a:xfrm>
+            <a:off x="0" y="0"/>
+            <a:ext cx="457200" cy="6858000"/>
+          </a:xfrm>
+          <a:prstGeom prst="rect">
+            <a:avLst/>
+          </a:prstGeom>
+          <a:solidFill>
+            <a:schemeClr val="accent1"/>
+          </a:solidFill>
+          <a:ln>
+            <a:noFill/>
+          </a:ln>
+        </p:spPr>
+        <p:style>
+          <a:lnRef idx="2">
+            <a:schemeClr val="accent1">
+              <a:shade val="50000"/>
+            </a:schemeClr>
+          </a:lnRef>
+          <a:fillRef idx="1">
+            <a:schemeClr val="accent1"/>
+          </a:fillRef>
+          <a:effectRef idx="0">
+            <a:schemeClr val="accent1"/>
+          </a:effectRef>
+          <a:fontRef idx="minor">
+            <a:schemeClr val="lt1"/>
+          </a:fontRef>
+        </p:style>
+      </p:sp>
     </p:spTree>
     <p:extLst>
       <p:ext uri="{BB962C8B-B14F-4D97-AF65-F5344CB8AC3E}">
-        <p14:creationId xmlns:p14="http://schemas.microsoft.com/office/powerpoint/2010/main" val="914172068"/>
+        <p14:creationId xmlns:p14="http://schemas.microsoft.com/office/powerpoint/2010/main" val="981140728"/>
       </p:ext>
     </p:extLst>
   </p:cSld>
@@ -1234,13 +1509,7 @@
       </p:grpSpPr>
       <p:sp>
         <p:nvSpPr>
-          <p:cNvPr id="2" name="Title 1">
-            <a:extLst>
-              <a:ext uri="{FF2B5EF4-FFF2-40B4-BE49-F238E27FC236}">
-                <a16:creationId xmlns:a16="http://schemas.microsoft.com/office/drawing/2014/main" id="{E1F9B5DF-E6C3-43B1-B70F-5C156D0FAB48}"/>
-              </a:ext>
-            </a:extLst>
-          </p:cNvPr>
+          <p:cNvPr id="2" name="Title 1"/>
           <p:cNvSpPr>
             <a:spLocks noGrp="1"/>
           </p:cNvSpPr>
@@ -1257,18 +1526,13 @@
               <a:rPr lang="en-US"/>
               <a:t>Click to edit Master title style</a:t>
             </a:r>
-          </a:p>
-        </p:txBody>
-      </p:sp>
-      <p:sp>
-        <p:nvSpPr>
-          <p:cNvPr id="3" name="Content Placeholder 2">
-            <a:extLst>
-              <a:ext uri="{FF2B5EF4-FFF2-40B4-BE49-F238E27FC236}">
-                <a16:creationId xmlns:a16="http://schemas.microsoft.com/office/drawing/2014/main" id="{7E128A4F-F217-4769-B9FC-60D56A14D531}"/>
-              </a:ext>
-            </a:extLst>
-          </p:cNvPr>
+            <a:endParaRPr lang="en-US" dirty="0"/>
+          </a:p>
+        </p:txBody>
+      </p:sp>
+      <p:sp>
+        <p:nvSpPr>
+          <p:cNvPr id="3" name="Content Placeholder 2"/>
           <p:cNvSpPr>
             <a:spLocks noGrp="1"/>
           </p:cNvSpPr>
@@ -1278,13 +1542,41 @@
         </p:nvSpPr>
         <p:spPr>
           <a:xfrm>
-            <a:off x="838200" y="1825625"/>
-            <a:ext cx="5181600" cy="4351338"/>
+            <a:off x="1261872" y="1828800"/>
+            <a:ext cx="4480560" cy="4351337"/>
           </a:xfrm>
         </p:spPr>
         <p:txBody>
           <a:bodyPr/>
-          <a:lstStyle/>
+          <a:lstStyle>
+            <a:lvl1pPr>
+              <a:defRPr sz="1800"/>
+            </a:lvl1pPr>
+            <a:lvl2pPr>
+              <a:defRPr sz="1600"/>
+            </a:lvl2pPr>
+            <a:lvl3pPr>
+              <a:defRPr sz="1400"/>
+            </a:lvl3pPr>
+            <a:lvl4pPr>
+              <a:defRPr sz="1400"/>
+            </a:lvl4pPr>
+            <a:lvl5pPr>
+              <a:defRPr sz="1400"/>
+            </a:lvl5pPr>
+            <a:lvl6pPr>
+              <a:defRPr sz="1400"/>
+            </a:lvl6pPr>
+            <a:lvl7pPr>
+              <a:defRPr sz="1400"/>
+            </a:lvl7pPr>
+            <a:lvl8pPr>
+              <a:defRPr sz="1400"/>
+            </a:lvl8pPr>
+            <a:lvl9pPr>
+              <a:defRPr sz="1400"/>
+            </a:lvl9pPr>
+          </a:lstStyle>
           <a:p>
             <a:pPr lvl="0"/>
             <a:r>
@@ -1319,18 +1611,13 @@
               <a:rPr lang="en-US"/>
               <a:t>Fifth level</a:t>
             </a:r>
-          </a:p>
-        </p:txBody>
-      </p:sp>
-      <p:sp>
-        <p:nvSpPr>
-          <p:cNvPr id="4" name="Content Placeholder 3">
-            <a:extLst>
-              <a:ext uri="{FF2B5EF4-FFF2-40B4-BE49-F238E27FC236}">
-                <a16:creationId xmlns:a16="http://schemas.microsoft.com/office/drawing/2014/main" id="{3B8A1A88-3156-40B5-A2CE-F18CFC18FBCD}"/>
-              </a:ext>
-            </a:extLst>
-          </p:cNvPr>
+            <a:endParaRPr lang="en-US" dirty="0"/>
+          </a:p>
+        </p:txBody>
+      </p:sp>
+      <p:sp>
+        <p:nvSpPr>
+          <p:cNvPr id="4" name="Content Placeholder 3"/>
           <p:cNvSpPr>
             <a:spLocks noGrp="1"/>
           </p:cNvSpPr>
@@ -1340,13 +1627,41 @@
         </p:nvSpPr>
         <p:spPr>
           <a:xfrm>
-            <a:off x="6172200" y="1825625"/>
-            <a:ext cx="5181600" cy="4351338"/>
+            <a:off x="6126480" y="1828800"/>
+            <a:ext cx="4480560" cy="4351337"/>
           </a:xfrm>
         </p:spPr>
         <p:txBody>
           <a:bodyPr/>
-          <a:lstStyle/>
+          <a:lstStyle>
+            <a:lvl1pPr>
+              <a:defRPr sz="1800"/>
+            </a:lvl1pPr>
+            <a:lvl2pPr>
+              <a:defRPr sz="1600"/>
+            </a:lvl2pPr>
+            <a:lvl3pPr>
+              <a:defRPr sz="1400"/>
+            </a:lvl3pPr>
+            <a:lvl4pPr>
+              <a:defRPr sz="1400"/>
+            </a:lvl4pPr>
+            <a:lvl5pPr>
+              <a:defRPr sz="1400"/>
+            </a:lvl5pPr>
+            <a:lvl6pPr>
+              <a:defRPr sz="1400"/>
+            </a:lvl6pPr>
+            <a:lvl7pPr>
+              <a:defRPr sz="1400"/>
+            </a:lvl7pPr>
+            <a:lvl8pPr>
+              <a:defRPr sz="1400"/>
+            </a:lvl8pPr>
+            <a:lvl9pPr>
+              <a:defRPr sz="1400"/>
+            </a:lvl9pPr>
+          </a:lstStyle>
           <a:p>
             <a:pPr lvl="0"/>
             <a:r>
@@ -1381,18 +1696,13 @@
               <a:rPr lang="en-US"/>
               <a:t>Fifth level</a:t>
             </a:r>
-          </a:p>
-        </p:txBody>
-      </p:sp>
-      <p:sp>
-        <p:nvSpPr>
-          <p:cNvPr id="5" name="Date Placeholder 4">
-            <a:extLst>
-              <a:ext uri="{FF2B5EF4-FFF2-40B4-BE49-F238E27FC236}">
-                <a16:creationId xmlns:a16="http://schemas.microsoft.com/office/drawing/2014/main" id="{64B4CF58-1FDF-497D-9473-F90DD0DCF5F7}"/>
-              </a:ext>
-            </a:extLst>
-          </p:cNvPr>
+            <a:endParaRPr lang="en-US" dirty="0"/>
+          </a:p>
+        </p:txBody>
+      </p:sp>
+      <p:sp>
+        <p:nvSpPr>
+          <p:cNvPr id="5" name="Date Placeholder 4"/>
           <p:cNvSpPr>
             <a:spLocks noGrp="1"/>
           </p:cNvSpPr>
@@ -1415,13 +1725,7 @@
       </p:sp>
       <p:sp>
         <p:nvSpPr>
-          <p:cNvPr id="6" name="Footer Placeholder 5">
-            <a:extLst>
-              <a:ext uri="{FF2B5EF4-FFF2-40B4-BE49-F238E27FC236}">
-                <a16:creationId xmlns:a16="http://schemas.microsoft.com/office/drawing/2014/main" id="{25861484-32AB-4C72-9063-FEF9C84FD9B4}"/>
-              </a:ext>
-            </a:extLst>
-          </p:cNvPr>
+          <p:cNvPr id="6" name="Footer Placeholder 5"/>
           <p:cNvSpPr>
             <a:spLocks noGrp="1"/>
           </p:cNvSpPr>
@@ -1440,13 +1744,7 @@
       </p:sp>
       <p:sp>
         <p:nvSpPr>
-          <p:cNvPr id="7" name="Slide Number Placeholder 6">
-            <a:extLst>
-              <a:ext uri="{FF2B5EF4-FFF2-40B4-BE49-F238E27FC236}">
-                <a16:creationId xmlns:a16="http://schemas.microsoft.com/office/drawing/2014/main" id="{1146CC53-042D-48BD-9513-CA0C01959DAC}"/>
-              </a:ext>
-            </a:extLst>
-          </p:cNvPr>
+          <p:cNvPr id="7" name="Slide Number Placeholder 6"/>
           <p:cNvSpPr>
             <a:spLocks noGrp="1"/>
           </p:cNvSpPr>
@@ -1470,7 +1768,7 @@
     </p:spTree>
     <p:extLst>
       <p:ext uri="{BB962C8B-B14F-4D97-AF65-F5344CB8AC3E}">
-        <p14:creationId xmlns:p14="http://schemas.microsoft.com/office/powerpoint/2010/main" val="2956030256"/>
+        <p14:creationId xmlns:p14="http://schemas.microsoft.com/office/powerpoint/2010/main" val="3775280401"/>
       </p:ext>
     </p:extLst>
   </p:cSld>
@@ -1499,65 +1797,58 @@
       </p:grpSpPr>
       <p:sp>
         <p:nvSpPr>
-          <p:cNvPr id="2" name="Title 1">
-            <a:extLst>
-              <a:ext uri="{FF2B5EF4-FFF2-40B4-BE49-F238E27FC236}">
-                <a16:creationId xmlns:a16="http://schemas.microsoft.com/office/drawing/2014/main" id="{5413248D-6607-40AB-928E-D500FC44CB4C}"/>
-              </a:ext>
-            </a:extLst>
-          </p:cNvPr>
+          <p:cNvPr id="10" name="Title 9"/>
           <p:cNvSpPr>
             <a:spLocks noGrp="1"/>
           </p:cNvSpPr>
           <p:nvPr>
             <p:ph type="title"/>
+          </p:nvPr>
+        </p:nvSpPr>
+        <p:spPr/>
+        <p:txBody>
+          <a:bodyPr/>
+          <a:lstStyle/>
+          <a:p>
+            <a:r>
+              <a:rPr lang="en-US"/>
+              <a:t>Click to edit Master title style</a:t>
+            </a:r>
+            <a:endParaRPr lang="en-US" dirty="0"/>
+          </a:p>
+        </p:txBody>
+      </p:sp>
+      <p:sp>
+        <p:nvSpPr>
+          <p:cNvPr id="3" name="Text Placeholder 2"/>
+          <p:cNvSpPr>
+            <a:spLocks noGrp="1"/>
+          </p:cNvSpPr>
+          <p:nvPr>
+            <p:ph type="body" idx="1"/>
           </p:nvPr>
         </p:nvSpPr>
         <p:spPr>
           <a:xfrm>
-            <a:off x="839788" y="365125"/>
-            <a:ext cx="10515600" cy="1325563"/>
+            <a:off x="1261872" y="1713655"/>
+            <a:ext cx="4480560" cy="731520"/>
           </a:xfrm>
         </p:spPr>
         <p:txBody>
-          <a:bodyPr/>
-          <a:lstStyle/>
-          <a:p>
-            <a:r>
-              <a:rPr lang="en-US"/>
-              <a:t>Click to edit Master title style</a:t>
-            </a:r>
-          </a:p>
-        </p:txBody>
-      </p:sp>
-      <p:sp>
-        <p:nvSpPr>
-          <p:cNvPr id="3" name="Text Placeholder 2">
-            <a:extLst>
-              <a:ext uri="{FF2B5EF4-FFF2-40B4-BE49-F238E27FC236}">
-                <a16:creationId xmlns:a16="http://schemas.microsoft.com/office/drawing/2014/main" id="{B4E68D61-0EFB-49AC-AC24-A47B20DD06AD}"/>
-              </a:ext>
-            </a:extLst>
-          </p:cNvPr>
-          <p:cNvSpPr>
-            <a:spLocks noGrp="1"/>
-          </p:cNvSpPr>
-          <p:nvPr>
-            <p:ph type="body" idx="1"/>
-          </p:nvPr>
-        </p:nvSpPr>
-        <p:spPr>
-          <a:xfrm>
-            <a:off x="839788" y="1681163"/>
-            <a:ext cx="5157787" cy="823912"/>
-          </a:xfrm>
-        </p:spPr>
-        <p:txBody>
-          <a:bodyPr anchor="b"/>
+          <a:bodyPr anchor="b">
+            <a:normAutofit/>
+          </a:bodyPr>
           <a:lstStyle>
             <a:lvl1pPr marL="0" indent="0">
-              <a:buNone/>
-              <a:defRPr sz="2400" b="1"/>
+              <a:spcBef>
+                <a:spcPts val="0"/>
+              </a:spcBef>
+              <a:buNone/>
+              <a:defRPr sz="2000" b="0">
+                <a:solidFill>
+                  <a:schemeClr val="tx2"/>
+                </a:solidFill>
+              </a:defRPr>
             </a:lvl1pPr>
             <a:lvl2pPr marL="457200" indent="0">
               <a:buNone/>
@@ -1603,13 +1894,7 @@
       </p:sp>
       <p:sp>
         <p:nvSpPr>
-          <p:cNvPr id="4" name="Content Placeholder 3">
-            <a:extLst>
-              <a:ext uri="{FF2B5EF4-FFF2-40B4-BE49-F238E27FC236}">
-                <a16:creationId xmlns:a16="http://schemas.microsoft.com/office/drawing/2014/main" id="{7774DC50-3F37-4AC6-91B3-7F8A74C9A15A}"/>
-              </a:ext>
-            </a:extLst>
-          </p:cNvPr>
+          <p:cNvPr id="4" name="Content Placeholder 3"/>
           <p:cNvSpPr>
             <a:spLocks noGrp="1"/>
           </p:cNvSpPr>
@@ -1619,13 +1904,41 @@
         </p:nvSpPr>
         <p:spPr>
           <a:xfrm>
-            <a:off x="839788" y="2505075"/>
-            <a:ext cx="5157787" cy="3684588"/>
+            <a:off x="1261872" y="2507550"/>
+            <a:ext cx="4480560" cy="3664650"/>
           </a:xfrm>
         </p:spPr>
         <p:txBody>
           <a:bodyPr/>
-          <a:lstStyle/>
+          <a:lstStyle>
+            <a:lvl1pPr>
+              <a:defRPr sz="1800"/>
+            </a:lvl1pPr>
+            <a:lvl2pPr>
+              <a:defRPr sz="1600"/>
+            </a:lvl2pPr>
+            <a:lvl3pPr>
+              <a:defRPr sz="1400"/>
+            </a:lvl3pPr>
+            <a:lvl4pPr>
+              <a:defRPr sz="1400"/>
+            </a:lvl4pPr>
+            <a:lvl5pPr>
+              <a:defRPr sz="1400"/>
+            </a:lvl5pPr>
+            <a:lvl6pPr>
+              <a:defRPr sz="1400"/>
+            </a:lvl6pPr>
+            <a:lvl7pPr>
+              <a:defRPr sz="1400"/>
+            </a:lvl7pPr>
+            <a:lvl8pPr>
+              <a:defRPr sz="1400"/>
+            </a:lvl8pPr>
+            <a:lvl9pPr>
+              <a:defRPr sz="1400"/>
+            </a:lvl9pPr>
+          </a:lstStyle>
           <a:p>
             <a:pPr lvl="0"/>
             <a:r>
@@ -1660,18 +1973,13 @@
               <a:rPr lang="en-US"/>
               <a:t>Fifth level</a:t>
             </a:r>
-          </a:p>
-        </p:txBody>
-      </p:sp>
-      <p:sp>
-        <p:nvSpPr>
-          <p:cNvPr id="5" name="Text Placeholder 4">
-            <a:extLst>
-              <a:ext uri="{FF2B5EF4-FFF2-40B4-BE49-F238E27FC236}">
-                <a16:creationId xmlns:a16="http://schemas.microsoft.com/office/drawing/2014/main" id="{64DF19B7-8DA1-44A8-B634-DF29B0D352C4}"/>
-              </a:ext>
-            </a:extLst>
-          </p:cNvPr>
+            <a:endParaRPr lang="en-US" dirty="0"/>
+          </a:p>
+        </p:txBody>
+      </p:sp>
+      <p:sp>
+        <p:nvSpPr>
+          <p:cNvPr id="5" name="Text Placeholder 4"/>
           <p:cNvSpPr>
             <a:spLocks noGrp="1"/>
           </p:cNvSpPr>
@@ -1681,16 +1989,31 @@
         </p:nvSpPr>
         <p:spPr>
           <a:xfrm>
-            <a:off x="6172200" y="1681163"/>
-            <a:ext cx="5183188" cy="823912"/>
+            <a:off x="6126480" y="1713655"/>
+            <a:ext cx="4480560" cy="731520"/>
           </a:xfrm>
         </p:spPr>
         <p:txBody>
-          <a:bodyPr anchor="b"/>
+          <a:bodyPr anchor="b">
+            <a:normAutofit/>
+          </a:bodyPr>
           <a:lstStyle>
             <a:lvl1pPr marL="0" indent="0">
-              <a:buNone/>
-              <a:defRPr sz="2400" b="1"/>
+              <a:lnSpc>
+                <a:spcPct val="95000"/>
+              </a:lnSpc>
+              <a:spcBef>
+                <a:spcPts val="0"/>
+              </a:spcBef>
+              <a:buNone/>
+              <a:defRPr lang="en-US" sz="2000" b="0" kern="1200" dirty="0">
+                <a:solidFill>
+                  <a:schemeClr val="tx2"/>
+                </a:solidFill>
+                <a:latin typeface="+mn-lt"/>
+                <a:ea typeface="+mn-ea"/>
+                <a:cs typeface="+mn-cs"/>
+              </a:defRPr>
             </a:lvl1pPr>
             <a:lvl2pPr marL="457200" indent="0">
               <a:buNone/>
@@ -1726,7 +2049,16 @@
             </a:lvl9pPr>
           </a:lstStyle>
           <a:p>
-            <a:pPr lvl="0"/>
+            <a:pPr marL="0" lvl="0" indent="0" algn="l" defTabSz="914400" rtl="0" eaLnBrk="1" latinLnBrk="0" hangingPunct="1">
+              <a:lnSpc>
+                <a:spcPct val="90000"/>
+              </a:lnSpc>
+              <a:spcBef>
+                <a:spcPts val="2000"/>
+              </a:spcBef>
+              <a:buFontTx/>
+              <a:buNone/>
+            </a:pPr>
             <a:r>
               <a:rPr lang="en-US"/>
               <a:t>Edit Master text styles</a:t>
@@ -1736,13 +2068,7 @@
       </p:sp>
       <p:sp>
         <p:nvSpPr>
-          <p:cNvPr id="6" name="Content Placeholder 5">
-            <a:extLst>
-              <a:ext uri="{FF2B5EF4-FFF2-40B4-BE49-F238E27FC236}">
-                <a16:creationId xmlns:a16="http://schemas.microsoft.com/office/drawing/2014/main" id="{522868B3-594B-4535-8D16-B9BD059F0443}"/>
-              </a:ext>
-            </a:extLst>
-          </p:cNvPr>
+          <p:cNvPr id="6" name="Content Placeholder 5"/>
           <p:cNvSpPr>
             <a:spLocks noGrp="1"/>
           </p:cNvSpPr>
@@ -1752,13 +2078,41 @@
         </p:nvSpPr>
         <p:spPr>
           <a:xfrm>
-            <a:off x="6172200" y="2505075"/>
-            <a:ext cx="5183188" cy="3684588"/>
+            <a:off x="6126480" y="2507550"/>
+            <a:ext cx="4480560" cy="3664650"/>
           </a:xfrm>
         </p:spPr>
         <p:txBody>
           <a:bodyPr/>
-          <a:lstStyle/>
+          <a:lstStyle>
+            <a:lvl1pPr>
+              <a:defRPr sz="1800"/>
+            </a:lvl1pPr>
+            <a:lvl2pPr>
+              <a:defRPr sz="1600"/>
+            </a:lvl2pPr>
+            <a:lvl3pPr>
+              <a:defRPr sz="1400"/>
+            </a:lvl3pPr>
+            <a:lvl4pPr>
+              <a:defRPr sz="1400"/>
+            </a:lvl4pPr>
+            <a:lvl5pPr>
+              <a:defRPr sz="1400"/>
+            </a:lvl5pPr>
+            <a:lvl6pPr>
+              <a:defRPr sz="1400"/>
+            </a:lvl6pPr>
+            <a:lvl7pPr>
+              <a:defRPr sz="1400"/>
+            </a:lvl7pPr>
+            <a:lvl8pPr>
+              <a:defRPr sz="1400"/>
+            </a:lvl8pPr>
+            <a:lvl9pPr>
+              <a:defRPr sz="1400"/>
+            </a:lvl9pPr>
+          </a:lstStyle>
           <a:p>
             <a:pPr lvl="0"/>
             <a:r>
@@ -1793,18 +2147,13 @@
               <a:rPr lang="en-US"/>
               <a:t>Fifth level</a:t>
             </a:r>
-          </a:p>
-        </p:txBody>
-      </p:sp>
-      <p:sp>
-        <p:nvSpPr>
-          <p:cNvPr id="7" name="Date Placeholder 6">
-            <a:extLst>
-              <a:ext uri="{FF2B5EF4-FFF2-40B4-BE49-F238E27FC236}">
-                <a16:creationId xmlns:a16="http://schemas.microsoft.com/office/drawing/2014/main" id="{6D4D6E5E-FB0F-407D-AED4-B5C443C1EAFA}"/>
-              </a:ext>
-            </a:extLst>
-          </p:cNvPr>
+            <a:endParaRPr lang="en-US" dirty="0"/>
+          </a:p>
+        </p:txBody>
+      </p:sp>
+      <p:sp>
+        <p:nvSpPr>
+          <p:cNvPr id="7" name="Date Placeholder 6"/>
           <p:cNvSpPr>
             <a:spLocks noGrp="1"/>
           </p:cNvSpPr>
@@ -1827,13 +2176,7 @@
       </p:sp>
       <p:sp>
         <p:nvSpPr>
-          <p:cNvPr id="8" name="Footer Placeholder 7">
-            <a:extLst>
-              <a:ext uri="{FF2B5EF4-FFF2-40B4-BE49-F238E27FC236}">
-                <a16:creationId xmlns:a16="http://schemas.microsoft.com/office/drawing/2014/main" id="{0AFA6289-5EF2-4A6F-B0BA-ABE01D8892A2}"/>
-              </a:ext>
-            </a:extLst>
-          </p:cNvPr>
+          <p:cNvPr id="8" name="Footer Placeholder 7"/>
           <p:cNvSpPr>
             <a:spLocks noGrp="1"/>
           </p:cNvSpPr>
@@ -1852,13 +2195,7 @@
       </p:sp>
       <p:sp>
         <p:nvSpPr>
-          <p:cNvPr id="9" name="Slide Number Placeholder 8">
-            <a:extLst>
-              <a:ext uri="{FF2B5EF4-FFF2-40B4-BE49-F238E27FC236}">
-                <a16:creationId xmlns:a16="http://schemas.microsoft.com/office/drawing/2014/main" id="{773EBF34-6320-4369-9D9F-359E79D7D1A2}"/>
-              </a:ext>
-            </a:extLst>
-          </p:cNvPr>
+          <p:cNvPr id="9" name="Slide Number Placeholder 8"/>
           <p:cNvSpPr>
             <a:spLocks noGrp="1"/>
           </p:cNvSpPr>
@@ -1882,7 +2219,7 @@
     </p:spTree>
     <p:extLst>
       <p:ext uri="{BB962C8B-B14F-4D97-AF65-F5344CB8AC3E}">
-        <p14:creationId xmlns:p14="http://schemas.microsoft.com/office/powerpoint/2010/main" val="3823843115"/>
+        <p14:creationId xmlns:p14="http://schemas.microsoft.com/office/powerpoint/2010/main" val="2202066702"/>
       </p:ext>
     </p:extLst>
   </p:cSld>
@@ -1911,13 +2248,7 @@
       </p:grpSpPr>
       <p:sp>
         <p:nvSpPr>
-          <p:cNvPr id="2" name="Title 1">
-            <a:extLst>
-              <a:ext uri="{FF2B5EF4-FFF2-40B4-BE49-F238E27FC236}">
-                <a16:creationId xmlns:a16="http://schemas.microsoft.com/office/drawing/2014/main" id="{062C7E49-A9CD-488D-83B2-48034AD53A2E}"/>
-              </a:ext>
-            </a:extLst>
-          </p:cNvPr>
+          <p:cNvPr id="6" name="Title 5"/>
           <p:cNvSpPr>
             <a:spLocks noGrp="1"/>
           </p:cNvSpPr>
@@ -1934,18 +2265,13 @@
               <a:rPr lang="en-US"/>
               <a:t>Click to edit Master title style</a:t>
             </a:r>
-          </a:p>
-        </p:txBody>
-      </p:sp>
-      <p:sp>
-        <p:nvSpPr>
-          <p:cNvPr id="3" name="Date Placeholder 2">
-            <a:extLst>
-              <a:ext uri="{FF2B5EF4-FFF2-40B4-BE49-F238E27FC236}">
-                <a16:creationId xmlns:a16="http://schemas.microsoft.com/office/drawing/2014/main" id="{CE3D1EDA-F50D-4034-BD88-CF37FBC8AB3C}"/>
-              </a:ext>
-            </a:extLst>
-          </p:cNvPr>
+            <a:endParaRPr lang="en-US" dirty="0"/>
+          </a:p>
+        </p:txBody>
+      </p:sp>
+      <p:sp>
+        <p:nvSpPr>
+          <p:cNvPr id="3" name="Date Placeholder 2"/>
           <p:cNvSpPr>
             <a:spLocks noGrp="1"/>
           </p:cNvSpPr>
@@ -1968,13 +2294,7 @@
       </p:sp>
       <p:sp>
         <p:nvSpPr>
-          <p:cNvPr id="4" name="Footer Placeholder 3">
-            <a:extLst>
-              <a:ext uri="{FF2B5EF4-FFF2-40B4-BE49-F238E27FC236}">
-                <a16:creationId xmlns:a16="http://schemas.microsoft.com/office/drawing/2014/main" id="{D01030A6-6A87-4A99-AC6E-2F73A959B352}"/>
-              </a:ext>
-            </a:extLst>
-          </p:cNvPr>
+          <p:cNvPr id="4" name="Footer Placeholder 3"/>
           <p:cNvSpPr>
             <a:spLocks noGrp="1"/>
           </p:cNvSpPr>
@@ -1993,13 +2313,7 @@
       </p:sp>
       <p:sp>
         <p:nvSpPr>
-          <p:cNvPr id="5" name="Slide Number Placeholder 4">
-            <a:extLst>
-              <a:ext uri="{FF2B5EF4-FFF2-40B4-BE49-F238E27FC236}">
-                <a16:creationId xmlns:a16="http://schemas.microsoft.com/office/drawing/2014/main" id="{511EBDB7-D144-4D10-A079-4E3867569F51}"/>
-              </a:ext>
-            </a:extLst>
-          </p:cNvPr>
+          <p:cNvPr id="5" name="Slide Number Placeholder 4"/>
           <p:cNvSpPr>
             <a:spLocks noGrp="1"/>
           </p:cNvSpPr>
@@ -2023,7 +2337,7 @@
     </p:spTree>
     <p:extLst>
       <p:ext uri="{BB962C8B-B14F-4D97-AF65-F5344CB8AC3E}">
-        <p14:creationId xmlns:p14="http://schemas.microsoft.com/office/powerpoint/2010/main" val="4168475241"/>
+        <p14:creationId xmlns:p14="http://schemas.microsoft.com/office/powerpoint/2010/main" val="1875640979"/>
       </p:ext>
     </p:extLst>
   </p:cSld>
@@ -2052,13 +2366,7 @@
       </p:grpSpPr>
       <p:sp>
         <p:nvSpPr>
-          <p:cNvPr id="2" name="Date Placeholder 1">
-            <a:extLst>
-              <a:ext uri="{FF2B5EF4-FFF2-40B4-BE49-F238E27FC236}">
-                <a16:creationId xmlns:a16="http://schemas.microsoft.com/office/drawing/2014/main" id="{023331C9-97D8-41B8-8A8C-70BBBDB3E666}"/>
-              </a:ext>
-            </a:extLst>
-          </p:cNvPr>
+          <p:cNvPr id="2" name="Date Placeholder 1"/>
           <p:cNvSpPr>
             <a:spLocks noGrp="1"/>
           </p:cNvSpPr>
@@ -2081,13 +2389,7 @@
       </p:sp>
       <p:sp>
         <p:nvSpPr>
-          <p:cNvPr id="3" name="Footer Placeholder 2">
-            <a:extLst>
-              <a:ext uri="{FF2B5EF4-FFF2-40B4-BE49-F238E27FC236}">
-                <a16:creationId xmlns:a16="http://schemas.microsoft.com/office/drawing/2014/main" id="{38341128-D821-432E-85CE-4F6A44D1B1FB}"/>
-              </a:ext>
-            </a:extLst>
-          </p:cNvPr>
+          <p:cNvPr id="3" name="Footer Placeholder 2"/>
           <p:cNvSpPr>
             <a:spLocks noGrp="1"/>
           </p:cNvSpPr>
@@ -2106,13 +2408,7 @@
       </p:sp>
       <p:sp>
         <p:nvSpPr>
-          <p:cNvPr id="4" name="Slide Number Placeholder 3">
-            <a:extLst>
-              <a:ext uri="{FF2B5EF4-FFF2-40B4-BE49-F238E27FC236}">
-                <a16:creationId xmlns:a16="http://schemas.microsoft.com/office/drawing/2014/main" id="{E8E057EB-E641-42AF-8769-F257DD1F3276}"/>
-              </a:ext>
-            </a:extLst>
-          </p:cNvPr>
+          <p:cNvPr id="4" name="Slide Number Placeholder 3"/>
           <p:cNvSpPr>
             <a:spLocks noGrp="1"/>
           </p:cNvSpPr>
@@ -2136,7 +2432,7 @@
     </p:spTree>
     <p:extLst>
       <p:ext uri="{BB962C8B-B14F-4D97-AF65-F5344CB8AC3E}">
-        <p14:creationId xmlns:p14="http://schemas.microsoft.com/office/powerpoint/2010/main" val="2708153490"/>
+        <p14:creationId xmlns:p14="http://schemas.microsoft.com/office/powerpoint/2010/main" val="2796234135"/>
       </p:ext>
     </p:extLst>
   </p:cSld>
@@ -2165,13 +2461,7 @@
       </p:grpSpPr>
       <p:sp>
         <p:nvSpPr>
-          <p:cNvPr id="2" name="Title 1">
-            <a:extLst>
-              <a:ext uri="{FF2B5EF4-FFF2-40B4-BE49-F238E27FC236}">
-                <a16:creationId xmlns:a16="http://schemas.microsoft.com/office/drawing/2014/main" id="{986DF073-046B-4500-82BF-728D3427B7FD}"/>
-              </a:ext>
-            </a:extLst>
-          </p:cNvPr>
+          <p:cNvPr id="2" name="Title 1"/>
           <p:cNvSpPr>
             <a:spLocks noGrp="1"/>
           </p:cNvSpPr>
@@ -2181,15 +2471,17 @@
         </p:nvSpPr>
         <p:spPr>
           <a:xfrm>
-            <a:off x="839788" y="457200"/>
-            <a:ext cx="3932237" cy="1600200"/>
+            <a:off x="841248" y="457200"/>
+            <a:ext cx="3200400" cy="1600197"/>
           </a:xfrm>
         </p:spPr>
         <p:txBody>
-          <a:bodyPr anchor="b"/>
+          <a:bodyPr anchor="b">
+            <a:normAutofit/>
+          </a:bodyPr>
           <a:lstStyle>
             <a:lvl1pPr>
-              <a:defRPr sz="3200"/>
+              <a:defRPr sz="3200" b="0" baseline="0"/>
             </a:lvl1pPr>
           </a:lstStyle>
           <a:p>
@@ -2197,18 +2489,13 @@
               <a:rPr lang="en-US"/>
               <a:t>Click to edit Master title style</a:t>
             </a:r>
-          </a:p>
-        </p:txBody>
-      </p:sp>
-      <p:sp>
-        <p:nvSpPr>
-          <p:cNvPr id="3" name="Content Placeholder 2">
-            <a:extLst>
-              <a:ext uri="{FF2B5EF4-FFF2-40B4-BE49-F238E27FC236}">
-                <a16:creationId xmlns:a16="http://schemas.microsoft.com/office/drawing/2014/main" id="{4BD4EF0E-B22E-49E8-946E-BF7CE8AD43A5}"/>
-              </a:ext>
-            </a:extLst>
-          </p:cNvPr>
+            <a:endParaRPr lang="en-US" dirty="0"/>
+          </a:p>
+        </p:txBody>
+      </p:sp>
+      <p:sp>
+        <p:nvSpPr>
+          <p:cNvPr id="3" name="Content Placeholder 2"/>
           <p:cNvSpPr>
             <a:spLocks noGrp="1"/>
           </p:cNvSpPr>
@@ -2218,39 +2505,39 @@
         </p:nvSpPr>
         <p:spPr>
           <a:xfrm>
-            <a:off x="5183188" y="987425"/>
-            <a:ext cx="6172200" cy="4873625"/>
+            <a:off x="4504267" y="685800"/>
+            <a:ext cx="6079066" cy="5486400"/>
           </a:xfrm>
         </p:spPr>
         <p:txBody>
           <a:bodyPr/>
           <a:lstStyle>
             <a:lvl1pPr>
-              <a:defRPr sz="3200"/>
+              <a:defRPr sz="2000"/>
             </a:lvl1pPr>
             <a:lvl2pPr>
-              <a:defRPr sz="2800"/>
+              <a:defRPr sz="1800"/>
             </a:lvl2pPr>
             <a:lvl3pPr>
-              <a:defRPr sz="2400"/>
+              <a:defRPr sz="1600"/>
             </a:lvl3pPr>
             <a:lvl4pPr>
-              <a:defRPr sz="2000"/>
+              <a:defRPr sz="1400"/>
             </a:lvl4pPr>
             <a:lvl5pPr>
-              <a:defRPr sz="2000"/>
+              <a:defRPr sz="1400"/>
             </a:lvl5pPr>
             <a:lvl6pPr>
-              <a:defRPr sz="2000"/>
+              <a:defRPr sz="1400"/>
             </a:lvl6pPr>
             <a:lvl7pPr>
-              <a:defRPr sz="2000"/>
+              <a:defRPr sz="1400"/>
             </a:lvl7pPr>
             <a:lvl8pPr>
-              <a:defRPr sz="2000"/>
+              <a:defRPr sz="1400"/>
             </a:lvl8pPr>
             <a:lvl9pPr>
-              <a:defRPr sz="2000"/>
+              <a:defRPr sz="1400"/>
             </a:lvl9pPr>
           </a:lstStyle>
           <a:p>
@@ -2287,18 +2574,13 @@
               <a:rPr lang="en-US"/>
               <a:t>Fifth level</a:t>
             </a:r>
-          </a:p>
-        </p:txBody>
-      </p:sp>
-      <p:sp>
-        <p:nvSpPr>
-          <p:cNvPr id="4" name="Text Placeholder 3">
-            <a:extLst>
-              <a:ext uri="{FF2B5EF4-FFF2-40B4-BE49-F238E27FC236}">
-                <a16:creationId xmlns:a16="http://schemas.microsoft.com/office/drawing/2014/main" id="{94034705-71B6-491F-A942-6F03AFBE5A4B}"/>
-              </a:ext>
-            </a:extLst>
-          </p:cNvPr>
+            <a:endParaRPr lang="en-US" dirty="0"/>
+          </a:p>
+        </p:txBody>
+      </p:sp>
+      <p:sp>
+        <p:nvSpPr>
+          <p:cNvPr id="4" name="Text Placeholder 3"/>
           <p:cNvSpPr>
             <a:spLocks noGrp="1"/>
           </p:cNvSpPr>
@@ -2308,48 +2590,56 @@
         </p:nvSpPr>
         <p:spPr>
           <a:xfrm>
-            <a:off x="839788" y="2057400"/>
-            <a:ext cx="3932237" cy="3811588"/>
+            <a:off x="841248" y="2099734"/>
+            <a:ext cx="3200400" cy="3810001"/>
           </a:xfrm>
         </p:spPr>
         <p:txBody>
-          <a:bodyPr/>
+          <a:bodyPr>
+            <a:normAutofit/>
+          </a:bodyPr>
           <a:lstStyle>
             <a:lvl1pPr marL="0" indent="0">
-              <a:buNone/>
-              <a:defRPr sz="1600"/>
+              <a:lnSpc>
+                <a:spcPct val="114000"/>
+              </a:lnSpc>
+              <a:spcBef>
+                <a:spcPts val="800"/>
+              </a:spcBef>
+              <a:buNone/>
+              <a:defRPr sz="1300"/>
             </a:lvl1pPr>
             <a:lvl2pPr marL="457200" indent="0">
               <a:buNone/>
-              <a:defRPr sz="1400"/>
+              <a:defRPr sz="1200"/>
             </a:lvl2pPr>
             <a:lvl3pPr marL="914400" indent="0">
               <a:buNone/>
-              <a:defRPr sz="1200"/>
+              <a:defRPr sz="1000"/>
             </a:lvl3pPr>
             <a:lvl4pPr marL="1371600" indent="0">
               <a:buNone/>
-              <a:defRPr sz="1000"/>
+              <a:defRPr sz="900"/>
             </a:lvl4pPr>
             <a:lvl5pPr marL="1828800" indent="0">
               <a:buNone/>
-              <a:defRPr sz="1000"/>
+              <a:defRPr sz="900"/>
             </a:lvl5pPr>
             <a:lvl6pPr marL="2286000" indent="0">
               <a:buNone/>
-              <a:defRPr sz="1000"/>
+              <a:defRPr sz="900"/>
             </a:lvl6pPr>
             <a:lvl7pPr marL="2743200" indent="0">
               <a:buNone/>
-              <a:defRPr sz="1000"/>
+              <a:defRPr sz="900"/>
             </a:lvl7pPr>
             <a:lvl8pPr marL="3200400" indent="0">
               <a:buNone/>
-              <a:defRPr sz="1000"/>
+              <a:defRPr sz="900"/>
             </a:lvl8pPr>
             <a:lvl9pPr marL="3657600" indent="0">
               <a:buNone/>
-              <a:defRPr sz="1000"/>
+              <a:defRPr sz="900"/>
             </a:lvl9pPr>
           </a:lstStyle>
           <a:p>
@@ -2363,13 +2653,7 @@
       </p:sp>
       <p:sp>
         <p:nvSpPr>
-          <p:cNvPr id="5" name="Date Placeholder 4">
-            <a:extLst>
-              <a:ext uri="{FF2B5EF4-FFF2-40B4-BE49-F238E27FC236}">
-                <a16:creationId xmlns:a16="http://schemas.microsoft.com/office/drawing/2014/main" id="{60F3BCAB-7551-4916-9437-B3DC2723C62F}"/>
-              </a:ext>
-            </a:extLst>
-          </p:cNvPr>
+          <p:cNvPr id="5" name="Date Placeholder 4"/>
           <p:cNvSpPr>
             <a:spLocks noGrp="1"/>
           </p:cNvSpPr>
@@ -2392,13 +2676,7 @@
       </p:sp>
       <p:sp>
         <p:nvSpPr>
-          <p:cNvPr id="6" name="Footer Placeholder 5">
-            <a:extLst>
-              <a:ext uri="{FF2B5EF4-FFF2-40B4-BE49-F238E27FC236}">
-                <a16:creationId xmlns:a16="http://schemas.microsoft.com/office/drawing/2014/main" id="{A782ADB8-E828-49B4-A5BB-04900BF58E94}"/>
-              </a:ext>
-            </a:extLst>
-          </p:cNvPr>
+          <p:cNvPr id="6" name="Footer Placeholder 5"/>
           <p:cNvSpPr>
             <a:spLocks noGrp="1"/>
           </p:cNvSpPr>
@@ -2417,13 +2695,7 @@
       </p:sp>
       <p:sp>
         <p:nvSpPr>
-          <p:cNvPr id="7" name="Slide Number Placeholder 6">
-            <a:extLst>
-              <a:ext uri="{FF2B5EF4-FFF2-40B4-BE49-F238E27FC236}">
-                <a16:creationId xmlns:a16="http://schemas.microsoft.com/office/drawing/2014/main" id="{FE94EBEC-D6B3-460D-B2C4-FC739E6EE6C2}"/>
-              </a:ext>
-            </a:extLst>
-          </p:cNvPr>
+          <p:cNvPr id="7" name="Slide Number Placeholder 6"/>
           <p:cNvSpPr>
             <a:spLocks noGrp="1"/>
           </p:cNvSpPr>
@@ -2447,7 +2719,7 @@
     </p:spTree>
     <p:extLst>
       <p:ext uri="{BB962C8B-B14F-4D97-AF65-F5344CB8AC3E}">
-        <p14:creationId xmlns:p14="http://schemas.microsoft.com/office/powerpoint/2010/main" val="3760765009"/>
+        <p14:creationId xmlns:p14="http://schemas.microsoft.com/office/powerpoint/2010/main" val="95772787"/>
       </p:ext>
     </p:extLst>
   </p:cSld>
@@ -2476,31 +2748,69 @@
       </p:grpSpPr>
       <p:sp>
         <p:nvSpPr>
-          <p:cNvPr id="2" name="Title 1">
-            <a:extLst>
-              <a:ext uri="{FF2B5EF4-FFF2-40B4-BE49-F238E27FC236}">
-                <a16:creationId xmlns:a16="http://schemas.microsoft.com/office/drawing/2014/main" id="{897E3A8B-40A1-4A28-8306-C3ABDFF639F2}"/>
-              </a:ext>
-            </a:extLst>
-          </p:cNvPr>
-          <p:cNvSpPr>
-            <a:spLocks noGrp="1"/>
-          </p:cNvSpPr>
-          <p:nvPr>
-            <p:ph type="title"/>
-          </p:nvPr>
+          <p:cNvPr id="8" name="Rectangle 7"/>
+          <p:cNvSpPr/>
+          <p:nvPr/>
         </p:nvSpPr>
         <p:spPr>
           <a:xfrm>
-            <a:off x="839788" y="457200"/>
-            <a:ext cx="3932237" cy="1600200"/>
+            <a:off x="0" y="5105400"/>
+            <a:ext cx="11292840" cy="1752600"/>
+          </a:xfrm>
+          <a:prstGeom prst="rect">
+            <a:avLst/>
+          </a:prstGeom>
+          <a:solidFill>
+            <a:srgbClr val="000000"/>
+          </a:solidFill>
+          <a:ln>
+            <a:noFill/>
+          </a:ln>
+        </p:spPr>
+        <p:style>
+          <a:lnRef idx="2">
+            <a:schemeClr val="accent1">
+              <a:shade val="50000"/>
+            </a:schemeClr>
+          </a:lnRef>
+          <a:fillRef idx="1">
+            <a:schemeClr val="accent1"/>
+          </a:fillRef>
+          <a:effectRef idx="0">
+            <a:schemeClr val="accent1"/>
+          </a:effectRef>
+          <a:fontRef idx="minor">
+            <a:schemeClr val="lt1"/>
+          </a:fontRef>
+        </p:style>
+      </p:sp>
+      <p:sp>
+        <p:nvSpPr>
+          <p:cNvPr id="2" name="Title 1"/>
+          <p:cNvSpPr>
+            <a:spLocks noGrp="1"/>
+          </p:cNvSpPr>
+          <p:nvPr>
+            <p:ph type="title"/>
+          </p:nvPr>
+        </p:nvSpPr>
+        <p:spPr>
+          <a:xfrm>
+            <a:off x="914400" y="5257800"/>
+            <a:ext cx="9982200" cy="914400"/>
           </a:xfrm>
         </p:spPr>
         <p:txBody>
-          <a:bodyPr anchor="b"/>
+          <a:bodyPr anchor="b">
+            <a:normAutofit/>
+          </a:bodyPr>
           <a:lstStyle>
             <a:lvl1pPr>
-              <a:defRPr sz="3200"/>
+              <a:defRPr sz="2800" b="0">
+                <a:solidFill>
+                  <a:schemeClr val="bg1"/>
+                </a:solidFill>
+              </a:defRPr>
             </a:lvl1pPr>
           </a:lstStyle>
           <a:p>
@@ -2508,20 +2818,15 @@
               <a:rPr lang="en-US"/>
               <a:t>Click to edit Master title style</a:t>
             </a:r>
-          </a:p>
-        </p:txBody>
-      </p:sp>
-      <p:sp>
-        <p:nvSpPr>
-          <p:cNvPr id="3" name="Picture Placeholder 2">
-            <a:extLst>
-              <a:ext uri="{FF2B5EF4-FFF2-40B4-BE49-F238E27FC236}">
-                <a16:creationId xmlns:a16="http://schemas.microsoft.com/office/drawing/2014/main" id="{8914A4B0-5E0D-43A1-9E1B-E8F0C333CB87}"/>
-              </a:ext>
-            </a:extLst>
-          </p:cNvPr>
-          <p:cNvSpPr>
-            <a:spLocks noGrp="1"/>
+            <a:endParaRPr lang="en-US" dirty="0"/>
+          </a:p>
+        </p:txBody>
+      </p:sp>
+      <p:sp>
+        <p:nvSpPr>
+          <p:cNvPr id="3" name="Picture Placeholder 2"/>
+          <p:cNvSpPr>
+            <a:spLocks noGrp="1" noChangeAspect="1"/>
           </p:cNvSpPr>
           <p:nvPr>
             <p:ph type="pic" idx="1"/>
@@ -2529,16 +2834,23 @@
         </p:nvSpPr>
         <p:spPr>
           <a:xfrm>
-            <a:off x="5183188" y="987425"/>
-            <a:ext cx="6172200" cy="4873625"/>
+            <a:off x="0" y="0"/>
+            <a:ext cx="11292840" cy="5128923"/>
           </a:xfrm>
+          <a:solidFill>
+            <a:schemeClr val="accent1"/>
+          </a:solidFill>
         </p:spPr>
         <p:txBody>
-          <a:bodyPr/>
+          <a:bodyPr anchor="t"/>
           <a:lstStyle>
             <a:lvl1pPr marL="0" indent="0">
               <a:buNone/>
-              <a:defRPr sz="3200"/>
+              <a:defRPr sz="3200">
+                <a:solidFill>
+                  <a:schemeClr val="bg1"/>
+                </a:solidFill>
+              </a:defRPr>
             </a:lvl1pPr>
             <a:lvl2pPr marL="457200" indent="0">
               <a:buNone/>
@@ -2574,19 +2886,17 @@
             </a:lvl9pPr>
           </a:lstStyle>
           <a:p>
-            <a:endParaRPr lang="en-US"/>
-          </a:p>
-        </p:txBody>
-      </p:sp>
-      <p:sp>
-        <p:nvSpPr>
-          <p:cNvPr id="4" name="Text Placeholder 3">
-            <a:extLst>
-              <a:ext uri="{FF2B5EF4-FFF2-40B4-BE49-F238E27FC236}">
-                <a16:creationId xmlns:a16="http://schemas.microsoft.com/office/drawing/2014/main" id="{1A16FC77-2970-4C81-B578-8B49BDE971DF}"/>
-              </a:ext>
-            </a:extLst>
-          </p:cNvPr>
+            <a:r>
+              <a:rPr lang="en-US"/>
+              <a:t>Click icon to add picture</a:t>
+            </a:r>
+            <a:endParaRPr lang="en-US" dirty="0"/>
+          </a:p>
+        </p:txBody>
+      </p:sp>
+      <p:sp>
+        <p:nvSpPr>
+          <p:cNvPr id="4" name="Text Placeholder 3"/>
           <p:cNvSpPr>
             <a:spLocks noGrp="1"/>
           </p:cNvSpPr>
@@ -2596,48 +2906,62 @@
         </p:nvSpPr>
         <p:spPr>
           <a:xfrm>
-            <a:off x="839788" y="2057400"/>
-            <a:ext cx="3932237" cy="3811588"/>
+            <a:off x="914400" y="6108589"/>
+            <a:ext cx="9982200" cy="597011"/>
           </a:xfrm>
         </p:spPr>
         <p:txBody>
-          <a:bodyPr/>
+          <a:bodyPr>
+            <a:normAutofit/>
+          </a:bodyPr>
           <a:lstStyle>
             <a:lvl1pPr marL="0" indent="0">
-              <a:buNone/>
-              <a:defRPr sz="1600"/>
+              <a:lnSpc>
+                <a:spcPct val="100000"/>
+              </a:lnSpc>
+              <a:spcBef>
+                <a:spcPts val="800"/>
+              </a:spcBef>
+              <a:buNone/>
+              <a:defRPr sz="1300">
+                <a:solidFill>
+                  <a:schemeClr val="bg1">
+                    <a:lumMod val="85000"/>
+                  </a:schemeClr>
+                </a:solidFill>
+              </a:defRPr>
             </a:lvl1pPr>
             <a:lvl2pPr marL="457200" indent="0">
               <a:buNone/>
-              <a:defRPr sz="1400"/>
+              <a:defRPr sz="1200"/>
             </a:lvl2pPr>
             <a:lvl3pPr marL="914400" indent="0">
               <a:buNone/>
-              <a:defRPr sz="1200"/>
+              <a:defRPr sz="1000"/>
             </a:lvl3pPr>
             <a:lvl4pPr marL="1371600" indent="0">
               <a:buNone/>
-              <a:defRPr sz="1000"/>
+              <a:defRPr sz="900"/>
             </a:lvl4pPr>
             <a:lvl5pPr marL="1828800" indent="0">
               <a:buNone/>
-              <a:defRPr sz="1000"/>
+              <a:defRPr sz="900"/>
             </a:lvl5pPr>
             <a:lvl6pPr marL="2286000" indent="0">
               <a:buNone/>
-              <a:defRPr sz="1000"/>
+              <a:defRPr sz="900"/>
             </a:lvl6pPr>
             <a:lvl7pPr marL="2743200" indent="0">
               <a:buNone/>
-              <a:defRPr sz="1000"/>
+              <a:defRPr sz="900"/>
             </a:lvl7pPr>
             <a:lvl8pPr marL="3200400" indent="0">
               <a:buNone/>
-              <a:defRPr sz="1000"/>
+              <a:defRPr sz="900"/>
             </a:lvl8pPr>
             <a:lvl9pPr marL="3657600" indent="0">
               <a:buNone/>
-              <a:defRPr sz="1000"/>
+              <a:defRPr sz="900"/>
             </a:lvl9pPr>
           </a:lstStyle>
           <a:p>
@@ -2651,13 +2975,7 @@
       </p:sp>
       <p:sp>
         <p:nvSpPr>
-          <p:cNvPr id="5" name="Date Placeholder 4">
-            <a:extLst>
-              <a:ext uri="{FF2B5EF4-FFF2-40B4-BE49-F238E27FC236}">
-                <a16:creationId xmlns:a16="http://schemas.microsoft.com/office/drawing/2014/main" id="{B6AC55D0-6708-4179-AEC5-09A54860A3F6}"/>
-              </a:ext>
-            </a:extLst>
-          </p:cNvPr>
+          <p:cNvPr id="5" name="Date Placeholder 4"/>
           <p:cNvSpPr>
             <a:spLocks noGrp="1"/>
           </p:cNvSpPr>
@@ -2680,13 +2998,7 @@
       </p:sp>
       <p:sp>
         <p:nvSpPr>
-          <p:cNvPr id="6" name="Footer Placeholder 5">
-            <a:extLst>
-              <a:ext uri="{FF2B5EF4-FFF2-40B4-BE49-F238E27FC236}">
-                <a16:creationId xmlns:a16="http://schemas.microsoft.com/office/drawing/2014/main" id="{0F893423-4936-4DF8-9D61-D92AA54582FE}"/>
-              </a:ext>
-            </a:extLst>
-          </p:cNvPr>
+          <p:cNvPr id="6" name="Footer Placeholder 5"/>
           <p:cNvSpPr>
             <a:spLocks noGrp="1"/>
           </p:cNvSpPr>
@@ -2699,19 +3011,13 @@
           <a:bodyPr/>
           <a:lstStyle/>
           <a:p>
-            <a:endParaRPr lang="en-US"/>
-          </a:p>
-        </p:txBody>
-      </p:sp>
-      <p:sp>
-        <p:nvSpPr>
-          <p:cNvPr id="7" name="Slide Number Placeholder 6">
-            <a:extLst>
-              <a:ext uri="{FF2B5EF4-FFF2-40B4-BE49-F238E27FC236}">
-                <a16:creationId xmlns:a16="http://schemas.microsoft.com/office/drawing/2014/main" id="{76B5B599-A3AA-4C90-8909-81445DC628DA}"/>
-              </a:ext>
-            </a:extLst>
-          </p:cNvPr>
+            <a:endParaRPr lang="en-US" dirty="0"/>
+          </a:p>
+        </p:txBody>
+      </p:sp>
+      <p:sp>
+        <p:nvSpPr>
+          <p:cNvPr id="7" name="Slide Number Placeholder 6"/>
           <p:cNvSpPr>
             <a:spLocks noGrp="1"/>
           </p:cNvSpPr>
@@ -2735,7 +3041,7 @@
     </p:spTree>
     <p:extLst>
       <p:ext uri="{BB962C8B-B14F-4D97-AF65-F5344CB8AC3E}">
-        <p14:creationId xmlns:p14="http://schemas.microsoft.com/office/powerpoint/2010/main" val="4251234321"/>
+        <p14:creationId xmlns:p14="http://schemas.microsoft.com/office/powerpoint/2010/main" val="2460544768"/>
       </p:ext>
     </p:extLst>
   </p:cSld>
@@ -2769,31 +3075,65 @@
       </p:grpSpPr>
       <p:sp>
         <p:nvSpPr>
-          <p:cNvPr id="2" name="Title Placeholder 1">
-            <a:extLst>
-              <a:ext uri="{FF2B5EF4-FFF2-40B4-BE49-F238E27FC236}">
-                <a16:creationId xmlns:a16="http://schemas.microsoft.com/office/drawing/2014/main" id="{C645774A-2AFC-49D4-A067-5F5354B155F5}"/>
-              </a:ext>
-            </a:extLst>
-          </p:cNvPr>
-          <p:cNvSpPr>
-            <a:spLocks noGrp="1"/>
-          </p:cNvSpPr>
-          <p:nvPr>
-            <p:ph type="title"/>
-          </p:nvPr>
+          <p:cNvPr id="7" name="Rectangle 6"/>
+          <p:cNvSpPr/>
+          <p:nvPr/>
         </p:nvSpPr>
         <p:spPr>
           <a:xfrm>
-            <a:off x="838200" y="365125"/>
-            <a:ext cx="10515600" cy="1325563"/>
+            <a:off x="11292840" y="0"/>
+            <a:ext cx="914400" cy="6858000"/>
+          </a:xfrm>
+          <a:prstGeom prst="rect">
+            <a:avLst/>
+          </a:prstGeom>
+          <a:solidFill>
+            <a:schemeClr val="tx2">
+              <a:lumMod val="75000"/>
+            </a:schemeClr>
+          </a:solidFill>
+          <a:ln>
+            <a:noFill/>
+          </a:ln>
+        </p:spPr>
+        <p:style>
+          <a:lnRef idx="2">
+            <a:schemeClr val="accent1">
+              <a:shade val="50000"/>
+            </a:schemeClr>
+          </a:lnRef>
+          <a:fillRef idx="1">
+            <a:schemeClr val="accent1"/>
+          </a:fillRef>
+          <a:effectRef idx="0">
+            <a:schemeClr val="accent1"/>
+          </a:effectRef>
+          <a:fontRef idx="minor">
+            <a:schemeClr val="lt1"/>
+          </a:fontRef>
+        </p:style>
+      </p:sp>
+      <p:sp>
+        <p:nvSpPr>
+          <p:cNvPr id="2" name="Title Placeholder 1"/>
+          <p:cNvSpPr>
+            <a:spLocks noGrp="1"/>
+          </p:cNvSpPr>
+          <p:nvPr>
+            <p:ph type="title"/>
+          </p:nvPr>
+        </p:nvSpPr>
+        <p:spPr>
+          <a:xfrm>
+            <a:off x="1261872" y="365760"/>
+            <a:ext cx="9692640" cy="1325562"/>
           </a:xfrm>
           <a:prstGeom prst="rect">
             <a:avLst/>
           </a:prstGeom>
         </p:spPr>
         <p:txBody>
-          <a:bodyPr vert="horz" lIns="91440" tIns="45720" rIns="91440" bIns="45720" rtlCol="0" anchor="ctr">
+          <a:bodyPr vert="horz" lIns="91440" tIns="45720" rIns="91440" bIns="45720" rtlCol="0" anchor="b">
             <a:normAutofit/>
           </a:bodyPr>
           <a:lstStyle/>
@@ -2802,18 +3142,13 @@
               <a:rPr lang="en-US"/>
               <a:t>Click to edit Master title style</a:t>
             </a:r>
-          </a:p>
-        </p:txBody>
-      </p:sp>
-      <p:sp>
-        <p:nvSpPr>
-          <p:cNvPr id="3" name="Text Placeholder 2">
-            <a:extLst>
-              <a:ext uri="{FF2B5EF4-FFF2-40B4-BE49-F238E27FC236}">
-                <a16:creationId xmlns:a16="http://schemas.microsoft.com/office/drawing/2014/main" id="{568E0443-646B-4E94-889C-08C782303AEB}"/>
-              </a:ext>
-            </a:extLst>
-          </p:cNvPr>
+            <a:endParaRPr lang="en-US" dirty="0"/>
+          </a:p>
+        </p:txBody>
+      </p:sp>
+      <p:sp>
+        <p:nvSpPr>
+          <p:cNvPr id="3" name="Text Placeholder 2"/>
           <p:cNvSpPr>
             <a:spLocks noGrp="1"/>
           </p:cNvSpPr>
@@ -2823,8 +3158,8 @@
         </p:nvSpPr>
         <p:spPr>
           <a:xfrm>
-            <a:off x="838200" y="1825625"/>
-            <a:ext cx="10515600" cy="4351338"/>
+            <a:off x="1261872" y="1828800"/>
+            <a:ext cx="8595360" cy="4351337"/>
           </a:xfrm>
           <a:prstGeom prst="rect">
             <a:avLst/>
@@ -2869,18 +3204,13 @@
               <a:rPr lang="en-US"/>
               <a:t>Fifth level</a:t>
             </a:r>
-          </a:p>
-        </p:txBody>
-      </p:sp>
-      <p:sp>
-        <p:nvSpPr>
-          <p:cNvPr id="4" name="Date Placeholder 3">
-            <a:extLst>
-              <a:ext uri="{FF2B5EF4-FFF2-40B4-BE49-F238E27FC236}">
-                <a16:creationId xmlns:a16="http://schemas.microsoft.com/office/drawing/2014/main" id="{329CC147-6F06-47C4-AA1B-603343835E7F}"/>
-              </a:ext>
-            </a:extLst>
-          </p:cNvPr>
+            <a:endParaRPr lang="en-US" dirty="0"/>
+          </a:p>
+        </p:txBody>
+      </p:sp>
+      <p:sp>
+        <p:nvSpPr>
+          <p:cNvPr id="4" name="Date Placeholder 3"/>
           <p:cNvSpPr>
             <a:spLocks noGrp="1"/>
           </p:cNvSpPr>
@@ -2889,9 +3219,9 @@
           </p:nvPr>
         </p:nvSpPr>
         <p:spPr>
-          <a:xfrm>
-            <a:off x="838200" y="6356350"/>
-            <a:ext cx="2743200" cy="365125"/>
+          <a:xfrm rot="16200000">
+            <a:off x="10797542" y="998537"/>
+            <a:ext cx="1904999" cy="365125"/>
           </a:xfrm>
           <a:prstGeom prst="rect">
             <a:avLst/>
@@ -2900,11 +3230,12 @@
         <p:txBody>
           <a:bodyPr vert="horz" lIns="91440" tIns="45720" rIns="91440" bIns="45720" rtlCol="0" anchor="ctr"/>
           <a:lstStyle>
-            <a:lvl1pPr algn="l">
-              <a:defRPr sz="1200">
+            <a:lvl1pPr algn="r">
+              <a:defRPr sz="1050" b="0">
                 <a:solidFill>
-                  <a:schemeClr val="tx1">
-                    <a:tint val="75000"/>
+                  <a:schemeClr val="tx2">
+                    <a:lumMod val="20000"/>
+                    <a:lumOff val="80000"/>
                   </a:schemeClr>
                 </a:solidFill>
               </a:defRPr>
@@ -2921,13 +3252,7 @@
       </p:sp>
       <p:sp>
         <p:nvSpPr>
-          <p:cNvPr id="5" name="Footer Placeholder 4">
-            <a:extLst>
-              <a:ext uri="{FF2B5EF4-FFF2-40B4-BE49-F238E27FC236}">
-                <a16:creationId xmlns:a16="http://schemas.microsoft.com/office/drawing/2014/main" id="{B0AA2C1E-878C-4184-8694-94EE38473496}"/>
-              </a:ext>
-            </a:extLst>
-          </p:cNvPr>
+          <p:cNvPr id="5" name="Footer Placeholder 4"/>
           <p:cNvSpPr>
             <a:spLocks noGrp="1"/>
           </p:cNvSpPr>
@@ -2936,9 +3261,9 @@
           </p:nvPr>
         </p:nvSpPr>
         <p:spPr>
-          <a:xfrm>
-            <a:off x="4038600" y="6356350"/>
-            <a:ext cx="4114800" cy="365125"/>
+          <a:xfrm rot="16200000">
+            <a:off x="9959341" y="4046537"/>
+            <a:ext cx="3581400" cy="365125"/>
           </a:xfrm>
           <a:prstGeom prst="rect">
             <a:avLst/>
@@ -2947,11 +3272,12 @@
         <p:txBody>
           <a:bodyPr vert="horz" lIns="91440" tIns="45720" rIns="91440" bIns="45720" rtlCol="0" anchor="ctr"/>
           <a:lstStyle>
-            <a:lvl1pPr algn="ctr">
-              <a:defRPr sz="1200">
+            <a:lvl1pPr algn="l">
+              <a:defRPr sz="1050">
                 <a:solidFill>
-                  <a:schemeClr val="tx1">
-                    <a:tint val="75000"/>
+                  <a:schemeClr val="tx2">
+                    <a:lumMod val="20000"/>
+                    <a:lumOff val="80000"/>
                   </a:schemeClr>
                 </a:solidFill>
               </a:defRPr>
@@ -2964,13 +3290,7 @@
       </p:sp>
       <p:sp>
         <p:nvSpPr>
-          <p:cNvPr id="6" name="Slide Number Placeholder 5">
-            <a:extLst>
-              <a:ext uri="{FF2B5EF4-FFF2-40B4-BE49-F238E27FC236}">
-                <a16:creationId xmlns:a16="http://schemas.microsoft.com/office/drawing/2014/main" id="{B742BD38-A55C-427E-8011-BEAFBA5B5945}"/>
-              </a:ext>
-            </a:extLst>
-          </p:cNvPr>
+          <p:cNvPr id="6" name="Slide Number Placeholder 5"/>
           <p:cNvSpPr>
             <a:spLocks noGrp="1"/>
           </p:cNvSpPr>
@@ -2980,21 +3300,24 @@
         </p:nvSpPr>
         <p:spPr>
           <a:xfrm>
-            <a:off x="8610600" y="6356350"/>
-            <a:ext cx="2743200" cy="365125"/>
+            <a:off x="11292840" y="6172200"/>
+            <a:ext cx="914400" cy="593725"/>
           </a:xfrm>
           <a:prstGeom prst="rect">
             <a:avLst/>
           </a:prstGeom>
         </p:spPr>
         <p:txBody>
-          <a:bodyPr vert="horz" lIns="91440" tIns="45720" rIns="91440" bIns="45720" rtlCol="0" anchor="ctr"/>
+          <a:bodyPr vert="horz" lIns="45720" tIns="45720" rIns="45720" bIns="45720" rtlCol="0" anchor="ctr">
+            <a:normAutofit/>
+          </a:bodyPr>
           <a:lstStyle>
-            <a:lvl1pPr algn="r">
-              <a:defRPr sz="1200">
+            <a:lvl1pPr algn="ctr">
+              <a:defRPr sz="3600">
                 <a:solidFill>
-                  <a:schemeClr val="tx1">
-                    <a:tint val="75000"/>
+                  <a:schemeClr val="tx2">
+                    <a:lumMod val="60000"/>
+                    <a:lumOff val="40000"/>
                   </a:schemeClr>
                 </a:solidFill>
               </a:defRPr>
@@ -3012,23 +3335,23 @@
     </p:spTree>
     <p:extLst>
       <p:ext uri="{BB962C8B-B14F-4D97-AF65-F5344CB8AC3E}">
-        <p14:creationId xmlns:p14="http://schemas.microsoft.com/office/powerpoint/2010/main" val="1507891121"/>
+        <p14:creationId xmlns:p14="http://schemas.microsoft.com/office/powerpoint/2010/main" val="4095335005"/>
       </p:ext>
     </p:extLst>
   </p:cSld>
   <p:clrMap bg1="lt1" tx1="dk1" bg2="lt2" tx2="dk2" accent1="accent1" accent2="accent2" accent3="accent3" accent4="accent4" accent5="accent5" accent6="accent6" hlink="hlink" folHlink="folHlink"/>
   <p:sldLayoutIdLst>
-    <p:sldLayoutId id="2147483649" r:id="rId1"/>
-    <p:sldLayoutId id="2147483650" r:id="rId2"/>
-    <p:sldLayoutId id="2147483651" r:id="rId3"/>
-    <p:sldLayoutId id="2147483652" r:id="rId4"/>
-    <p:sldLayoutId id="2147483653" r:id="rId5"/>
-    <p:sldLayoutId id="2147483654" r:id="rId6"/>
-    <p:sldLayoutId id="2147483655" r:id="rId7"/>
-    <p:sldLayoutId id="2147483656" r:id="rId8"/>
-    <p:sldLayoutId id="2147483657" r:id="rId9"/>
-    <p:sldLayoutId id="2147483658" r:id="rId10"/>
-    <p:sldLayoutId id="2147483659" r:id="rId11"/>
+    <p:sldLayoutId id="2147483733" r:id="rId1"/>
+    <p:sldLayoutId id="2147483734" r:id="rId2"/>
+    <p:sldLayoutId id="2147483735" r:id="rId3"/>
+    <p:sldLayoutId id="2147483736" r:id="rId4"/>
+    <p:sldLayoutId id="2147483737" r:id="rId5"/>
+    <p:sldLayoutId id="2147483738" r:id="rId6"/>
+    <p:sldLayoutId id="2147483739" r:id="rId7"/>
+    <p:sldLayoutId id="2147483740" r:id="rId8"/>
+    <p:sldLayoutId id="2147483741" r:id="rId9"/>
+    <p:sldLayoutId id="2147483742" r:id="rId10"/>
+    <p:sldLayoutId id="2147483743" r:id="rId11"/>
   </p:sldLayoutIdLst>
   <p:txStyles>
     <p:titleStyle>
@@ -3040,7 +3363,7 @@
           <a:spcPct val="0"/>
         </a:spcBef>
         <a:buNone/>
-        <a:defRPr sz="4400" kern="1200">
+        <a:defRPr sz="4400" kern="1200" spc="-50" baseline="0">
           <a:solidFill>
             <a:schemeClr val="tx1"/>
           </a:solidFill>
@@ -3051,16 +3374,23 @@
       </a:lvl1pPr>
     </p:titleStyle>
     <p:bodyStyle>
-      <a:lvl1pPr marL="228600" indent="-228600" algn="l" defTabSz="914400" rtl="0" eaLnBrk="1" latinLnBrk="0" hangingPunct="1">
+      <a:lvl1pPr marL="182880" indent="-182880" algn="l" defTabSz="914400" rtl="0" eaLnBrk="1" latinLnBrk="0" hangingPunct="1">
         <a:lnSpc>
-          <a:spcPct val="90000"/>
+          <a:spcPct val="95000"/>
         </a:lnSpc>
         <a:spcBef>
-          <a:spcPts val="1000"/>
+          <a:spcPts val="1400"/>
         </a:spcBef>
-        <a:buFont typeface="Arial" panose="020B0604020202020204" pitchFamily="34" charset="0"/>
+        <a:spcAft>
+          <a:spcPts val="200"/>
+        </a:spcAft>
+        <a:buClr>
+          <a:schemeClr val="accent1"/>
+        </a:buClr>
+        <a:buSzPct val="80000"/>
+        <a:buFont typeface="Arial" pitchFamily="34" charset="0"/>
         <a:buChar char="•"/>
-        <a:defRPr sz="2800" kern="1200">
+        <a:defRPr sz="1800" kern="1200" spc="10" baseline="0">
           <a:solidFill>
             <a:schemeClr val="tx1"/>
           </a:solidFill>
@@ -3069,144 +3399,216 @@
           <a:cs typeface="+mn-cs"/>
         </a:defRPr>
       </a:lvl1pPr>
-      <a:lvl2pPr marL="685800" indent="-228600" algn="l" defTabSz="914400" rtl="0" eaLnBrk="1" latinLnBrk="0" hangingPunct="1">
+      <a:lvl2pPr marL="457200" indent="-182880" algn="l" defTabSz="914400" rtl="0" eaLnBrk="1" latinLnBrk="0" hangingPunct="1">
         <a:lnSpc>
           <a:spcPct val="90000"/>
         </a:lnSpc>
         <a:spcBef>
-          <a:spcPts val="500"/>
+          <a:spcPts val="300"/>
         </a:spcBef>
-        <a:buFont typeface="Arial" panose="020B0604020202020204" pitchFamily="34" charset="0"/>
-        <a:buChar char="•"/>
-        <a:defRPr sz="2400" kern="1200">
+        <a:spcAft>
+          <a:spcPts val="300"/>
+        </a:spcAft>
+        <a:buClr>
+          <a:schemeClr val="accent1"/>
+        </a:buClr>
+        <a:buFont typeface="Wingdings 2" pitchFamily="18" charset="2"/>
+        <a:buChar char=""/>
+        <a:defRPr sz="1600" kern="1200">
           <a:solidFill>
-            <a:schemeClr val="tx1"/>
+            <a:schemeClr val="tx1">
+              <a:lumMod val="85000"/>
+              <a:lumOff val="15000"/>
+            </a:schemeClr>
           </a:solidFill>
           <a:latin typeface="+mn-lt"/>
           <a:ea typeface="+mn-ea"/>
           <a:cs typeface="+mn-cs"/>
         </a:defRPr>
       </a:lvl2pPr>
-      <a:lvl3pPr marL="1143000" indent="-228600" algn="l" defTabSz="914400" rtl="0" eaLnBrk="1" latinLnBrk="0" hangingPunct="1">
+      <a:lvl3pPr marL="731520" indent="-182880" algn="l" defTabSz="914400" rtl="0" eaLnBrk="1" latinLnBrk="0" hangingPunct="1">
         <a:lnSpc>
           <a:spcPct val="90000"/>
         </a:lnSpc>
         <a:spcBef>
-          <a:spcPts val="500"/>
+          <a:spcPts val="300"/>
         </a:spcBef>
-        <a:buFont typeface="Arial" panose="020B0604020202020204" pitchFamily="34" charset="0"/>
-        <a:buChar char="•"/>
-        <a:defRPr sz="2000" kern="1200">
+        <a:spcAft>
+          <a:spcPts val="300"/>
+        </a:spcAft>
+        <a:buClr>
+          <a:schemeClr val="accent1"/>
+        </a:buClr>
+        <a:buFont typeface="Wingdings 2" pitchFamily="18" charset="2"/>
+        <a:buChar char=""/>
+        <a:defRPr sz="1400" kern="1200">
           <a:solidFill>
-            <a:schemeClr val="tx1"/>
+            <a:schemeClr val="tx1">
+              <a:lumMod val="85000"/>
+              <a:lumOff val="15000"/>
+            </a:schemeClr>
           </a:solidFill>
           <a:latin typeface="+mn-lt"/>
           <a:ea typeface="+mn-ea"/>
           <a:cs typeface="+mn-cs"/>
         </a:defRPr>
       </a:lvl3pPr>
-      <a:lvl4pPr marL="1600200" indent="-228600" algn="l" defTabSz="914400" rtl="0" eaLnBrk="1" latinLnBrk="0" hangingPunct="1">
+      <a:lvl4pPr marL="1005840" indent="-182880" algn="l" defTabSz="914400" rtl="0" eaLnBrk="1" latinLnBrk="0" hangingPunct="1">
         <a:lnSpc>
           <a:spcPct val="90000"/>
         </a:lnSpc>
         <a:spcBef>
-          <a:spcPts val="500"/>
+          <a:spcPts val="300"/>
         </a:spcBef>
-        <a:buFont typeface="Arial" panose="020B0604020202020204" pitchFamily="34" charset="0"/>
-        <a:buChar char="•"/>
-        <a:defRPr sz="1800" kern="1200">
+        <a:spcAft>
+          <a:spcPts val="300"/>
+        </a:spcAft>
+        <a:buClr>
+          <a:schemeClr val="accent1"/>
+        </a:buClr>
+        <a:buFont typeface="Wingdings 2" pitchFamily="18" charset="2"/>
+        <a:buChar char=""/>
+        <a:defRPr sz="1400" kern="1200">
           <a:solidFill>
-            <a:schemeClr val="tx1"/>
+            <a:schemeClr val="tx1">
+              <a:lumMod val="85000"/>
+              <a:lumOff val="15000"/>
+            </a:schemeClr>
           </a:solidFill>
           <a:latin typeface="+mn-lt"/>
           <a:ea typeface="+mn-ea"/>
           <a:cs typeface="+mn-cs"/>
         </a:defRPr>
       </a:lvl4pPr>
-      <a:lvl5pPr marL="2057400" indent="-228600" algn="l" defTabSz="914400" rtl="0" eaLnBrk="1" latinLnBrk="0" hangingPunct="1">
+      <a:lvl5pPr marL="1280160" indent="-182880" algn="l" defTabSz="914400" rtl="0" eaLnBrk="1" latinLnBrk="0" hangingPunct="1">
         <a:lnSpc>
           <a:spcPct val="90000"/>
         </a:lnSpc>
         <a:spcBef>
-          <a:spcPts val="500"/>
+          <a:spcPts val="300"/>
         </a:spcBef>
-        <a:buFont typeface="Arial" panose="020B0604020202020204" pitchFamily="34" charset="0"/>
-        <a:buChar char="•"/>
-        <a:defRPr sz="1800" kern="1200">
+        <a:spcAft>
+          <a:spcPts val="300"/>
+        </a:spcAft>
+        <a:buClr>
+          <a:schemeClr val="accent1"/>
+        </a:buClr>
+        <a:buFont typeface="Wingdings 2" pitchFamily="18" charset="2"/>
+        <a:buChar char=""/>
+        <a:defRPr sz="1400" kern="1200">
           <a:solidFill>
-            <a:schemeClr val="tx1"/>
+            <a:schemeClr val="tx1">
+              <a:lumMod val="85000"/>
+              <a:lumOff val="15000"/>
+            </a:schemeClr>
           </a:solidFill>
           <a:latin typeface="+mn-lt"/>
           <a:ea typeface="+mn-ea"/>
           <a:cs typeface="+mn-cs"/>
         </a:defRPr>
       </a:lvl5pPr>
-      <a:lvl6pPr marL="2514600" indent="-228600" algn="l" defTabSz="914400" rtl="0" eaLnBrk="1" latinLnBrk="0" hangingPunct="1">
+      <a:lvl6pPr marL="1600000" indent="-228600" algn="l" defTabSz="914400" rtl="0" eaLnBrk="1" latinLnBrk="0" hangingPunct="1">
         <a:lnSpc>
           <a:spcPct val="90000"/>
         </a:lnSpc>
         <a:spcBef>
-          <a:spcPts val="500"/>
+          <a:spcPts val="300"/>
         </a:spcBef>
-        <a:buFont typeface="Arial" panose="020B0604020202020204" pitchFamily="34" charset="0"/>
-        <a:buChar char="•"/>
-        <a:defRPr sz="1800" kern="1200">
+        <a:spcAft>
+          <a:spcPts val="300"/>
+        </a:spcAft>
+        <a:buClr>
+          <a:schemeClr val="accent1"/>
+        </a:buClr>
+        <a:buFont typeface="Wingdings 2" pitchFamily="18" charset="2"/>
+        <a:buChar char=""/>
+        <a:defRPr sz="1400" kern="1200">
           <a:solidFill>
-            <a:schemeClr val="tx1"/>
+            <a:schemeClr val="tx1">
+              <a:lumMod val="85000"/>
+              <a:lumOff val="15000"/>
+            </a:schemeClr>
           </a:solidFill>
           <a:latin typeface="+mn-lt"/>
           <a:ea typeface="+mn-ea"/>
           <a:cs typeface="+mn-cs"/>
         </a:defRPr>
       </a:lvl6pPr>
-      <a:lvl7pPr marL="2971800" indent="-228600" algn="l" defTabSz="914400" rtl="0" eaLnBrk="1" latinLnBrk="0" hangingPunct="1">
+      <a:lvl7pPr marL="1900000" indent="-228600" algn="l" defTabSz="914400" rtl="0" eaLnBrk="1" latinLnBrk="0" hangingPunct="1">
         <a:lnSpc>
           <a:spcPct val="90000"/>
         </a:lnSpc>
         <a:spcBef>
-          <a:spcPts val="500"/>
+          <a:spcPts val="300"/>
         </a:spcBef>
-        <a:buFont typeface="Arial" panose="020B0604020202020204" pitchFamily="34" charset="0"/>
-        <a:buChar char="•"/>
-        <a:defRPr sz="1800" kern="1200">
+        <a:spcAft>
+          <a:spcPts val="300"/>
+        </a:spcAft>
+        <a:buClr>
+          <a:schemeClr val="accent1"/>
+        </a:buClr>
+        <a:buFont typeface="Wingdings 2" pitchFamily="18" charset="2"/>
+        <a:buChar char=""/>
+        <a:defRPr sz="1400" kern="1200">
           <a:solidFill>
-            <a:schemeClr val="tx1"/>
+            <a:schemeClr val="tx1">
+              <a:lumMod val="85000"/>
+              <a:lumOff val="15000"/>
+            </a:schemeClr>
           </a:solidFill>
           <a:latin typeface="+mn-lt"/>
           <a:ea typeface="+mn-ea"/>
           <a:cs typeface="+mn-cs"/>
         </a:defRPr>
       </a:lvl7pPr>
-      <a:lvl8pPr marL="3429000" indent="-228600" algn="l" defTabSz="914400" rtl="0" eaLnBrk="1" latinLnBrk="0" hangingPunct="1">
+      <a:lvl8pPr marL="2200000" indent="-228600" algn="l" defTabSz="914400" rtl="0" eaLnBrk="1" latinLnBrk="0" hangingPunct="1">
         <a:lnSpc>
           <a:spcPct val="90000"/>
         </a:lnSpc>
         <a:spcBef>
-          <a:spcPts val="500"/>
+          <a:spcPts val="300"/>
         </a:spcBef>
-        <a:buFont typeface="Arial" panose="020B0604020202020204" pitchFamily="34" charset="0"/>
-        <a:buChar char="•"/>
-        <a:defRPr sz="1800" kern="1200">
+        <a:spcAft>
+          <a:spcPts val="300"/>
+        </a:spcAft>
+        <a:buClr>
+          <a:schemeClr val="accent1"/>
+        </a:buClr>
+        <a:buFont typeface="Wingdings 2" pitchFamily="18" charset="2"/>
+        <a:buChar char=""/>
+        <a:defRPr sz="1400" kern="1200">
           <a:solidFill>
-            <a:schemeClr val="tx1"/>
+            <a:schemeClr val="tx1">
+              <a:lumMod val="85000"/>
+              <a:lumOff val="15000"/>
+            </a:schemeClr>
           </a:solidFill>
           <a:latin typeface="+mn-lt"/>
           <a:ea typeface="+mn-ea"/>
           <a:cs typeface="+mn-cs"/>
         </a:defRPr>
       </a:lvl8pPr>
-      <a:lvl9pPr marL="3886200" indent="-228600" algn="l" defTabSz="914400" rtl="0" eaLnBrk="1" latinLnBrk="0" hangingPunct="1">
+      <a:lvl9pPr marL="2500000" indent="-228600" algn="l" defTabSz="914400" rtl="0" eaLnBrk="1" latinLnBrk="0" hangingPunct="1">
         <a:lnSpc>
           <a:spcPct val="90000"/>
         </a:lnSpc>
         <a:spcBef>
-          <a:spcPts val="500"/>
+          <a:spcPts val="300"/>
         </a:spcBef>
-        <a:buFont typeface="Arial" panose="020B0604020202020204" pitchFamily="34" charset="0"/>
-        <a:buChar char="•"/>
-        <a:defRPr sz="1800" kern="1200">
+        <a:spcAft>
+          <a:spcPts val="300"/>
+        </a:spcAft>
+        <a:buClr>
+          <a:schemeClr val="accent1"/>
+        </a:buClr>
+        <a:buFont typeface="Wingdings 2" pitchFamily="18" charset="2"/>
+        <a:buChar char=""/>
+        <a:defRPr sz="1400" kern="1200">
           <a:solidFill>
-            <a:schemeClr val="tx1"/>
+            <a:schemeClr val="tx1">
+              <a:lumMod val="85000"/>
+              <a:lumOff val="15000"/>
+            </a:schemeClr>
           </a:solidFill>
           <a:latin typeface="+mn-lt"/>
           <a:ea typeface="+mn-ea"/>
@@ -3330,6 +3732,771 @@
           <a:chExt cx="0" cy="0"/>
         </a:xfrm>
       </p:grpSpPr>
+      <p:sp>
+        <p:nvSpPr>
+          <p:cNvPr id="2" name="Title 1">
+            <a:extLst>
+              <a:ext uri="{FF2B5EF4-FFF2-40B4-BE49-F238E27FC236}">
+                <a16:creationId xmlns:a16="http://schemas.microsoft.com/office/drawing/2014/main" id="{1CE7EA1D-3D98-4FDA-9942-F9A3C8B5AE33}"/>
+              </a:ext>
+            </a:extLst>
+          </p:cNvPr>
+          <p:cNvSpPr>
+            <a:spLocks noGrp="1"/>
+          </p:cNvSpPr>
+          <p:nvPr>
+            <p:ph type="ctrTitle"/>
+          </p:nvPr>
+        </p:nvSpPr>
+        <p:spPr>
+          <a:xfrm>
+            <a:off x="1386840" y="2284827"/>
+            <a:ext cx="9418320" cy="1158241"/>
+          </a:xfrm>
+        </p:spPr>
+        <p:txBody>
+          <a:bodyPr/>
+          <a:lstStyle/>
+          <a:p>
+            <a:pPr algn="ctr"/>
+            <a:r>
+              <a:rPr lang="en-US" b="1" dirty="0" err="1"/>
+              <a:t>ConfigNVPSim</a:t>
+            </a:r>
+            <a:endParaRPr lang="en-US" b="1" dirty="0"/>
+          </a:p>
+        </p:txBody>
+      </p:sp>
+      <p:sp>
+        <p:nvSpPr>
+          <p:cNvPr id="3" name="Subtitle 2">
+            <a:extLst>
+              <a:ext uri="{FF2B5EF4-FFF2-40B4-BE49-F238E27FC236}">
+                <a16:creationId xmlns:a16="http://schemas.microsoft.com/office/drawing/2014/main" id="{F501072F-B26B-4179-AD13-21DC6E071FA6}"/>
+              </a:ext>
+            </a:extLst>
+          </p:cNvPr>
+          <p:cNvSpPr>
+            <a:spLocks noGrp="1"/>
+          </p:cNvSpPr>
+          <p:nvPr>
+            <p:ph type="subTitle" idx="1"/>
+          </p:nvPr>
+        </p:nvSpPr>
+        <p:spPr>
+          <a:xfrm>
+            <a:off x="1386840" y="3443068"/>
+            <a:ext cx="9418320" cy="476191"/>
+          </a:xfrm>
+        </p:spPr>
+        <p:txBody>
+          <a:bodyPr/>
+          <a:lstStyle/>
+          <a:p>
+            <a:pPr algn="ctr"/>
+            <a:r>
+              <a:rPr lang="en-US" b="1" dirty="0"/>
+              <a:t>GEM5 Based Configurable NVP Simulator</a:t>
+            </a:r>
+          </a:p>
+        </p:txBody>
+      </p:sp>
+      <p:graphicFrame>
+        <p:nvGraphicFramePr>
+          <p:cNvPr id="4" name="Table 3">
+            <a:extLst>
+              <a:ext uri="{FF2B5EF4-FFF2-40B4-BE49-F238E27FC236}">
+                <a16:creationId xmlns:a16="http://schemas.microsoft.com/office/drawing/2014/main" id="{C8963D07-8EEE-452E-852C-D4A4789142A8}"/>
+              </a:ext>
+            </a:extLst>
+          </p:cNvPr>
+          <p:cNvGraphicFramePr>
+            <a:graphicFrameLocks noGrp="1"/>
+          </p:cNvGraphicFramePr>
+          <p:nvPr>
+            <p:extLst>
+              <p:ext uri="{D42A27DB-BD31-4B8C-83A1-F6EECF244321}">
+                <p14:modId xmlns:p14="http://schemas.microsoft.com/office/powerpoint/2010/main" val="2277384510"/>
+              </p:ext>
+            </p:extLst>
+          </p:nvPr>
+        </p:nvGraphicFramePr>
+        <p:xfrm>
+          <a:off x="2032000" y="5330249"/>
+          <a:ext cx="8127999" cy="1158240"/>
+        </p:xfrm>
+        <a:graphic>
+          <a:graphicData uri="http://schemas.openxmlformats.org/drawingml/2006/table">
+            <a:tbl>
+              <a:tblPr firstRow="1" bandRow="1">
+                <a:tableStyleId>{073A0DAA-6AF3-43AB-8588-CEC1D06C72B9}</a:tableStyleId>
+              </a:tblPr>
+              <a:tblGrid>
+                <a:gridCol w="2709333">
+                  <a:extLst>
+                    <a:ext uri="{9D8B030D-6E8A-4147-A177-3AD203B41FA5}">
+                      <a16:colId xmlns:a16="http://schemas.microsoft.com/office/drawing/2014/main" val="3093791821"/>
+                    </a:ext>
+                  </a:extLst>
+                </a:gridCol>
+                <a:gridCol w="2709333">
+                  <a:extLst>
+                    <a:ext uri="{9D8B030D-6E8A-4147-A177-3AD203B41FA5}">
+                      <a16:colId xmlns:a16="http://schemas.microsoft.com/office/drawing/2014/main" val="271596103"/>
+                    </a:ext>
+                  </a:extLst>
+                </a:gridCol>
+                <a:gridCol w="2709333">
+                  <a:extLst>
+                    <a:ext uri="{9D8B030D-6E8A-4147-A177-3AD203B41FA5}">
+                      <a16:colId xmlns:a16="http://schemas.microsoft.com/office/drawing/2014/main" val="2139432658"/>
+                    </a:ext>
+                  </a:extLst>
+                </a:gridCol>
+              </a:tblGrid>
+              <a:tr h="370840">
+                <a:tc>
+                  <a:txBody>
+                    <a:bodyPr/>
+                    <a:lstStyle/>
+                    <a:p>
+                      <a:pPr algn="ctr"/>
+                      <a:r>
+                        <a:rPr lang="en-US" sz="1400" b="0" i="0" kern="1200" dirty="0">
+                          <a:solidFill>
+                            <a:schemeClr val="lt1"/>
+                          </a:solidFill>
+                          <a:effectLst/>
+                          <a:latin typeface="+mn-lt"/>
+                          <a:ea typeface="+mn-ea"/>
+                          <a:cs typeface="+mn-cs"/>
+                        </a:rPr>
+                        <a:t>Gulsum Gudukbay</a:t>
+                      </a:r>
+                    </a:p>
+                    <a:p>
+                      <a:pPr algn="ctr"/>
+                      <a:r>
+                        <a:rPr lang="en-US" sz="1400" b="0" i="0" kern="1200" dirty="0">
+                          <a:solidFill>
+                            <a:schemeClr val="lt1"/>
+                          </a:solidFill>
+                          <a:effectLst/>
+                          <a:latin typeface="+mn-lt"/>
+                          <a:ea typeface="+mn-ea"/>
+                          <a:cs typeface="+mn-cs"/>
+                        </a:rPr>
+                        <a:t>Computer Science and Engineering</a:t>
+                      </a:r>
+                    </a:p>
+                    <a:p>
+                      <a:pPr algn="ctr"/>
+                      <a:r>
+                        <a:rPr lang="en-US" sz="1400" b="0" i="0" kern="1200" dirty="0">
+                          <a:solidFill>
+                            <a:schemeClr val="lt1"/>
+                          </a:solidFill>
+                          <a:effectLst/>
+                          <a:latin typeface="+mn-lt"/>
+                          <a:ea typeface="+mn-ea"/>
+                          <a:cs typeface="+mn-cs"/>
+                        </a:rPr>
+                        <a:t>Pennsylvania State University</a:t>
+                      </a:r>
+                    </a:p>
+                    <a:p>
+                      <a:pPr algn="ctr"/>
+                      <a:r>
+                        <a:rPr lang="en-US" sz="1400" b="0" i="0" kern="1200" dirty="0">
+                          <a:solidFill>
+                            <a:schemeClr val="lt1"/>
+                          </a:solidFill>
+                          <a:effectLst/>
+                          <a:latin typeface="+mn-lt"/>
+                          <a:ea typeface="+mn-ea"/>
+                          <a:cs typeface="+mn-cs"/>
+                        </a:rPr>
+                        <a:t>gxg5138@psu.edu</a:t>
+                      </a:r>
+                    </a:p>
+                  </a:txBody>
+                  <a:tcPr>
+                    <a:lnL w="12700" cmpd="sng">
+                      <a:noFill/>
+                    </a:lnL>
+                    <a:lnR w="12700" cmpd="sng">
+                      <a:noFill/>
+                    </a:lnR>
+                    <a:lnT w="12700" cmpd="sng">
+                      <a:noFill/>
+                    </a:lnT>
+                    <a:lnB w="38100" cmpd="sng">
+                      <a:noFill/>
+                    </a:lnB>
+                    <a:lnTlToBr w="12700" cmpd="sng">
+                      <a:noFill/>
+                      <a:prstDash val="solid"/>
+                    </a:lnTlToBr>
+                    <a:lnBlToTr w="12700" cmpd="sng">
+                      <a:noFill/>
+                      <a:prstDash val="solid"/>
+                    </a:lnBlToTr>
+                    <a:noFill/>
+                  </a:tcPr>
+                </a:tc>
+                <a:tc>
+                  <a:txBody>
+                    <a:bodyPr/>
+                    <a:lstStyle/>
+                    <a:p>
+                      <a:pPr algn="ctr"/>
+                      <a:r>
+                        <a:rPr lang="en-US" sz="1400" b="0" i="0" kern="1200" dirty="0" err="1">
+                          <a:solidFill>
+                            <a:schemeClr val="lt1"/>
+                          </a:solidFill>
+                          <a:effectLst/>
+                          <a:latin typeface="+mn-lt"/>
+                          <a:ea typeface="+mn-ea"/>
+                          <a:cs typeface="+mn-cs"/>
+                        </a:rPr>
+                        <a:t>Sethu</a:t>
+                      </a:r>
+                      <a:r>
+                        <a:rPr lang="en-US" sz="1400" b="0" i="0" kern="1200" dirty="0">
+                          <a:solidFill>
+                            <a:schemeClr val="lt1"/>
+                          </a:solidFill>
+                          <a:effectLst/>
+                          <a:latin typeface="+mn-lt"/>
+                          <a:ea typeface="+mn-ea"/>
+                          <a:cs typeface="+mn-cs"/>
+                        </a:rPr>
+                        <a:t> Jose</a:t>
+                      </a:r>
+                    </a:p>
+                    <a:p>
+                      <a:pPr algn="ctr"/>
+                      <a:r>
+                        <a:rPr lang="en-US" sz="1400" b="0" i="0" kern="1200" dirty="0">
+                          <a:solidFill>
+                            <a:schemeClr val="lt1"/>
+                          </a:solidFill>
+                          <a:effectLst/>
+                          <a:latin typeface="+mn-lt"/>
+                          <a:ea typeface="+mn-ea"/>
+                          <a:cs typeface="+mn-cs"/>
+                        </a:rPr>
+                        <a:t>Computer Science and Engineering</a:t>
+                      </a:r>
+                    </a:p>
+                    <a:p>
+                      <a:pPr algn="ctr"/>
+                      <a:r>
+                        <a:rPr lang="en-US" sz="1400" b="0" i="0" kern="1200" dirty="0">
+                          <a:solidFill>
+                            <a:schemeClr val="lt1"/>
+                          </a:solidFill>
+                          <a:effectLst/>
+                          <a:latin typeface="+mn-lt"/>
+                          <a:ea typeface="+mn-ea"/>
+                          <a:cs typeface="+mn-cs"/>
+                        </a:rPr>
+                        <a:t>Pennsylvania State University</a:t>
+                      </a:r>
+                    </a:p>
+                    <a:p>
+                      <a:pPr algn="ctr"/>
+                      <a:r>
+                        <a:rPr lang="en-US" sz="1400" b="0" i="0" kern="1200" dirty="0">
+                          <a:solidFill>
+                            <a:schemeClr val="lt1"/>
+                          </a:solidFill>
+                          <a:effectLst/>
+                          <a:latin typeface="+mn-lt"/>
+                          <a:ea typeface="+mn-ea"/>
+                          <a:cs typeface="+mn-cs"/>
+                        </a:rPr>
+                        <a:t>sxj487@psu.edu</a:t>
+                      </a:r>
+                    </a:p>
+                  </a:txBody>
+                  <a:tcPr>
+                    <a:lnL w="12700" cmpd="sng">
+                      <a:noFill/>
+                    </a:lnL>
+                    <a:lnR w="12700" cmpd="sng">
+                      <a:noFill/>
+                    </a:lnR>
+                    <a:lnT w="12700" cmpd="sng">
+                      <a:noFill/>
+                    </a:lnT>
+                    <a:lnB w="38100" cmpd="sng">
+                      <a:noFill/>
+                    </a:lnB>
+                    <a:lnTlToBr w="12700" cmpd="sng">
+                      <a:noFill/>
+                      <a:prstDash val="solid"/>
+                    </a:lnTlToBr>
+                    <a:lnBlToTr w="12700" cmpd="sng">
+                      <a:noFill/>
+                      <a:prstDash val="solid"/>
+                    </a:lnBlToTr>
+                    <a:noFill/>
+                  </a:tcPr>
+                </a:tc>
+                <a:tc>
+                  <a:txBody>
+                    <a:bodyPr/>
+                    <a:lstStyle/>
+                    <a:p>
+                      <a:pPr algn="ctr"/>
+                      <a:r>
+                        <a:rPr lang="en-US" sz="1400" b="0" i="0" kern="1200" dirty="0" err="1">
+                          <a:solidFill>
+                            <a:schemeClr val="lt1"/>
+                          </a:solidFill>
+                          <a:effectLst/>
+                          <a:latin typeface="+mn-lt"/>
+                          <a:ea typeface="+mn-ea"/>
+                          <a:cs typeface="+mn-cs"/>
+                        </a:rPr>
+                        <a:t>Vineetha</a:t>
+                      </a:r>
+                      <a:r>
+                        <a:rPr lang="en-US" sz="1400" b="0" i="0" kern="1200" dirty="0">
+                          <a:solidFill>
+                            <a:schemeClr val="lt1"/>
+                          </a:solidFill>
+                          <a:effectLst/>
+                          <a:latin typeface="+mn-lt"/>
+                          <a:ea typeface="+mn-ea"/>
+                          <a:cs typeface="+mn-cs"/>
+                        </a:rPr>
+                        <a:t> </a:t>
+                      </a:r>
+                      <a:r>
+                        <a:rPr lang="en-US" sz="1400" b="0" i="0" kern="1200" dirty="0" err="1">
+                          <a:solidFill>
+                            <a:schemeClr val="lt1"/>
+                          </a:solidFill>
+                          <a:effectLst/>
+                          <a:latin typeface="+mn-lt"/>
+                          <a:ea typeface="+mn-ea"/>
+                          <a:cs typeface="+mn-cs"/>
+                        </a:rPr>
+                        <a:t>Govindaraj</a:t>
+                      </a:r>
+                      <a:endParaRPr lang="en-US" sz="1400" b="0" i="0" kern="1200" dirty="0">
+                        <a:solidFill>
+                          <a:schemeClr val="lt1"/>
+                        </a:solidFill>
+                        <a:effectLst/>
+                        <a:latin typeface="+mn-lt"/>
+                        <a:ea typeface="+mn-ea"/>
+                        <a:cs typeface="+mn-cs"/>
+                      </a:endParaRPr>
+                    </a:p>
+                    <a:p>
+                      <a:pPr algn="ctr"/>
+                      <a:r>
+                        <a:rPr lang="en-US" sz="1400" b="0" i="0" kern="1200" dirty="0">
+                          <a:solidFill>
+                            <a:schemeClr val="lt1"/>
+                          </a:solidFill>
+                          <a:effectLst/>
+                          <a:latin typeface="+mn-lt"/>
+                          <a:ea typeface="+mn-ea"/>
+                          <a:cs typeface="+mn-cs"/>
+                        </a:rPr>
+                        <a:t>Computer Science and Engineering</a:t>
+                      </a:r>
+                    </a:p>
+                    <a:p>
+                      <a:pPr algn="ctr"/>
+                      <a:r>
+                        <a:rPr lang="en-US" sz="1400" b="0" i="0" kern="1200" dirty="0">
+                          <a:solidFill>
+                            <a:schemeClr val="lt1"/>
+                          </a:solidFill>
+                          <a:effectLst/>
+                          <a:latin typeface="+mn-lt"/>
+                          <a:ea typeface="+mn-ea"/>
+                          <a:cs typeface="+mn-cs"/>
+                        </a:rPr>
+                        <a:t>Pennsylvania State University</a:t>
+                      </a:r>
+                    </a:p>
+                    <a:p>
+                      <a:pPr algn="ctr"/>
+                      <a:r>
+                        <a:rPr lang="en-US" sz="1400" b="0" i="0" kern="1200" dirty="0">
+                          <a:solidFill>
+                            <a:schemeClr val="lt1"/>
+                          </a:solidFill>
+                          <a:effectLst/>
+                          <a:latin typeface="+mn-lt"/>
+                          <a:ea typeface="+mn-ea"/>
+                          <a:cs typeface="+mn-cs"/>
+                        </a:rPr>
+                        <a:t>vzg99@psu.edu</a:t>
+                      </a:r>
+                    </a:p>
+                  </a:txBody>
+                  <a:tcPr>
+                    <a:lnL w="12700" cmpd="sng">
+                      <a:noFill/>
+                    </a:lnL>
+                    <a:lnR w="12700" cmpd="sng">
+                      <a:noFill/>
+                    </a:lnR>
+                    <a:lnT w="12700" cmpd="sng">
+                      <a:noFill/>
+                    </a:lnT>
+                    <a:lnB w="38100" cmpd="sng">
+                      <a:noFill/>
+                    </a:lnB>
+                    <a:lnTlToBr w="12700" cmpd="sng">
+                      <a:noFill/>
+                      <a:prstDash val="solid"/>
+                    </a:lnTlToBr>
+                    <a:lnBlToTr w="12700" cmpd="sng">
+                      <a:noFill/>
+                      <a:prstDash val="solid"/>
+                    </a:lnBlToTr>
+                    <a:noFill/>
+                  </a:tcPr>
+                </a:tc>
+                <a:extLst>
+                  <a:ext uri="{0D108BD9-81ED-4DB2-BD59-A6C34878D82A}">
+                    <a16:rowId xmlns:a16="http://schemas.microsoft.com/office/drawing/2014/main" val="152387968"/>
+                  </a:ext>
+                </a:extLst>
+              </a:tr>
+            </a:tbl>
+          </a:graphicData>
+        </a:graphic>
+      </p:graphicFrame>
+    </p:spTree>
+    <p:extLst>
+      <p:ext uri="{BB962C8B-B14F-4D97-AF65-F5344CB8AC3E}">
+        <p14:creationId xmlns:p14="http://schemas.microsoft.com/office/powerpoint/2010/main" val="2264776561"/>
+      </p:ext>
+    </p:extLst>
+  </p:cSld>
+  <p:clrMapOvr>
+    <a:masterClrMapping/>
+  </p:clrMapOvr>
+</p:sld>
+</file>
+
+<file path=ppt/slides/slide10.xml><?xml version="1.0" encoding="utf-8"?>
+<p:sld xmlns:a="http://schemas.openxmlformats.org/drawingml/2006/main" xmlns:r="http://schemas.openxmlformats.org/officeDocument/2006/relationships" xmlns:p="http://schemas.openxmlformats.org/presentationml/2006/main">
+  <p:cSld>
+    <p:bg>
+      <p:bgPr>
+        <a:solidFill>
+          <a:schemeClr val="tx1">
+            <a:lumMod val="85000"/>
+          </a:schemeClr>
+        </a:solidFill>
+        <a:effectLst/>
+      </p:bgPr>
+    </p:bg>
+    <p:spTree>
+      <p:nvGrpSpPr>
+        <p:cNvPr id="1" name=""/>
+        <p:cNvGrpSpPr/>
+        <p:nvPr/>
+      </p:nvGrpSpPr>
+      <p:grpSpPr>
+        <a:xfrm>
+          <a:off x="0" y="0"/>
+          <a:ext cx="0" cy="0"/>
+          <a:chOff x="0" y="0"/>
+          <a:chExt cx="0" cy="0"/>
+        </a:xfrm>
+      </p:grpSpPr>
+      <p:pic>
+        <p:nvPicPr>
+          <p:cNvPr id="3" name="Picture 2">
+            <a:extLst>
+              <a:ext uri="{FF2B5EF4-FFF2-40B4-BE49-F238E27FC236}">
+                <a16:creationId xmlns:a16="http://schemas.microsoft.com/office/drawing/2014/main" id="{D79CDCBF-8EC0-47BD-A807-5D22AF0C96BB}"/>
+              </a:ext>
+            </a:extLst>
+          </p:cNvPr>
+          <p:cNvPicPr>
+            <a:picLocks noChangeAspect="1"/>
+          </p:cNvPicPr>
+          <p:nvPr/>
+        </p:nvPicPr>
+        <p:blipFill>
+          <a:blip r:embed="rId2"/>
+          <a:stretch>
+            <a:fillRect/>
+          </a:stretch>
+        </p:blipFill>
+        <p:spPr>
+          <a:xfrm>
+            <a:off x="-3674" y="281354"/>
+            <a:ext cx="12195674" cy="6293395"/>
+          </a:xfrm>
+          <a:prstGeom prst="rect">
+            <a:avLst/>
+          </a:prstGeom>
+        </p:spPr>
+      </p:pic>
+    </p:spTree>
+    <p:extLst>
+      <p:ext uri="{BB962C8B-B14F-4D97-AF65-F5344CB8AC3E}">
+        <p14:creationId xmlns:p14="http://schemas.microsoft.com/office/powerpoint/2010/main" val="3795526922"/>
+      </p:ext>
+    </p:extLst>
+  </p:cSld>
+  <p:clrMapOvr>
+    <a:masterClrMapping/>
+  </p:clrMapOvr>
+</p:sld>
+</file>
+
+<file path=ppt/slides/slide11.xml><?xml version="1.0" encoding="utf-8"?>
+<p:sld xmlns:a="http://schemas.openxmlformats.org/drawingml/2006/main" xmlns:r="http://schemas.openxmlformats.org/officeDocument/2006/relationships" xmlns:p="http://schemas.openxmlformats.org/presentationml/2006/main">
+  <p:cSld>
+    <p:bg>
+      <p:bgPr>
+        <a:solidFill>
+          <a:schemeClr val="tx1">
+            <a:lumMod val="85000"/>
+          </a:schemeClr>
+        </a:solidFill>
+        <a:effectLst/>
+      </p:bgPr>
+    </p:bg>
+    <p:spTree>
+      <p:nvGrpSpPr>
+        <p:cNvPr id="1" name=""/>
+        <p:cNvGrpSpPr/>
+        <p:nvPr/>
+      </p:nvGrpSpPr>
+      <p:grpSpPr>
+        <a:xfrm>
+          <a:off x="0" y="0"/>
+          <a:ext cx="0" cy="0"/>
+          <a:chOff x="0" y="0"/>
+          <a:chExt cx="0" cy="0"/>
+        </a:xfrm>
+      </p:grpSpPr>
+      <p:pic>
+        <p:nvPicPr>
+          <p:cNvPr id="8" name="Picture 7">
+            <a:extLst>
+              <a:ext uri="{FF2B5EF4-FFF2-40B4-BE49-F238E27FC236}">
+                <a16:creationId xmlns:a16="http://schemas.microsoft.com/office/drawing/2014/main" id="{DAB4F0E6-C363-424E-8220-88833C7ACE63}"/>
+              </a:ext>
+            </a:extLst>
+          </p:cNvPr>
+          <p:cNvPicPr>
+            <a:picLocks noChangeAspect="1"/>
+          </p:cNvPicPr>
+          <p:nvPr/>
+        </p:nvPicPr>
+        <p:blipFill>
+          <a:blip r:embed="rId2"/>
+          <a:stretch>
+            <a:fillRect/>
+          </a:stretch>
+        </p:blipFill>
+        <p:spPr>
+          <a:xfrm>
+            <a:off x="16725" y="351693"/>
+            <a:ext cx="12245396" cy="6198576"/>
+          </a:xfrm>
+          <a:prstGeom prst="rect">
+            <a:avLst/>
+          </a:prstGeom>
+        </p:spPr>
+      </p:pic>
+    </p:spTree>
+    <p:extLst>
+      <p:ext uri="{BB962C8B-B14F-4D97-AF65-F5344CB8AC3E}">
+        <p14:creationId xmlns:p14="http://schemas.microsoft.com/office/powerpoint/2010/main" val="1561767516"/>
+      </p:ext>
+    </p:extLst>
+  </p:cSld>
+  <p:clrMapOvr>
+    <a:masterClrMapping/>
+  </p:clrMapOvr>
+</p:sld>
+</file>
+
+<file path=ppt/slides/slide12.xml><?xml version="1.0" encoding="utf-8"?>
+<p:sld xmlns:a="http://schemas.openxmlformats.org/drawingml/2006/main" xmlns:r="http://schemas.openxmlformats.org/officeDocument/2006/relationships" xmlns:p="http://schemas.openxmlformats.org/presentationml/2006/main">
+  <p:cSld>
+    <p:bg>
+      <p:bgPr>
+        <a:solidFill>
+          <a:schemeClr val="tx1">
+            <a:lumMod val="85000"/>
+          </a:schemeClr>
+        </a:solidFill>
+        <a:effectLst/>
+      </p:bgPr>
+    </p:bg>
+    <p:spTree>
+      <p:nvGrpSpPr>
+        <p:cNvPr id="1" name=""/>
+        <p:cNvGrpSpPr/>
+        <p:nvPr/>
+      </p:nvGrpSpPr>
+      <p:grpSpPr>
+        <a:xfrm>
+          <a:off x="0" y="0"/>
+          <a:ext cx="0" cy="0"/>
+          <a:chOff x="0" y="0"/>
+          <a:chExt cx="0" cy="0"/>
+        </a:xfrm>
+      </p:grpSpPr>
+      <p:pic>
+        <p:nvPicPr>
+          <p:cNvPr id="5" name="Picture 4">
+            <a:extLst>
+              <a:ext uri="{FF2B5EF4-FFF2-40B4-BE49-F238E27FC236}">
+                <a16:creationId xmlns:a16="http://schemas.microsoft.com/office/drawing/2014/main" id="{063ED534-33A9-4856-8579-6425D093B911}"/>
+              </a:ext>
+            </a:extLst>
+          </p:cNvPr>
+          <p:cNvPicPr>
+            <a:picLocks noChangeAspect="1"/>
+          </p:cNvPicPr>
+          <p:nvPr/>
+        </p:nvPicPr>
+        <p:blipFill>
+          <a:blip r:embed="rId2"/>
+          <a:stretch>
+            <a:fillRect/>
+          </a:stretch>
+        </p:blipFill>
+        <p:spPr>
+          <a:xfrm>
+            <a:off x="0" y="340360"/>
+            <a:ext cx="12192000" cy="6177280"/>
+          </a:xfrm>
+          <a:prstGeom prst="rect">
+            <a:avLst/>
+          </a:prstGeom>
+        </p:spPr>
+      </p:pic>
+    </p:spTree>
+    <p:extLst>
+      <p:ext uri="{BB962C8B-B14F-4D97-AF65-F5344CB8AC3E}">
+        <p14:creationId xmlns:p14="http://schemas.microsoft.com/office/powerpoint/2010/main" val="609321786"/>
+      </p:ext>
+    </p:extLst>
+  </p:cSld>
+  <p:clrMapOvr>
+    <a:masterClrMapping/>
+  </p:clrMapOvr>
+</p:sld>
+</file>
+
+<file path=ppt/slides/slide13.xml><?xml version="1.0" encoding="utf-8"?>
+<p:sld xmlns:a="http://schemas.openxmlformats.org/drawingml/2006/main" xmlns:r="http://schemas.openxmlformats.org/officeDocument/2006/relationships" xmlns:p="http://schemas.openxmlformats.org/presentationml/2006/main">
+  <p:cSld>
+    <p:bg>
+      <p:bgPr>
+        <a:solidFill>
+          <a:schemeClr val="tx1">
+            <a:lumMod val="85000"/>
+          </a:schemeClr>
+        </a:solidFill>
+        <a:effectLst/>
+      </p:bgPr>
+    </p:bg>
+    <p:spTree>
+      <p:nvGrpSpPr>
+        <p:cNvPr id="1" name=""/>
+        <p:cNvGrpSpPr/>
+        <p:nvPr/>
+      </p:nvGrpSpPr>
+      <p:grpSpPr>
+        <a:xfrm>
+          <a:off x="0" y="0"/>
+          <a:ext cx="0" cy="0"/>
+          <a:chOff x="0" y="0"/>
+          <a:chExt cx="0" cy="0"/>
+        </a:xfrm>
+      </p:grpSpPr>
+      <p:pic>
+        <p:nvPicPr>
+          <p:cNvPr id="6" name="Picture 5">
+            <a:extLst>
+              <a:ext uri="{FF2B5EF4-FFF2-40B4-BE49-F238E27FC236}">
+                <a16:creationId xmlns:a16="http://schemas.microsoft.com/office/drawing/2014/main" id="{4DE7C741-AD84-4ADC-A450-270E13A1CA25}"/>
+              </a:ext>
+            </a:extLst>
+          </p:cNvPr>
+          <p:cNvPicPr>
+            <a:picLocks noChangeAspect="1"/>
+          </p:cNvPicPr>
+          <p:nvPr/>
+        </p:nvPicPr>
+        <p:blipFill>
+          <a:blip r:embed="rId2"/>
+          <a:stretch>
+            <a:fillRect/>
+          </a:stretch>
+        </p:blipFill>
+        <p:spPr>
+          <a:xfrm>
+            <a:off x="0" y="340361"/>
+            <a:ext cx="12192000" cy="6177280"/>
+          </a:xfrm>
+          <a:prstGeom prst="rect">
+            <a:avLst/>
+          </a:prstGeom>
+        </p:spPr>
+      </p:pic>
+    </p:spTree>
+    <p:extLst>
+      <p:ext uri="{BB962C8B-B14F-4D97-AF65-F5344CB8AC3E}">
+        <p14:creationId xmlns:p14="http://schemas.microsoft.com/office/powerpoint/2010/main" val="4228326820"/>
+      </p:ext>
+    </p:extLst>
+  </p:cSld>
+  <p:clrMapOvr>
+    <a:masterClrMapping/>
+  </p:clrMapOvr>
+</p:sld>
+</file>
+
+<file path=ppt/slides/slide2.xml><?xml version="1.0" encoding="utf-8"?>
+<p:sld xmlns:a="http://schemas.openxmlformats.org/drawingml/2006/main" xmlns:r="http://schemas.openxmlformats.org/officeDocument/2006/relationships" xmlns:p="http://schemas.openxmlformats.org/presentationml/2006/main">
+  <p:cSld>
+    <p:bg>
+      <p:bgPr>
+        <a:solidFill>
+          <a:schemeClr val="tx1">
+            <a:lumMod val="85000"/>
+          </a:schemeClr>
+        </a:solidFill>
+        <a:effectLst/>
+      </p:bgPr>
+    </p:bg>
+    <p:spTree>
+      <p:nvGrpSpPr>
+        <p:cNvPr id="1" name=""/>
+        <p:cNvGrpSpPr/>
+        <p:nvPr/>
+      </p:nvGrpSpPr>
+      <p:grpSpPr>
+        <a:xfrm>
+          <a:off x="0" y="0"/>
+          <a:ext cx="0" cy="0"/>
+          <a:chOff x="0" y="0"/>
+          <a:chExt cx="0" cy="0"/>
+        </a:xfrm>
+      </p:grpSpPr>
       <p:pic>
         <p:nvPicPr>
           <p:cNvPr id="5" name="Picture 4">
@@ -3373,39 +4540,19 @@
 </p:sld>
 </file>
 
-<file path=ppt/slides/slide10.xml><?xml version="1.0" encoding="utf-8"?>
+<file path=ppt/slides/slide3.xml><?xml version="1.0" encoding="utf-8"?>
 <p:sld xmlns:a="http://schemas.openxmlformats.org/drawingml/2006/main" xmlns:r="http://schemas.openxmlformats.org/officeDocument/2006/relationships" xmlns:p="http://schemas.openxmlformats.org/presentationml/2006/main">
   <p:cSld>
-    <p:spTree>
-      <p:nvGrpSpPr>
-        <p:cNvPr id="1" name=""/>
-        <p:cNvGrpSpPr/>
-        <p:nvPr/>
-      </p:nvGrpSpPr>
-      <p:grpSpPr>
-        <a:xfrm>
-          <a:off x="0" y="0"/>
-          <a:ext cx="0" cy="0"/>
-          <a:chOff x="0" y="0"/>
-          <a:chExt cx="0" cy="0"/>
-        </a:xfrm>
-      </p:grpSpPr>
-    </p:spTree>
-    <p:extLst>
-      <p:ext uri="{BB962C8B-B14F-4D97-AF65-F5344CB8AC3E}">
-        <p14:creationId xmlns:p14="http://schemas.microsoft.com/office/powerpoint/2010/main" val="1561767516"/>
-      </p:ext>
-    </p:extLst>
-  </p:cSld>
-  <p:clrMapOvr>
-    <a:masterClrMapping/>
-  </p:clrMapOvr>
-</p:sld>
-</file>
-
-<file path=ppt/slides/slide2.xml><?xml version="1.0" encoding="utf-8"?>
-<p:sld xmlns:a="http://schemas.openxmlformats.org/drawingml/2006/main" xmlns:r="http://schemas.openxmlformats.org/officeDocument/2006/relationships" xmlns:p="http://schemas.openxmlformats.org/presentationml/2006/main">
-  <p:cSld>
+    <p:bg>
+      <p:bgPr>
+        <a:solidFill>
+          <a:schemeClr val="tx1">
+            <a:lumMod val="85000"/>
+          </a:schemeClr>
+        </a:solidFill>
+        <a:effectLst/>
+      </p:bgPr>
+    </p:bg>
     <p:spTree>
       <p:nvGrpSpPr>
         <p:cNvPr id="1" name=""/>
@@ -3463,9 +4610,19 @@
 </p:sld>
 </file>
 
-<file path=ppt/slides/slide3.xml><?xml version="1.0" encoding="utf-8"?>
+<file path=ppt/slides/slide4.xml><?xml version="1.0" encoding="utf-8"?>
 <p:sld xmlns:a="http://schemas.openxmlformats.org/drawingml/2006/main" xmlns:r="http://schemas.openxmlformats.org/officeDocument/2006/relationships" xmlns:p="http://schemas.openxmlformats.org/presentationml/2006/main">
   <p:cSld>
+    <p:bg>
+      <p:bgPr>
+        <a:solidFill>
+          <a:schemeClr val="tx1">
+            <a:lumMod val="85000"/>
+          </a:schemeClr>
+        </a:solidFill>
+        <a:effectLst/>
+      </p:bgPr>
+    </p:bg>
     <p:spTree>
       <p:nvGrpSpPr>
         <p:cNvPr id="1" name=""/>
@@ -3502,7 +4659,7 @@
         </p:blipFill>
         <p:spPr>
           <a:xfrm>
-            <a:off x="856389" y="-4348"/>
+            <a:off x="853067" y="-4348"/>
             <a:ext cx="10485866" cy="6862348"/>
           </a:xfrm>
           <a:prstGeom prst="rect">
@@ -3523,9 +4680,19 @@
 </p:sld>
 </file>
 
-<file path=ppt/slides/slide4.xml><?xml version="1.0" encoding="utf-8"?>
+<file path=ppt/slides/slide5.xml><?xml version="1.0" encoding="utf-8"?>
 <p:sld xmlns:a="http://schemas.openxmlformats.org/drawingml/2006/main" xmlns:r="http://schemas.openxmlformats.org/officeDocument/2006/relationships" xmlns:p="http://schemas.openxmlformats.org/presentationml/2006/main">
   <p:cSld>
+    <p:bg>
+      <p:bgPr>
+        <a:solidFill>
+          <a:schemeClr val="tx1">
+            <a:lumMod val="85000"/>
+          </a:schemeClr>
+        </a:solidFill>
+        <a:effectLst/>
+      </p:bgPr>
+    </p:bg>
     <p:spTree>
       <p:nvGrpSpPr>
         <p:cNvPr id="1" name=""/>
@@ -3583,9 +4750,19 @@
 </p:sld>
 </file>
 
-<file path=ppt/slides/slide5.xml><?xml version="1.0" encoding="utf-8"?>
+<file path=ppt/slides/slide6.xml><?xml version="1.0" encoding="utf-8"?>
 <p:sld xmlns:a="http://schemas.openxmlformats.org/drawingml/2006/main" xmlns:r="http://schemas.openxmlformats.org/officeDocument/2006/relationships" xmlns:p="http://schemas.openxmlformats.org/presentationml/2006/main">
   <p:cSld>
+    <p:bg>
+      <p:bgPr>
+        <a:solidFill>
+          <a:schemeClr val="tx1">
+            <a:lumMod val="85000"/>
+          </a:schemeClr>
+        </a:solidFill>
+        <a:effectLst/>
+      </p:bgPr>
+    </p:bg>
     <p:spTree>
       <p:nvGrpSpPr>
         <p:cNvPr id="1" name=""/>
@@ -3643,9 +4820,19 @@
 </p:sld>
 </file>
 
-<file path=ppt/slides/slide6.xml><?xml version="1.0" encoding="utf-8"?>
+<file path=ppt/slides/slide7.xml><?xml version="1.0" encoding="utf-8"?>
 <p:sld xmlns:a="http://schemas.openxmlformats.org/drawingml/2006/main" xmlns:r="http://schemas.openxmlformats.org/officeDocument/2006/relationships" xmlns:p="http://schemas.openxmlformats.org/presentationml/2006/main">
   <p:cSld>
+    <p:bg>
+      <p:bgPr>
+        <a:solidFill>
+          <a:schemeClr val="tx1">
+            <a:lumMod val="85000"/>
+          </a:schemeClr>
+        </a:solidFill>
+        <a:effectLst/>
+      </p:bgPr>
+    </p:bg>
     <p:spTree>
       <p:nvGrpSpPr>
         <p:cNvPr id="1" name=""/>
@@ -3703,9 +4890,19 @@
 </p:sld>
 </file>
 
-<file path=ppt/slides/slide7.xml><?xml version="1.0" encoding="utf-8"?>
+<file path=ppt/slides/slide8.xml><?xml version="1.0" encoding="utf-8"?>
 <p:sld xmlns:a="http://schemas.openxmlformats.org/drawingml/2006/main" xmlns:r="http://schemas.openxmlformats.org/officeDocument/2006/relationships" xmlns:p="http://schemas.openxmlformats.org/presentationml/2006/main">
   <p:cSld>
+    <p:bg>
+      <p:bgPr>
+        <a:solidFill>
+          <a:schemeClr val="tx1">
+            <a:lumMod val="85000"/>
+          </a:schemeClr>
+        </a:solidFill>
+        <a:effectLst/>
+      </p:bgPr>
+    </p:bg>
     <p:spTree>
       <p:nvGrpSpPr>
         <p:cNvPr id="1" name=""/>
@@ -3763,9 +4960,19 @@
 </p:sld>
 </file>
 
-<file path=ppt/slides/slide8.xml><?xml version="1.0" encoding="utf-8"?>
+<file path=ppt/slides/slide9.xml><?xml version="1.0" encoding="utf-8"?>
 <p:sld xmlns:a="http://schemas.openxmlformats.org/drawingml/2006/main" xmlns:r="http://schemas.openxmlformats.org/officeDocument/2006/relationships" xmlns:p="http://schemas.openxmlformats.org/presentationml/2006/main">
   <p:cSld>
+    <p:bg>
+      <p:bgPr>
+        <a:solidFill>
+          <a:schemeClr val="tx1">
+            <a:lumMod val="85000"/>
+          </a:schemeClr>
+        </a:solidFill>
+        <a:effectLst/>
+      </p:bgPr>
+    </p:bg>
     <p:spTree>
       <p:nvGrpSpPr>
         <p:cNvPr id="1" name=""/>
@@ -3823,171 +5030,59 @@
 </p:sld>
 </file>
 
-<file path=ppt/slides/slide9.xml><?xml version="1.0" encoding="utf-8"?>
-<p:sld xmlns:a="http://schemas.openxmlformats.org/drawingml/2006/main" xmlns:r="http://schemas.openxmlformats.org/officeDocument/2006/relationships" xmlns:p="http://schemas.openxmlformats.org/presentationml/2006/main">
-  <p:cSld>
-    <p:spTree>
-      <p:nvGrpSpPr>
-        <p:cNvPr id="1" name=""/>
-        <p:cNvGrpSpPr/>
-        <p:nvPr/>
-      </p:nvGrpSpPr>
-      <p:grpSpPr>
-        <a:xfrm>
-          <a:off x="0" y="0"/>
-          <a:ext cx="0" cy="0"/>
-          <a:chOff x="0" y="0"/>
-          <a:chExt cx="0" cy="0"/>
-        </a:xfrm>
-      </p:grpSpPr>
-      <p:pic>
-        <p:nvPicPr>
-          <p:cNvPr id="3" name="Picture 2">
-            <a:extLst>
-              <a:ext uri="{FF2B5EF4-FFF2-40B4-BE49-F238E27FC236}">
-                <a16:creationId xmlns:a16="http://schemas.microsoft.com/office/drawing/2014/main" id="{D79CDCBF-8EC0-47BD-A807-5D22AF0C96BB}"/>
-              </a:ext>
-            </a:extLst>
-          </p:cNvPr>
-          <p:cNvPicPr>
-            <a:picLocks noChangeAspect="1"/>
-          </p:cNvPicPr>
-          <p:nvPr/>
-        </p:nvPicPr>
-        <p:blipFill>
-          <a:blip r:embed="rId2"/>
-          <a:stretch>
-            <a:fillRect/>
-          </a:stretch>
-        </p:blipFill>
-        <p:spPr>
-          <a:xfrm>
-            <a:off x="-3674" y="281354"/>
-            <a:ext cx="12195674" cy="6293395"/>
-          </a:xfrm>
-          <a:prstGeom prst="rect">
-            <a:avLst/>
-          </a:prstGeom>
-        </p:spPr>
-      </p:pic>
-    </p:spTree>
-    <p:extLst>
-      <p:ext uri="{BB962C8B-B14F-4D97-AF65-F5344CB8AC3E}">
-        <p14:creationId xmlns:p14="http://schemas.microsoft.com/office/powerpoint/2010/main" val="3795526922"/>
-      </p:ext>
-    </p:extLst>
-  </p:cSld>
-  <p:clrMapOvr>
-    <a:masterClrMapping/>
-  </p:clrMapOvr>
-</p:sld>
-</file>
-
 <file path=ppt/theme/theme1.xml><?xml version="1.0" encoding="utf-8"?>
-<a:theme xmlns:a="http://schemas.openxmlformats.org/drawingml/2006/main" name="Office Theme">
+<a:theme xmlns:a="http://schemas.openxmlformats.org/drawingml/2006/main" name="View">
   <a:themeElements>
-    <a:clrScheme name="Office">
+    <a:clrScheme name="Custom 2">
       <a:dk1>
-        <a:sysClr val="windowText" lastClr="000000"/>
+        <a:srgbClr val="FFFFFF"/>
       </a:dk1>
       <a:lt1>
-        <a:sysClr val="window" lastClr="FFFFFF"/>
+        <a:srgbClr val="000000"/>
       </a:lt1>
       <a:dk2>
-        <a:srgbClr val="44546A"/>
+        <a:srgbClr val="D8D8D8"/>
       </a:dk2>
       <a:lt2>
-        <a:srgbClr val="E7E6E6"/>
+        <a:srgbClr val="262626"/>
       </a:lt2>
       <a:accent1>
-        <a:srgbClr val="4472C4"/>
+        <a:srgbClr val="6F6F74"/>
       </a:accent1>
       <a:accent2>
-        <a:srgbClr val="ED7D31"/>
+        <a:srgbClr val="92A9B9"/>
       </a:accent2>
       <a:accent3>
-        <a:srgbClr val="A5A5A5"/>
+        <a:srgbClr val="A7B789"/>
       </a:accent3>
       <a:accent4>
-        <a:srgbClr val="FFC000"/>
+        <a:srgbClr val="B9A489"/>
       </a:accent4>
       <a:accent5>
-        <a:srgbClr val="5B9BD5"/>
+        <a:srgbClr val="8D6374"/>
       </a:accent5>
       <a:accent6>
-        <a:srgbClr val="70AD47"/>
+        <a:srgbClr val="9B7362"/>
       </a:accent6>
       <a:hlink>
-        <a:srgbClr val="0563C1"/>
+        <a:srgbClr val="67AABF"/>
       </a:hlink>
       <a:folHlink>
-        <a:srgbClr val="954F72"/>
+        <a:srgbClr val="ABAFA5"/>
       </a:folHlink>
     </a:clrScheme>
-    <a:fontScheme name="Office">
+    <a:fontScheme name="View">
       <a:majorFont>
-        <a:latin typeface="Calibri Light" panose="020F0302020204030204"/>
+        <a:latin typeface="Century Schoolbook" panose="02040604050505020304"/>
         <a:ea typeface=""/>
         <a:cs typeface=""/>
-        <a:font script="Jpan" typeface="游ゴシック Light"/>
+        <a:font script="Jpan" typeface="ＭＳ ゴシック"/>
         <a:font script="Hang" typeface="맑은 고딕"/>
-        <a:font script="Hans" typeface="等线 Light"/>
+        <a:font script="Hans" typeface="宋体"/>
         <a:font script="Hant" typeface="新細明體"/>
-        <a:font script="Arab" typeface="Times New Roman"/>
-        <a:font script="Hebr" typeface="Times New Roman"/>
-        <a:font script="Thai" typeface="Angsana New"/>
-        <a:font script="Ethi" typeface="Nyala"/>
-        <a:font script="Beng" typeface="Vrinda"/>
-        <a:font script="Gujr" typeface="Shruti"/>
-        <a:font script="Khmr" typeface="MoolBoran"/>
-        <a:font script="Knda" typeface="Tunga"/>
-        <a:font script="Guru" typeface="Raavi"/>
-        <a:font script="Cans" typeface="Euphemia"/>
-        <a:font script="Cher" typeface="Plantagenet Cherokee"/>
-        <a:font script="Yiii" typeface="Microsoft Yi Baiti"/>
-        <a:font script="Tibt" typeface="Microsoft Himalaya"/>
-        <a:font script="Thaa" typeface="MV Boli"/>
-        <a:font script="Deva" typeface="Mangal"/>
-        <a:font script="Telu" typeface="Gautami"/>
-        <a:font script="Taml" typeface="Latha"/>
-        <a:font script="Syrc" typeface="Estrangelo Edessa"/>
-        <a:font script="Orya" typeface="Kalinga"/>
-        <a:font script="Mlym" typeface="Kartika"/>
-        <a:font script="Laoo" typeface="DokChampa"/>
-        <a:font script="Sinh" typeface="Iskoola Pota"/>
-        <a:font script="Mong" typeface="Mongolian Baiti"/>
-        <a:font script="Viet" typeface="Times New Roman"/>
-        <a:font script="Uigh" typeface="Microsoft Uighur"/>
-        <a:font script="Geor" typeface="Sylfaen"/>
-        <a:font script="Armn" typeface="Arial"/>
-        <a:font script="Bugi" typeface="Leelawadee UI"/>
-        <a:font script="Bopo" typeface="Microsoft JhengHei"/>
-        <a:font script="Java" typeface="Javanese Text"/>
-        <a:font script="Lisu" typeface="Segoe UI"/>
-        <a:font script="Mymr" typeface="Myanmar Text"/>
-        <a:font script="Nkoo" typeface="Ebrima"/>
-        <a:font script="Olck" typeface="Nirmala UI"/>
-        <a:font script="Osma" typeface="Ebrima"/>
-        <a:font script="Phag" typeface="Phagspa"/>
-        <a:font script="Syrn" typeface="Estrangelo Edessa"/>
-        <a:font script="Syrj" typeface="Estrangelo Edessa"/>
-        <a:font script="Syre" typeface="Estrangelo Edessa"/>
-        <a:font script="Sora" typeface="Nirmala UI"/>
-        <a:font script="Tale" typeface="Microsoft Tai Le"/>
-        <a:font script="Talu" typeface="Microsoft New Tai Lue"/>
-        <a:font script="Tfng" typeface="Ebrima"/>
-      </a:majorFont>
-      <a:minorFont>
-        <a:latin typeface="Calibri" panose="020F0502020204030204"/>
-        <a:ea typeface=""/>
-        <a:cs typeface=""/>
-        <a:font script="Jpan" typeface="游ゴシック"/>
-        <a:font script="Hang" typeface="맑은 고딕"/>
-        <a:font script="Hans" typeface="等线"/>
-        <a:font script="Hant" typeface="新細明體"/>
-        <a:font script="Arab" typeface="Arial"/>
-        <a:font script="Hebr" typeface="Arial"/>
-        <a:font script="Thai" typeface="Cordia New"/>
+        <a:font script="Arab" typeface="Tahoma"/>
+        <a:font script="Hebr" typeface="Gisha"/>
+        <a:font script="Thai" typeface="DilleniaUPC"/>
         <a:font script="Ethi" typeface="Nyala"/>
         <a:font script="Beng" typeface="Vrinda"/>
         <a:font script="Gujr" typeface="Shruti"/>
@@ -4008,107 +5103,86 @@
         <a:font script="Laoo" typeface="DokChampa"/>
         <a:font script="Sinh" typeface="Iskoola Pota"/>
         <a:font script="Mong" typeface="Mongolian Baiti"/>
-        <a:font script="Viet" typeface="Arial"/>
+        <a:font script="Viet" typeface="Tahoma"/>
         <a:font script="Uigh" typeface="Microsoft Uighur"/>
         <a:font script="Geor" typeface="Sylfaen"/>
-        <a:font script="Armn" typeface="Arial"/>
-        <a:font script="Bugi" typeface="Leelawadee UI"/>
-        <a:font script="Bopo" typeface="Microsoft JhengHei"/>
-        <a:font script="Java" typeface="Javanese Text"/>
-        <a:font script="Lisu" typeface="Segoe UI"/>
-        <a:font script="Mymr" typeface="Myanmar Text"/>
-        <a:font script="Nkoo" typeface="Ebrima"/>
-        <a:font script="Olck" typeface="Nirmala UI"/>
-        <a:font script="Osma" typeface="Ebrima"/>
-        <a:font script="Phag" typeface="Phagspa"/>
-        <a:font script="Syrn" typeface="Estrangelo Edessa"/>
-        <a:font script="Syrj" typeface="Estrangelo Edessa"/>
-        <a:font script="Syre" typeface="Estrangelo Edessa"/>
-        <a:font script="Sora" typeface="Nirmala UI"/>
-        <a:font script="Tale" typeface="Microsoft Tai Le"/>
-        <a:font script="Talu" typeface="Microsoft New Tai Lue"/>
-        <a:font script="Tfng" typeface="Ebrima"/>
+      </a:majorFont>
+      <a:minorFont>
+        <a:latin typeface="Century Schoolbook" panose="02040604050505020304"/>
+        <a:ea typeface=""/>
+        <a:cs typeface=""/>
+        <a:font script="Jpan" typeface="ＭＳ ゴシック"/>
+        <a:font script="Hang" typeface="맑은 고딕"/>
+        <a:font script="Hans" typeface="宋体"/>
+        <a:font script="Hant" typeface="新細明體"/>
+        <a:font script="Arab" typeface="Tahoma"/>
+        <a:font script="Hebr" typeface="Gisha"/>
+        <a:font script="Thai" typeface="DilleniaUPC"/>
+        <a:font script="Ethi" typeface="Nyala"/>
+        <a:font script="Beng" typeface="Vrinda"/>
+        <a:font script="Gujr" typeface="Shruti"/>
+        <a:font script="Khmr" typeface="DaunPenh"/>
+        <a:font script="Knda" typeface="Tunga"/>
+        <a:font script="Guru" typeface="Raavi"/>
+        <a:font script="Cans" typeface="Euphemia"/>
+        <a:font script="Cher" typeface="Plantagenet Cherokee"/>
+        <a:font script="Yiii" typeface="Microsoft Yi Baiti"/>
+        <a:font script="Tibt" typeface="Microsoft Himalaya"/>
+        <a:font script="Thaa" typeface="MV Boli"/>
+        <a:font script="Deva" typeface="Mangal"/>
+        <a:font script="Telu" typeface="Gautami"/>
+        <a:font script="Taml" typeface="Latha"/>
+        <a:font script="Syrc" typeface="Estrangelo Edessa"/>
+        <a:font script="Orya" typeface="Kalinga"/>
+        <a:font script="Mlym" typeface="Kartika"/>
+        <a:font script="Laoo" typeface="DokChampa"/>
+        <a:font script="Sinh" typeface="Iskoola Pota"/>
+        <a:font script="Mong" typeface="Mongolian Baiti"/>
+        <a:font script="Viet" typeface="Verdana"/>
+        <a:font script="Uigh" typeface="Microsoft Uighur"/>
+        <a:font script="Geor" typeface="Sylfaen"/>
       </a:minorFont>
     </a:fontScheme>
-    <a:fmtScheme name="Office">
+    <a:fmtScheme name="View">
       <a:fillStyleLst>
         <a:solidFill>
           <a:schemeClr val="phClr"/>
         </a:solidFill>
-        <a:gradFill rotWithShape="1">
-          <a:gsLst>
-            <a:gs pos="0">
-              <a:schemeClr val="phClr">
-                <a:lumMod val="110000"/>
-                <a:satMod val="105000"/>
-                <a:tint val="67000"/>
-              </a:schemeClr>
-            </a:gs>
-            <a:gs pos="50000">
-              <a:schemeClr val="phClr">
-                <a:lumMod val="105000"/>
-                <a:satMod val="103000"/>
-                <a:tint val="73000"/>
-              </a:schemeClr>
-            </a:gs>
-            <a:gs pos="100000">
-              <a:schemeClr val="phClr">
-                <a:lumMod val="105000"/>
-                <a:satMod val="109000"/>
-                <a:tint val="81000"/>
-              </a:schemeClr>
-            </a:gs>
-          </a:gsLst>
-          <a:lin ang="5400000" scaled="0"/>
-        </a:gradFill>
-        <a:gradFill rotWithShape="1">
-          <a:gsLst>
-            <a:gs pos="0">
-              <a:schemeClr val="phClr">
-                <a:satMod val="103000"/>
-                <a:lumMod val="102000"/>
-                <a:tint val="94000"/>
-              </a:schemeClr>
-            </a:gs>
-            <a:gs pos="50000">
-              <a:schemeClr val="phClr">
-                <a:satMod val="110000"/>
-                <a:lumMod val="100000"/>
-                <a:shade val="100000"/>
-              </a:schemeClr>
-            </a:gs>
-            <a:gs pos="100000">
-              <a:schemeClr val="phClr">
-                <a:lumMod val="99000"/>
-                <a:satMod val="120000"/>
-                <a:shade val="78000"/>
-              </a:schemeClr>
-            </a:gs>
-          </a:gsLst>
-          <a:lin ang="5400000" scaled="0"/>
-        </a:gradFill>
+        <a:solidFill>
+          <a:schemeClr val="phClr">
+            <a:tint val="60000"/>
+            <a:satMod val="120000"/>
+          </a:schemeClr>
+        </a:solidFill>
+        <a:solidFill>
+          <a:schemeClr val="phClr">
+            <a:shade val="75000"/>
+            <a:satMod val="160000"/>
+          </a:schemeClr>
+        </a:solidFill>
       </a:fillStyleLst>
       <a:lnStyleLst>
-        <a:ln w="6350" cap="flat" cmpd="sng" algn="ctr">
+        <a:ln w="9525" cap="flat" cmpd="sng" algn="ctr">
           <a:solidFill>
             <a:schemeClr val="phClr"/>
           </a:solidFill>
           <a:prstDash val="solid"/>
-          <a:miter lim="800000"/>
         </a:ln>
-        <a:ln w="12700" cap="flat" cmpd="sng" algn="ctr">
+        <a:ln w="13970" cap="flat" cmpd="sng" algn="ctr">
           <a:solidFill>
             <a:schemeClr val="phClr"/>
           </a:solidFill>
           <a:prstDash val="solid"/>
-          <a:miter lim="800000"/>
         </a:ln>
-        <a:ln w="19050" cap="flat" cmpd="sng" algn="ctr">
+        <a:ln w="17145" cap="flat" cmpd="sng" algn="ctr">
           <a:solidFill>
-            <a:schemeClr val="phClr"/>
+            <a:schemeClr val="phClr">
+              <a:shade val="95000"/>
+              <a:alpha val="95000"/>
+              <a:satMod val="150000"/>
+            </a:schemeClr>
           </a:solidFill>
           <a:prstDash val="solid"/>
-          <a:miter lim="800000"/>
         </a:ln>
       </a:lnStyleLst>
       <a:effectStyleLst>
@@ -4116,16 +5190,52 @@
           <a:effectLst/>
         </a:effectStyle>
         <a:effectStyle>
-          <a:effectLst/>
+          <a:effectLst>
+            <a:outerShdw blurRad="50800" dist="15240" dir="5400000" algn="tl" rotWithShape="0">
+              <a:srgbClr val="000000">
+                <a:alpha val="75000"/>
+              </a:srgbClr>
+            </a:outerShdw>
+          </a:effectLst>
+          <a:scene3d>
+            <a:camera prst="orthographicFront">
+              <a:rot lat="0" lon="0" rev="0"/>
+            </a:camera>
+            <a:lightRig rig="brightRoom" dir="tl"/>
+          </a:scene3d>
+          <a:sp3d contourW="9525" prstMaterial="flat">
+            <a:bevelT w="0" h="0" prst="coolSlant"/>
+            <a:contourClr>
+              <a:schemeClr val="phClr">
+                <a:shade val="35000"/>
+                <a:satMod val="130000"/>
+              </a:schemeClr>
+            </a:contourClr>
+          </a:sp3d>
         </a:effectStyle>
         <a:effectStyle>
           <a:effectLst>
-            <a:outerShdw blurRad="57150" dist="19050" dir="5400000" algn="ctr" rotWithShape="0">
+            <a:outerShdw blurRad="76200" dist="25400" dir="5400000" algn="tl" rotWithShape="0">
               <a:srgbClr val="000000">
-                <a:alpha val="63000"/>
+                <a:alpha val="55000"/>
               </a:srgbClr>
             </a:outerShdw>
           </a:effectLst>
+          <a:scene3d>
+            <a:camera prst="orthographicFront">
+              <a:rot lat="0" lon="0" rev="0"/>
+            </a:camera>
+            <a:lightRig rig="brightRoom" dir="tl"/>
+          </a:scene3d>
+          <a:sp3d contourW="19050" prstMaterial="flat">
+            <a:bevelT w="0" h="0" prst="coolSlant"/>
+            <a:contourClr>
+              <a:schemeClr val="phClr">
+                <a:shade val="25000"/>
+                <a:satMod val="140000"/>
+              </a:schemeClr>
+            </a:contourClr>
+          </a:sp3d>
         </a:effectStyle>
       </a:effectStyleLst>
       <a:bgFillStyleLst>
@@ -4142,28 +5252,23 @@
           <a:gsLst>
             <a:gs pos="0">
               <a:schemeClr val="phClr">
-                <a:tint val="93000"/>
-                <a:satMod val="150000"/>
+                <a:tint val="94000"/>
                 <a:shade val="98000"/>
+                <a:satMod val="130000"/>
                 <a:lumMod val="102000"/>
-              </a:schemeClr>
-            </a:gs>
-            <a:gs pos="50000">
-              <a:schemeClr val="phClr">
-                <a:tint val="98000"/>
-                <a:satMod val="130000"/>
-                <a:shade val="90000"/>
-                <a:lumMod val="103000"/>
               </a:schemeClr>
             </a:gs>
             <a:gs pos="100000">
               <a:schemeClr val="phClr">
-                <a:shade val="63000"/>
-                <a:satMod val="120000"/>
+                <a:tint val="98000"/>
+                <a:shade val="78000"/>
+                <a:satMod val="140000"/>
               </a:schemeClr>
             </a:gs>
           </a:gsLst>
-          <a:lin ang="5400000" scaled="0"/>
+          <a:path path="circle">
+            <a:fillToRect l="100000" t="100000" r="100000" b="100000"/>
+          </a:path>
         </a:gradFill>
       </a:bgFillStyleLst>
     </a:fmtScheme>
@@ -4172,7 +5277,7 @@
   <a:extraClrSchemeLst/>
   <a:extLst>
     <a:ext uri="{05A4C25C-085E-4340-85A3-A5531E510DB2}">
-      <thm15:themeFamily xmlns:thm15="http://schemas.microsoft.com/office/thememl/2012/main" name="Office Theme" id="{62F939B6-93AF-4DB8-9C6B-D6C7DFDC589F}" vid="{4A3C46E8-61CC-4603-A589-7422A47A8E4A}"/>
+      <thm15:themeFamily xmlns:thm15="http://schemas.microsoft.com/office/thememl/2012/main" name="View" id="{BA0EB5A6-F2D4-4F82-977B-64ADEE4A2A69}" vid="{3969A8A2-35DB-4E3B-8885-16FD20568674}"/>
     </a:ext>
   </a:extLst>
 </a:theme>

</xml_diff>